<commit_message>
Second revision of the manuscript completed.
</commit_message>
<xml_diff>
--- a/Manuscript/Figures/Ecuador_Orography_RegionsENS_PopulationDensity.pptx
+++ b/Manuscript/Figures/Ecuador_Orography_RegionsENS_PopulationDensity.pptx
@@ -126,7 +126,7 @@
 <file path=ppt/revisionInfo.xml><?xml version="1.0" encoding="utf-8"?>
 <p1510:revInfo xmlns:a="http://schemas.openxmlformats.org/drawingml/2006/main" xmlns:r="http://schemas.openxmlformats.org/officeDocument/2006/relationships" xmlns:p1510="http://schemas.microsoft.com/office/powerpoint/2015/10/main">
   <p1510:revLst>
-    <p1510:client id="{D95880B6-4D62-4CCA-985C-CD81ECFE9D1A}" v="33" dt="2021-12-30T16:08:50.200"/>
+    <p1510:client id="{4D741DE7-9BEB-4B85-A3B3-25E7C1189B63}" v="1" dt="2022-06-07T10:46:53.874"/>
   </p1510:revLst>
 </p1510:revInfo>
 </file>
@@ -2178,6 +2178,510 @@
             <ac:cxnSpMk id="374" creationId="{948B30F7-BDB9-465E-8D93-C7DFAF8AED7B}"/>
           </ac:cxnSpMkLst>
         </pc:cxnChg>
+      </pc:sldChg>
+    </pc:docChg>
+  </pc:docChgLst>
+  <pc:docChgLst>
+    <pc:chgData name="Fatima Pillosu" userId="a6295d4dc9e22643" providerId="LiveId" clId="{4D741DE7-9BEB-4B85-A3B3-25E7C1189B63}"/>
+    <pc:docChg chg="modSld">
+      <pc:chgData name="Fatima Pillosu" userId="a6295d4dc9e22643" providerId="LiveId" clId="{4D741DE7-9BEB-4B85-A3B3-25E7C1189B63}" dt="2022-06-07T10:47:28.268" v="4" actId="255"/>
+      <pc:docMkLst>
+        <pc:docMk/>
+      </pc:docMkLst>
+      <pc:sldChg chg="delSp modSp mod">
+        <pc:chgData name="Fatima Pillosu" userId="a6295d4dc9e22643" providerId="LiveId" clId="{4D741DE7-9BEB-4B85-A3B3-25E7C1189B63}" dt="2022-06-07T10:47:28.268" v="4" actId="255"/>
+        <pc:sldMkLst>
+          <pc:docMk/>
+          <pc:sldMk cId="3799277682" sldId="257"/>
+        </pc:sldMkLst>
+        <pc:spChg chg="mod">
+          <ac:chgData name="Fatima Pillosu" userId="a6295d4dc9e22643" providerId="LiveId" clId="{4D741DE7-9BEB-4B85-A3B3-25E7C1189B63}" dt="2022-06-07T10:47:28.268" v="4" actId="255"/>
+          <ac:spMkLst>
+            <pc:docMk/>
+            <pc:sldMk cId="3799277682" sldId="257"/>
+            <ac:spMk id="175" creationId="{F60A8F43-4B5B-45C6-A56A-0633999D074B}"/>
+          </ac:spMkLst>
+        </pc:spChg>
+        <pc:spChg chg="mod topLvl">
+          <ac:chgData name="Fatima Pillosu" userId="a6295d4dc9e22643" providerId="LiveId" clId="{4D741DE7-9BEB-4B85-A3B3-25E7C1189B63}" dt="2022-06-07T10:46:53.874" v="0" actId="165"/>
+          <ac:spMkLst>
+            <pc:docMk/>
+            <pc:sldMk cId="3799277682" sldId="257"/>
+            <ac:spMk id="197" creationId="{A122E27E-B89D-4646-A9C8-604EA8A20BBC}"/>
+          </ac:spMkLst>
+        </pc:spChg>
+        <pc:spChg chg="mod topLvl">
+          <ac:chgData name="Fatima Pillosu" userId="a6295d4dc9e22643" providerId="LiveId" clId="{4D741DE7-9BEB-4B85-A3B3-25E7C1189B63}" dt="2022-06-07T10:46:53.874" v="0" actId="165"/>
+          <ac:spMkLst>
+            <pc:docMk/>
+            <pc:sldMk cId="3799277682" sldId="257"/>
+            <ac:spMk id="198" creationId="{379409AB-DFC5-4F74-8EFF-327F74CCD4E6}"/>
+          </ac:spMkLst>
+        </pc:spChg>
+        <pc:spChg chg="mod topLvl">
+          <ac:chgData name="Fatima Pillosu" userId="a6295d4dc9e22643" providerId="LiveId" clId="{4D741DE7-9BEB-4B85-A3B3-25E7C1189B63}" dt="2022-06-07T10:46:53.874" v="0" actId="165"/>
+          <ac:spMkLst>
+            <pc:docMk/>
+            <pc:sldMk cId="3799277682" sldId="257"/>
+            <ac:spMk id="199" creationId="{C4C3754B-DDFD-4ADE-A96A-E912CB88EBE3}"/>
+          </ac:spMkLst>
+        </pc:spChg>
+        <pc:spChg chg="mod topLvl">
+          <ac:chgData name="Fatima Pillosu" userId="a6295d4dc9e22643" providerId="LiveId" clId="{4D741DE7-9BEB-4B85-A3B3-25E7C1189B63}" dt="2022-06-07T10:46:53.874" v="0" actId="165"/>
+          <ac:spMkLst>
+            <pc:docMk/>
+            <pc:sldMk cId="3799277682" sldId="257"/>
+            <ac:spMk id="200" creationId="{F889760E-5B5A-4525-8C2F-6846026E1D19}"/>
+          </ac:spMkLst>
+        </pc:spChg>
+        <pc:spChg chg="mod topLvl">
+          <ac:chgData name="Fatima Pillosu" userId="a6295d4dc9e22643" providerId="LiveId" clId="{4D741DE7-9BEB-4B85-A3B3-25E7C1189B63}" dt="2022-06-07T10:46:53.874" v="0" actId="165"/>
+          <ac:spMkLst>
+            <pc:docMk/>
+            <pc:sldMk cId="3799277682" sldId="257"/>
+            <ac:spMk id="201" creationId="{AE5AB460-0903-4B8B-87FA-7CE6510E3056}"/>
+          </ac:spMkLst>
+        </pc:spChg>
+        <pc:spChg chg="mod topLvl">
+          <ac:chgData name="Fatima Pillosu" userId="a6295d4dc9e22643" providerId="LiveId" clId="{4D741DE7-9BEB-4B85-A3B3-25E7C1189B63}" dt="2022-06-07T10:46:53.874" v="0" actId="165"/>
+          <ac:spMkLst>
+            <pc:docMk/>
+            <pc:sldMk cId="3799277682" sldId="257"/>
+            <ac:spMk id="202" creationId="{11B187C6-3A57-4F86-ABB6-ADF882708D3A}"/>
+          </ac:spMkLst>
+        </pc:spChg>
+        <pc:spChg chg="mod topLvl">
+          <ac:chgData name="Fatima Pillosu" userId="a6295d4dc9e22643" providerId="LiveId" clId="{4D741DE7-9BEB-4B85-A3B3-25E7C1189B63}" dt="2022-06-07T10:46:53.874" v="0" actId="165"/>
+          <ac:spMkLst>
+            <pc:docMk/>
+            <pc:sldMk cId="3799277682" sldId="257"/>
+            <ac:spMk id="203" creationId="{3BBEAE37-D32B-49AC-87EC-DDA126F8A175}"/>
+          </ac:spMkLst>
+        </pc:spChg>
+        <pc:spChg chg="mod topLvl">
+          <ac:chgData name="Fatima Pillosu" userId="a6295d4dc9e22643" providerId="LiveId" clId="{4D741DE7-9BEB-4B85-A3B3-25E7C1189B63}" dt="2022-06-07T10:46:53.874" v="0" actId="165"/>
+          <ac:spMkLst>
+            <pc:docMk/>
+            <pc:sldMk cId="3799277682" sldId="257"/>
+            <ac:spMk id="204" creationId="{CDA2E1F3-6E5C-466F-8830-EB44DDC8CEBD}"/>
+          </ac:spMkLst>
+        </pc:spChg>
+        <pc:spChg chg="mod topLvl">
+          <ac:chgData name="Fatima Pillosu" userId="a6295d4dc9e22643" providerId="LiveId" clId="{4D741DE7-9BEB-4B85-A3B3-25E7C1189B63}" dt="2022-06-07T10:46:53.874" v="0" actId="165"/>
+          <ac:spMkLst>
+            <pc:docMk/>
+            <pc:sldMk cId="3799277682" sldId="257"/>
+            <ac:spMk id="205" creationId="{B91C911D-78B0-4CB8-BC0E-9582F95A773B}"/>
+          </ac:spMkLst>
+        </pc:spChg>
+        <pc:spChg chg="mod topLvl">
+          <ac:chgData name="Fatima Pillosu" userId="a6295d4dc9e22643" providerId="LiveId" clId="{4D741DE7-9BEB-4B85-A3B3-25E7C1189B63}" dt="2022-06-07T10:46:53.874" v="0" actId="165"/>
+          <ac:spMkLst>
+            <pc:docMk/>
+            <pc:sldMk cId="3799277682" sldId="257"/>
+            <ac:spMk id="206" creationId="{06B5B641-3648-4EE6-B60D-1641E16BA69E}"/>
+          </ac:spMkLst>
+        </pc:spChg>
+        <pc:spChg chg="mod topLvl">
+          <ac:chgData name="Fatima Pillosu" userId="a6295d4dc9e22643" providerId="LiveId" clId="{4D741DE7-9BEB-4B85-A3B3-25E7C1189B63}" dt="2022-06-07T10:46:53.874" v="0" actId="165"/>
+          <ac:spMkLst>
+            <pc:docMk/>
+            <pc:sldMk cId="3799277682" sldId="257"/>
+            <ac:spMk id="207" creationId="{0C7EE2B8-6492-4229-8AF1-2C8A637C4736}"/>
+          </ac:spMkLst>
+        </pc:spChg>
+        <pc:spChg chg="mod topLvl">
+          <ac:chgData name="Fatima Pillosu" userId="a6295d4dc9e22643" providerId="LiveId" clId="{4D741DE7-9BEB-4B85-A3B3-25E7C1189B63}" dt="2022-06-07T10:46:53.874" v="0" actId="165"/>
+          <ac:spMkLst>
+            <pc:docMk/>
+            <pc:sldMk cId="3799277682" sldId="257"/>
+            <ac:spMk id="208" creationId="{69E9C4FF-1BD0-4A18-8A99-B9BDBEF379FE}"/>
+          </ac:spMkLst>
+        </pc:spChg>
+        <pc:spChg chg="mod topLvl">
+          <ac:chgData name="Fatima Pillosu" userId="a6295d4dc9e22643" providerId="LiveId" clId="{4D741DE7-9BEB-4B85-A3B3-25E7C1189B63}" dt="2022-06-07T10:46:53.874" v="0" actId="165"/>
+          <ac:spMkLst>
+            <pc:docMk/>
+            <pc:sldMk cId="3799277682" sldId="257"/>
+            <ac:spMk id="209" creationId="{8019F4E5-D25D-4A18-B72A-CC23EBF8391A}"/>
+          </ac:spMkLst>
+        </pc:spChg>
+        <pc:spChg chg="mod topLvl">
+          <ac:chgData name="Fatima Pillosu" userId="a6295d4dc9e22643" providerId="LiveId" clId="{4D741DE7-9BEB-4B85-A3B3-25E7C1189B63}" dt="2022-06-07T10:46:53.874" v="0" actId="165"/>
+          <ac:spMkLst>
+            <pc:docMk/>
+            <pc:sldMk cId="3799277682" sldId="257"/>
+            <ac:spMk id="210" creationId="{9D258644-3F29-4A69-B938-4B094E3A0E4C}"/>
+          </ac:spMkLst>
+        </pc:spChg>
+        <pc:spChg chg="mod topLvl">
+          <ac:chgData name="Fatima Pillosu" userId="a6295d4dc9e22643" providerId="LiveId" clId="{4D741DE7-9BEB-4B85-A3B3-25E7C1189B63}" dt="2022-06-07T10:46:53.874" v="0" actId="165"/>
+          <ac:spMkLst>
+            <pc:docMk/>
+            <pc:sldMk cId="3799277682" sldId="257"/>
+            <ac:spMk id="211" creationId="{304FCF33-E449-4E41-BE44-C341DC61F5AC}"/>
+          </ac:spMkLst>
+        </pc:spChg>
+        <pc:spChg chg="mod topLvl">
+          <ac:chgData name="Fatima Pillosu" userId="a6295d4dc9e22643" providerId="LiveId" clId="{4D741DE7-9BEB-4B85-A3B3-25E7C1189B63}" dt="2022-06-07T10:46:53.874" v="0" actId="165"/>
+          <ac:spMkLst>
+            <pc:docMk/>
+            <pc:sldMk cId="3799277682" sldId="257"/>
+            <ac:spMk id="212" creationId="{8A828F02-C7F0-40C9-A558-5B22C5580A78}"/>
+          </ac:spMkLst>
+        </pc:spChg>
+        <pc:spChg chg="mod topLvl">
+          <ac:chgData name="Fatima Pillosu" userId="a6295d4dc9e22643" providerId="LiveId" clId="{4D741DE7-9BEB-4B85-A3B3-25E7C1189B63}" dt="2022-06-07T10:46:53.874" v="0" actId="165"/>
+          <ac:spMkLst>
+            <pc:docMk/>
+            <pc:sldMk cId="3799277682" sldId="257"/>
+            <ac:spMk id="213" creationId="{1657D5C5-96C7-4413-8DC8-25116FCCF52C}"/>
+          </ac:spMkLst>
+        </pc:spChg>
+        <pc:spChg chg="mod topLvl">
+          <ac:chgData name="Fatima Pillosu" userId="a6295d4dc9e22643" providerId="LiveId" clId="{4D741DE7-9BEB-4B85-A3B3-25E7C1189B63}" dt="2022-06-07T10:46:53.874" v="0" actId="165"/>
+          <ac:spMkLst>
+            <pc:docMk/>
+            <pc:sldMk cId="3799277682" sldId="257"/>
+            <ac:spMk id="214" creationId="{4FDCB11B-5181-4C4A-AD3B-BABC6C0DBB04}"/>
+          </ac:spMkLst>
+        </pc:spChg>
+        <pc:spChg chg="mod topLvl">
+          <ac:chgData name="Fatima Pillosu" userId="a6295d4dc9e22643" providerId="LiveId" clId="{4D741DE7-9BEB-4B85-A3B3-25E7C1189B63}" dt="2022-06-07T10:46:53.874" v="0" actId="165"/>
+          <ac:spMkLst>
+            <pc:docMk/>
+            <pc:sldMk cId="3799277682" sldId="257"/>
+            <ac:spMk id="215" creationId="{43CCB5C4-5A20-495D-96F0-B57215A7AA21}"/>
+          </ac:spMkLst>
+        </pc:spChg>
+        <pc:spChg chg="mod topLvl">
+          <ac:chgData name="Fatima Pillosu" userId="a6295d4dc9e22643" providerId="LiveId" clId="{4D741DE7-9BEB-4B85-A3B3-25E7C1189B63}" dt="2022-06-07T10:46:53.874" v="0" actId="165"/>
+          <ac:spMkLst>
+            <pc:docMk/>
+            <pc:sldMk cId="3799277682" sldId="257"/>
+            <ac:spMk id="216" creationId="{626F3178-8FE6-4D24-B3DF-8CD2FDE1FA43}"/>
+          </ac:spMkLst>
+        </pc:spChg>
+        <pc:spChg chg="mod topLvl">
+          <ac:chgData name="Fatima Pillosu" userId="a6295d4dc9e22643" providerId="LiveId" clId="{4D741DE7-9BEB-4B85-A3B3-25E7C1189B63}" dt="2022-06-07T10:46:53.874" v="0" actId="165"/>
+          <ac:spMkLst>
+            <pc:docMk/>
+            <pc:sldMk cId="3799277682" sldId="257"/>
+            <ac:spMk id="217" creationId="{E7A7B55A-342A-49E5-BC78-851EEDEDD0BC}"/>
+          </ac:spMkLst>
+        </pc:spChg>
+        <pc:spChg chg="mod topLvl">
+          <ac:chgData name="Fatima Pillosu" userId="a6295d4dc9e22643" providerId="LiveId" clId="{4D741DE7-9BEB-4B85-A3B3-25E7C1189B63}" dt="2022-06-07T10:46:53.874" v="0" actId="165"/>
+          <ac:spMkLst>
+            <pc:docMk/>
+            <pc:sldMk cId="3799277682" sldId="257"/>
+            <ac:spMk id="218" creationId="{EB701E82-7422-442B-AB98-CB1DC6B3014E}"/>
+          </ac:spMkLst>
+        </pc:spChg>
+        <pc:spChg chg="mod topLvl">
+          <ac:chgData name="Fatima Pillosu" userId="a6295d4dc9e22643" providerId="LiveId" clId="{4D741DE7-9BEB-4B85-A3B3-25E7C1189B63}" dt="2022-06-07T10:47:28.268" v="4" actId="255"/>
+          <ac:spMkLst>
+            <pc:docMk/>
+            <pc:sldMk cId="3799277682" sldId="257"/>
+            <ac:spMk id="219" creationId="{1BDE16C1-EA00-4492-8274-0E8E1431C785}"/>
+          </ac:spMkLst>
+        </pc:spChg>
+        <pc:spChg chg="mod topLvl">
+          <ac:chgData name="Fatima Pillosu" userId="a6295d4dc9e22643" providerId="LiveId" clId="{4D741DE7-9BEB-4B85-A3B3-25E7C1189B63}" dt="2022-06-07T10:46:53.874" v="0" actId="165"/>
+          <ac:spMkLst>
+            <pc:docMk/>
+            <pc:sldMk cId="3799277682" sldId="257"/>
+            <ac:spMk id="220" creationId="{20316B05-E1B0-45E8-9CED-EBA7E50D97C5}"/>
+          </ac:spMkLst>
+        </pc:spChg>
+        <pc:spChg chg="mod">
+          <ac:chgData name="Fatima Pillosu" userId="a6295d4dc9e22643" providerId="LiveId" clId="{4D741DE7-9BEB-4B85-A3B3-25E7C1189B63}" dt="2022-06-07T10:46:53.874" v="0" actId="165"/>
+          <ac:spMkLst>
+            <pc:docMk/>
+            <pc:sldMk cId="3799277682" sldId="257"/>
+            <ac:spMk id="222" creationId="{FA5D4ADE-19D1-415A-BFF4-7F32E0A30F76}"/>
+          </ac:spMkLst>
+        </pc:spChg>
+        <pc:spChg chg="mod">
+          <ac:chgData name="Fatima Pillosu" userId="a6295d4dc9e22643" providerId="LiveId" clId="{4D741DE7-9BEB-4B85-A3B3-25E7C1189B63}" dt="2022-06-07T10:46:53.874" v="0" actId="165"/>
+          <ac:spMkLst>
+            <pc:docMk/>
+            <pc:sldMk cId="3799277682" sldId="257"/>
+            <ac:spMk id="223" creationId="{D3F44C70-0A1D-4151-B5A4-F93331386FEF}"/>
+          </ac:spMkLst>
+        </pc:spChg>
+        <pc:spChg chg="mod">
+          <ac:chgData name="Fatima Pillosu" userId="a6295d4dc9e22643" providerId="LiveId" clId="{4D741DE7-9BEB-4B85-A3B3-25E7C1189B63}" dt="2022-06-07T10:46:53.874" v="0" actId="165"/>
+          <ac:spMkLst>
+            <pc:docMk/>
+            <pc:sldMk cId="3799277682" sldId="257"/>
+            <ac:spMk id="224" creationId="{57302CF9-2020-43E9-BFA8-0AFC9FA1BA15}"/>
+          </ac:spMkLst>
+        </pc:spChg>
+        <pc:spChg chg="mod">
+          <ac:chgData name="Fatima Pillosu" userId="a6295d4dc9e22643" providerId="LiveId" clId="{4D741DE7-9BEB-4B85-A3B3-25E7C1189B63}" dt="2022-06-07T10:46:53.874" v="0" actId="165"/>
+          <ac:spMkLst>
+            <pc:docMk/>
+            <pc:sldMk cId="3799277682" sldId="257"/>
+            <ac:spMk id="225" creationId="{6887CF0C-BB5F-4719-B5AE-8A5F753733CD}"/>
+          </ac:spMkLst>
+        </pc:spChg>
+        <pc:spChg chg="mod">
+          <ac:chgData name="Fatima Pillosu" userId="a6295d4dc9e22643" providerId="LiveId" clId="{4D741DE7-9BEB-4B85-A3B3-25E7C1189B63}" dt="2022-06-07T10:46:53.874" v="0" actId="165"/>
+          <ac:spMkLst>
+            <pc:docMk/>
+            <pc:sldMk cId="3799277682" sldId="257"/>
+            <ac:spMk id="226" creationId="{CFFC4630-967F-4104-89A9-F630FDB76B6E}"/>
+          </ac:spMkLst>
+        </pc:spChg>
+        <pc:spChg chg="mod">
+          <ac:chgData name="Fatima Pillosu" userId="a6295d4dc9e22643" providerId="LiveId" clId="{4D741DE7-9BEB-4B85-A3B3-25E7C1189B63}" dt="2022-06-07T10:46:53.874" v="0" actId="165"/>
+          <ac:spMkLst>
+            <pc:docMk/>
+            <pc:sldMk cId="3799277682" sldId="257"/>
+            <ac:spMk id="227" creationId="{0295C434-527B-4353-8CDB-6D8CE6363E97}"/>
+          </ac:spMkLst>
+        </pc:spChg>
+        <pc:spChg chg="mod">
+          <ac:chgData name="Fatima Pillosu" userId="a6295d4dc9e22643" providerId="LiveId" clId="{4D741DE7-9BEB-4B85-A3B3-25E7C1189B63}" dt="2022-06-07T10:46:53.874" v="0" actId="165"/>
+          <ac:spMkLst>
+            <pc:docMk/>
+            <pc:sldMk cId="3799277682" sldId="257"/>
+            <ac:spMk id="228" creationId="{5349082E-00FB-48AF-A445-2B81D51E7764}"/>
+          </ac:spMkLst>
+        </pc:spChg>
+        <pc:spChg chg="mod">
+          <ac:chgData name="Fatima Pillosu" userId="a6295d4dc9e22643" providerId="LiveId" clId="{4D741DE7-9BEB-4B85-A3B3-25E7C1189B63}" dt="2022-06-07T10:46:53.874" v="0" actId="165"/>
+          <ac:spMkLst>
+            <pc:docMk/>
+            <pc:sldMk cId="3799277682" sldId="257"/>
+            <ac:spMk id="229" creationId="{296C9E54-D41F-4866-B943-6C27979931F3}"/>
+          </ac:spMkLst>
+        </pc:spChg>
+        <pc:spChg chg="mod">
+          <ac:chgData name="Fatima Pillosu" userId="a6295d4dc9e22643" providerId="LiveId" clId="{4D741DE7-9BEB-4B85-A3B3-25E7C1189B63}" dt="2022-06-07T10:46:53.874" v="0" actId="165"/>
+          <ac:spMkLst>
+            <pc:docMk/>
+            <pc:sldMk cId="3799277682" sldId="257"/>
+            <ac:spMk id="230" creationId="{5C5F7E5C-40D0-4404-AF79-EA2FE5BF9D29}"/>
+          </ac:spMkLst>
+        </pc:spChg>
+        <pc:spChg chg="mod">
+          <ac:chgData name="Fatima Pillosu" userId="a6295d4dc9e22643" providerId="LiveId" clId="{4D741DE7-9BEB-4B85-A3B3-25E7C1189B63}" dt="2022-06-07T10:46:53.874" v="0" actId="165"/>
+          <ac:spMkLst>
+            <pc:docMk/>
+            <pc:sldMk cId="3799277682" sldId="257"/>
+            <ac:spMk id="231" creationId="{63EC534E-F923-4622-9FF7-0E86BB901474}"/>
+          </ac:spMkLst>
+        </pc:spChg>
+        <pc:spChg chg="mod">
+          <ac:chgData name="Fatima Pillosu" userId="a6295d4dc9e22643" providerId="LiveId" clId="{4D741DE7-9BEB-4B85-A3B3-25E7C1189B63}" dt="2022-06-07T10:46:53.874" v="0" actId="165"/>
+          <ac:spMkLst>
+            <pc:docMk/>
+            <pc:sldMk cId="3799277682" sldId="257"/>
+            <ac:spMk id="232" creationId="{9E313F42-5E49-469A-A948-7A0F0CF048E0}"/>
+          </ac:spMkLst>
+        </pc:spChg>
+        <pc:spChg chg="mod">
+          <ac:chgData name="Fatima Pillosu" userId="a6295d4dc9e22643" providerId="LiveId" clId="{4D741DE7-9BEB-4B85-A3B3-25E7C1189B63}" dt="2022-06-07T10:46:53.874" v="0" actId="165"/>
+          <ac:spMkLst>
+            <pc:docMk/>
+            <pc:sldMk cId="3799277682" sldId="257"/>
+            <ac:spMk id="233" creationId="{74AD475F-7786-49F6-9E62-AE6CE8B5626E}"/>
+          </ac:spMkLst>
+        </pc:spChg>
+        <pc:spChg chg="mod">
+          <ac:chgData name="Fatima Pillosu" userId="a6295d4dc9e22643" providerId="LiveId" clId="{4D741DE7-9BEB-4B85-A3B3-25E7C1189B63}" dt="2022-06-07T10:46:53.874" v="0" actId="165"/>
+          <ac:spMkLst>
+            <pc:docMk/>
+            <pc:sldMk cId="3799277682" sldId="257"/>
+            <ac:spMk id="234" creationId="{1627617A-600F-4F7A-BAB6-B7CDB86FF983}"/>
+          </ac:spMkLst>
+        </pc:spChg>
+        <pc:spChg chg="mod">
+          <ac:chgData name="Fatima Pillosu" userId="a6295d4dc9e22643" providerId="LiveId" clId="{4D741DE7-9BEB-4B85-A3B3-25E7C1189B63}" dt="2022-06-07T10:46:53.874" v="0" actId="165"/>
+          <ac:spMkLst>
+            <pc:docMk/>
+            <pc:sldMk cId="3799277682" sldId="257"/>
+            <ac:spMk id="235" creationId="{C5A772C7-BD7B-4F33-A8C5-7AFD50CFBEED}"/>
+          </ac:spMkLst>
+        </pc:spChg>
+        <pc:spChg chg="mod">
+          <ac:chgData name="Fatima Pillosu" userId="a6295d4dc9e22643" providerId="LiveId" clId="{4D741DE7-9BEB-4B85-A3B3-25E7C1189B63}" dt="2022-06-07T10:46:53.874" v="0" actId="165"/>
+          <ac:spMkLst>
+            <pc:docMk/>
+            <pc:sldMk cId="3799277682" sldId="257"/>
+            <ac:spMk id="236" creationId="{2753D96C-C548-4F6B-9FEF-E3671AD7DF4D}"/>
+          </ac:spMkLst>
+        </pc:spChg>
+        <pc:spChg chg="mod">
+          <ac:chgData name="Fatima Pillosu" userId="a6295d4dc9e22643" providerId="LiveId" clId="{4D741DE7-9BEB-4B85-A3B3-25E7C1189B63}" dt="2022-06-07T10:46:53.874" v="0" actId="165"/>
+          <ac:spMkLst>
+            <pc:docMk/>
+            <pc:sldMk cId="3799277682" sldId="257"/>
+            <ac:spMk id="237" creationId="{351D3152-4B07-403F-AB18-15453C394568}"/>
+          </ac:spMkLst>
+        </pc:spChg>
+        <pc:spChg chg="mod">
+          <ac:chgData name="Fatima Pillosu" userId="a6295d4dc9e22643" providerId="LiveId" clId="{4D741DE7-9BEB-4B85-A3B3-25E7C1189B63}" dt="2022-06-07T10:46:53.874" v="0" actId="165"/>
+          <ac:spMkLst>
+            <pc:docMk/>
+            <pc:sldMk cId="3799277682" sldId="257"/>
+            <ac:spMk id="238" creationId="{E513ECF2-B1B0-4717-88AD-F47013290A09}"/>
+          </ac:spMkLst>
+        </pc:spChg>
+        <pc:spChg chg="mod">
+          <ac:chgData name="Fatima Pillosu" userId="a6295d4dc9e22643" providerId="LiveId" clId="{4D741DE7-9BEB-4B85-A3B3-25E7C1189B63}" dt="2022-06-07T10:46:53.874" v="0" actId="165"/>
+          <ac:spMkLst>
+            <pc:docMk/>
+            <pc:sldMk cId="3799277682" sldId="257"/>
+            <ac:spMk id="239" creationId="{3F1FE446-17CF-46EE-8429-1A5638B6F722}"/>
+          </ac:spMkLst>
+        </pc:spChg>
+        <pc:spChg chg="mod">
+          <ac:chgData name="Fatima Pillosu" userId="a6295d4dc9e22643" providerId="LiveId" clId="{4D741DE7-9BEB-4B85-A3B3-25E7C1189B63}" dt="2022-06-07T10:46:53.874" v="0" actId="165"/>
+          <ac:spMkLst>
+            <pc:docMk/>
+            <pc:sldMk cId="3799277682" sldId="257"/>
+            <ac:spMk id="240" creationId="{566D3A46-294E-4EE1-B817-42801BD3AF22}"/>
+          </ac:spMkLst>
+        </pc:spChg>
+        <pc:spChg chg="mod">
+          <ac:chgData name="Fatima Pillosu" userId="a6295d4dc9e22643" providerId="LiveId" clId="{4D741DE7-9BEB-4B85-A3B3-25E7C1189B63}" dt="2022-06-07T10:46:53.874" v="0" actId="165"/>
+          <ac:spMkLst>
+            <pc:docMk/>
+            <pc:sldMk cId="3799277682" sldId="257"/>
+            <ac:spMk id="241" creationId="{8F63F9D6-66A3-4A36-9C6F-7971C5E18357}"/>
+          </ac:spMkLst>
+        </pc:spChg>
+        <pc:spChg chg="mod">
+          <ac:chgData name="Fatima Pillosu" userId="a6295d4dc9e22643" providerId="LiveId" clId="{4D741DE7-9BEB-4B85-A3B3-25E7C1189B63}" dt="2022-06-07T10:46:53.874" v="0" actId="165"/>
+          <ac:spMkLst>
+            <pc:docMk/>
+            <pc:sldMk cId="3799277682" sldId="257"/>
+            <ac:spMk id="242" creationId="{201251B4-7C06-42E4-A62E-253B03FE3984}"/>
+          </ac:spMkLst>
+        </pc:spChg>
+        <pc:spChg chg="mod">
+          <ac:chgData name="Fatima Pillosu" userId="a6295d4dc9e22643" providerId="LiveId" clId="{4D741DE7-9BEB-4B85-A3B3-25E7C1189B63}" dt="2022-06-07T10:46:53.874" v="0" actId="165"/>
+          <ac:spMkLst>
+            <pc:docMk/>
+            <pc:sldMk cId="3799277682" sldId="257"/>
+            <ac:spMk id="243" creationId="{E802D561-41B4-471D-85A5-933FE50FC47E}"/>
+          </ac:spMkLst>
+        </pc:spChg>
+        <pc:spChg chg="mod">
+          <ac:chgData name="Fatima Pillosu" userId="a6295d4dc9e22643" providerId="LiveId" clId="{4D741DE7-9BEB-4B85-A3B3-25E7C1189B63}" dt="2022-06-07T10:46:53.874" v="0" actId="165"/>
+          <ac:spMkLst>
+            <pc:docMk/>
+            <pc:sldMk cId="3799277682" sldId="257"/>
+            <ac:spMk id="244" creationId="{07C784B3-AB3E-473A-9FB9-E21961807D25}"/>
+          </ac:spMkLst>
+        </pc:spChg>
+        <pc:spChg chg="mod">
+          <ac:chgData name="Fatima Pillosu" userId="a6295d4dc9e22643" providerId="LiveId" clId="{4D741DE7-9BEB-4B85-A3B3-25E7C1189B63}" dt="2022-06-07T10:46:53.874" v="0" actId="165"/>
+          <ac:spMkLst>
+            <pc:docMk/>
+            <pc:sldMk cId="3799277682" sldId="257"/>
+            <ac:spMk id="245" creationId="{824D9C1F-D9EE-4DF1-AF60-10129CC8BAF2}"/>
+          </ac:spMkLst>
+        </pc:spChg>
+        <pc:spChg chg="mod">
+          <ac:chgData name="Fatima Pillosu" userId="a6295d4dc9e22643" providerId="LiveId" clId="{4D741DE7-9BEB-4B85-A3B3-25E7C1189B63}" dt="2022-06-07T10:46:53.874" v="0" actId="165"/>
+          <ac:spMkLst>
+            <pc:docMk/>
+            <pc:sldMk cId="3799277682" sldId="257"/>
+            <ac:spMk id="246" creationId="{E480BB1F-BA13-461B-A8C7-13AFC5B59CD8}"/>
+          </ac:spMkLst>
+        </pc:spChg>
+        <pc:spChg chg="mod">
+          <ac:chgData name="Fatima Pillosu" userId="a6295d4dc9e22643" providerId="LiveId" clId="{4D741DE7-9BEB-4B85-A3B3-25E7C1189B63}" dt="2022-06-07T10:46:53.874" v="0" actId="165"/>
+          <ac:spMkLst>
+            <pc:docMk/>
+            <pc:sldMk cId="3799277682" sldId="257"/>
+            <ac:spMk id="247" creationId="{287DA8F9-ABA4-4286-8036-64D53844F9F3}"/>
+          </ac:spMkLst>
+        </pc:spChg>
+        <pc:spChg chg="mod">
+          <ac:chgData name="Fatima Pillosu" userId="a6295d4dc9e22643" providerId="LiveId" clId="{4D741DE7-9BEB-4B85-A3B3-25E7C1189B63}" dt="2022-06-07T10:46:53.874" v="0" actId="165"/>
+          <ac:spMkLst>
+            <pc:docMk/>
+            <pc:sldMk cId="3799277682" sldId="257"/>
+            <ac:spMk id="248" creationId="{0D48C767-FDAF-467B-8268-F4A8966041C4}"/>
+          </ac:spMkLst>
+        </pc:spChg>
+        <pc:spChg chg="mod">
+          <ac:chgData name="Fatima Pillosu" userId="a6295d4dc9e22643" providerId="LiveId" clId="{4D741DE7-9BEB-4B85-A3B3-25E7C1189B63}" dt="2022-06-07T10:46:53.874" v="0" actId="165"/>
+          <ac:spMkLst>
+            <pc:docMk/>
+            <pc:sldMk cId="3799277682" sldId="257"/>
+            <ac:spMk id="249" creationId="{882D3E31-1579-48DB-9AC8-1C207822207C}"/>
+          </ac:spMkLst>
+        </pc:spChg>
+        <pc:spChg chg="mod">
+          <ac:chgData name="Fatima Pillosu" userId="a6295d4dc9e22643" providerId="LiveId" clId="{4D741DE7-9BEB-4B85-A3B3-25E7C1189B63}" dt="2022-06-07T10:46:53.874" v="0" actId="165"/>
+          <ac:spMkLst>
+            <pc:docMk/>
+            <pc:sldMk cId="3799277682" sldId="257"/>
+            <ac:spMk id="250" creationId="{AA53A63A-4527-4F93-835F-59103D082DD9}"/>
+          </ac:spMkLst>
+        </pc:spChg>
+        <pc:spChg chg="mod">
+          <ac:chgData name="Fatima Pillosu" userId="a6295d4dc9e22643" providerId="LiveId" clId="{4D741DE7-9BEB-4B85-A3B3-25E7C1189B63}" dt="2022-06-07T10:46:53.874" v="0" actId="165"/>
+          <ac:spMkLst>
+            <pc:docMk/>
+            <pc:sldMk cId="3799277682" sldId="257"/>
+            <ac:spMk id="251" creationId="{3E3616AF-3D42-45D3-9FF5-566A874A0276}"/>
+          </ac:spMkLst>
+        </pc:spChg>
+        <pc:spChg chg="mod">
+          <ac:chgData name="Fatima Pillosu" userId="a6295d4dc9e22643" providerId="LiveId" clId="{4D741DE7-9BEB-4B85-A3B3-25E7C1189B63}" dt="2022-06-07T10:46:53.874" v="0" actId="165"/>
+          <ac:spMkLst>
+            <pc:docMk/>
+            <pc:sldMk cId="3799277682" sldId="257"/>
+            <ac:spMk id="252" creationId="{51DAC668-8AB1-4901-A419-D6ACE3879328}"/>
+          </ac:spMkLst>
+        </pc:spChg>
+        <pc:spChg chg="mod">
+          <ac:chgData name="Fatima Pillosu" userId="a6295d4dc9e22643" providerId="LiveId" clId="{4D741DE7-9BEB-4B85-A3B3-25E7C1189B63}" dt="2022-06-07T10:47:28.268" v="4" actId="255"/>
+          <ac:spMkLst>
+            <pc:docMk/>
+            <pc:sldMk cId="3799277682" sldId="257"/>
+            <ac:spMk id="263" creationId="{493B59B2-74D3-4983-B76D-83766755FB45}"/>
+          </ac:spMkLst>
+        </pc:spChg>
+        <pc:spChg chg="mod">
+          <ac:chgData name="Fatima Pillosu" userId="a6295d4dc9e22643" providerId="LiveId" clId="{4D741DE7-9BEB-4B85-A3B3-25E7C1189B63}" dt="2022-06-07T10:47:28.268" v="4" actId="255"/>
+          <ac:spMkLst>
+            <pc:docMk/>
+            <pc:sldMk cId="3799277682" sldId="257"/>
+            <ac:spMk id="264" creationId="{2AA2DE8F-4B17-4C50-AD57-3C1A3825150C}"/>
+          </ac:spMkLst>
+        </pc:spChg>
+        <pc:grpChg chg="del">
+          <ac:chgData name="Fatima Pillosu" userId="a6295d4dc9e22643" providerId="LiveId" clId="{4D741DE7-9BEB-4B85-A3B3-25E7C1189B63}" dt="2022-06-07T10:46:53.874" v="0" actId="165"/>
+          <ac:grpSpMkLst>
+            <pc:docMk/>
+            <pc:sldMk cId="3799277682" sldId="257"/>
+            <ac:grpSpMk id="194" creationId="{A391E7FA-8E14-461A-B0D7-1737D535B1C5}"/>
+          </ac:grpSpMkLst>
+        </pc:grpChg>
+        <pc:grpChg chg="mod topLvl">
+          <ac:chgData name="Fatima Pillosu" userId="a6295d4dc9e22643" providerId="LiveId" clId="{4D741DE7-9BEB-4B85-A3B3-25E7C1189B63}" dt="2022-06-07T10:46:53.874" v="0" actId="165"/>
+          <ac:grpSpMkLst>
+            <pc:docMk/>
+            <pc:sldMk cId="3799277682" sldId="257"/>
+            <ac:grpSpMk id="195" creationId="{38C30CC2-162F-43F1-AAE7-B0E722025136}"/>
+          </ac:grpSpMkLst>
+        </pc:grpChg>
+        <pc:picChg chg="mod topLvl">
+          <ac:chgData name="Fatima Pillosu" userId="a6295d4dc9e22643" providerId="LiveId" clId="{4D741DE7-9BEB-4B85-A3B3-25E7C1189B63}" dt="2022-06-07T10:46:53.874" v="0" actId="165"/>
+          <ac:picMkLst>
+            <pc:docMk/>
+            <pc:sldMk cId="3799277682" sldId="257"/>
+            <ac:picMk id="196" creationId="{B58C8CEE-863D-4AF5-944A-06815392DD64}"/>
+          </ac:picMkLst>
+        </pc:picChg>
       </pc:sldChg>
     </pc:docChg>
   </pc:docChgLst>
@@ -2315,7 +2819,7 @@
           <a:p>
             <a:fld id="{26A39A61-950A-4477-905B-88756D808483}" type="datetimeFigureOut">
               <a:rPr lang="en-GB" smtClean="0"/>
-              <a:t>30/12/2021</a:t>
+              <a:t>07/06/2022</a:t>
             </a:fld>
             <a:endParaRPr lang="en-GB"/>
           </a:p>
@@ -2485,7 +2989,7 @@
           <a:p>
             <a:fld id="{26A39A61-950A-4477-905B-88756D808483}" type="datetimeFigureOut">
               <a:rPr lang="en-GB" smtClean="0"/>
-              <a:t>30/12/2021</a:t>
+              <a:t>07/06/2022</a:t>
             </a:fld>
             <a:endParaRPr lang="en-GB"/>
           </a:p>
@@ -2665,7 +3169,7 @@
           <a:p>
             <a:fld id="{26A39A61-950A-4477-905B-88756D808483}" type="datetimeFigureOut">
               <a:rPr lang="en-GB" smtClean="0"/>
-              <a:t>30/12/2021</a:t>
+              <a:t>07/06/2022</a:t>
             </a:fld>
             <a:endParaRPr lang="en-GB"/>
           </a:p>
@@ -2835,7 +3339,7 @@
           <a:p>
             <a:fld id="{26A39A61-950A-4477-905B-88756D808483}" type="datetimeFigureOut">
               <a:rPr lang="en-GB" smtClean="0"/>
-              <a:t>30/12/2021</a:t>
+              <a:t>07/06/2022</a:t>
             </a:fld>
             <a:endParaRPr lang="en-GB"/>
           </a:p>
@@ -3079,7 +3583,7 @@
           <a:p>
             <a:fld id="{26A39A61-950A-4477-905B-88756D808483}" type="datetimeFigureOut">
               <a:rPr lang="en-GB" smtClean="0"/>
-              <a:t>30/12/2021</a:t>
+              <a:t>07/06/2022</a:t>
             </a:fld>
             <a:endParaRPr lang="en-GB"/>
           </a:p>
@@ -3311,7 +3815,7 @@
           <a:p>
             <a:fld id="{26A39A61-950A-4477-905B-88756D808483}" type="datetimeFigureOut">
               <a:rPr lang="en-GB" smtClean="0"/>
-              <a:t>30/12/2021</a:t>
+              <a:t>07/06/2022</a:t>
             </a:fld>
             <a:endParaRPr lang="en-GB"/>
           </a:p>
@@ -3678,7 +4182,7 @@
           <a:p>
             <a:fld id="{26A39A61-950A-4477-905B-88756D808483}" type="datetimeFigureOut">
               <a:rPr lang="en-GB" smtClean="0"/>
-              <a:t>30/12/2021</a:t>
+              <a:t>07/06/2022</a:t>
             </a:fld>
             <a:endParaRPr lang="en-GB"/>
           </a:p>
@@ -3796,7 +4300,7 @@
           <a:p>
             <a:fld id="{26A39A61-950A-4477-905B-88756D808483}" type="datetimeFigureOut">
               <a:rPr lang="en-GB" smtClean="0"/>
-              <a:t>30/12/2021</a:t>
+              <a:t>07/06/2022</a:t>
             </a:fld>
             <a:endParaRPr lang="en-GB"/>
           </a:p>
@@ -3891,7 +4395,7 @@
           <a:p>
             <a:fld id="{26A39A61-950A-4477-905B-88756D808483}" type="datetimeFigureOut">
               <a:rPr lang="en-GB" smtClean="0"/>
-              <a:t>30/12/2021</a:t>
+              <a:t>07/06/2022</a:t>
             </a:fld>
             <a:endParaRPr lang="en-GB"/>
           </a:p>
@@ -4168,7 +4672,7 @@
           <a:p>
             <a:fld id="{26A39A61-950A-4477-905B-88756D808483}" type="datetimeFigureOut">
               <a:rPr lang="en-GB" smtClean="0"/>
-              <a:t>30/12/2021</a:t>
+              <a:t>07/06/2022</a:t>
             </a:fld>
             <a:endParaRPr lang="en-GB"/>
           </a:p>
@@ -4425,7 +4929,7 @@
           <a:p>
             <a:fld id="{26A39A61-950A-4477-905B-88756D808483}" type="datetimeFigureOut">
               <a:rPr lang="en-GB" smtClean="0"/>
-              <a:t>30/12/2021</a:t>
+              <a:t>07/06/2022</a:t>
             </a:fld>
             <a:endParaRPr lang="en-GB"/>
           </a:p>
@@ -4638,7 +5142,7 @@
           <a:p>
             <a:fld id="{26A39A61-950A-4477-905B-88756D808483}" type="datetimeFigureOut">
               <a:rPr lang="en-GB" smtClean="0"/>
-              <a:t>30/12/2021</a:t>
+              <a:t>07/06/2022</a:t>
             </a:fld>
             <a:endParaRPr lang="en-GB"/>
           </a:p>
@@ -5406,13 +5910,13 @@
         <p:spPr>
           <a:xfrm>
             <a:off x="120822" y="146199"/>
-            <a:ext cx="229660" cy="276999"/>
+            <a:ext cx="229660" cy="246221"/>
           </a:xfrm>
           <a:prstGeom prst="rect">
             <a:avLst/>
           </a:prstGeom>
           <a:noFill/>
-          <a:ln w="28575">
+          <a:ln w="9525">
             <a:solidFill>
               <a:schemeClr val="tx1"/>
             </a:solidFill>
@@ -5426,10 +5930,10 @@
           <a:p>
             <a:pPr algn="ctr"/>
             <a:r>
-              <a:rPr lang="es-ES" sz="1200" b="1" dirty="0"/>
+              <a:rPr lang="es-ES" sz="1000" dirty="0"/>
               <a:t>a</a:t>
             </a:r>
-            <a:endParaRPr lang="en-GB" sz="1200" b="1" dirty="0"/>
+            <a:endParaRPr lang="en-GB" sz="1000" dirty="0"/>
           </a:p>
         </p:txBody>
       </p:sp>
@@ -6236,10 +6740,10 @@
       </p:grpSp>
       <p:grpSp>
         <p:nvGrpSpPr>
-          <p:cNvPr id="194" name="Group 193">
+          <p:cNvPr id="195" name="Group 194">
             <a:extLst>
               <a:ext uri="{FF2B5EF4-FFF2-40B4-BE49-F238E27FC236}">
-                <a16:creationId xmlns:a16="http://schemas.microsoft.com/office/drawing/2014/main" id="{A391E7FA-8E14-461A-B0D7-1737D535B1C5}"/>
+                <a16:creationId xmlns:a16="http://schemas.microsoft.com/office/drawing/2014/main" id="{38C30CC2-162F-43F1-AAE7-B0E722025136}"/>
               </a:ext>
             </a:extLst>
           </p:cNvPr>
@@ -6248,1444 +6752,235 @@
         </p:nvGrpSpPr>
         <p:grpSpPr>
           <a:xfrm>
-            <a:off x="2528638" y="4874071"/>
-            <a:ext cx="3351890" cy="2718820"/>
-            <a:chOff x="3223778" y="8833166"/>
-            <a:chExt cx="3351890" cy="2718820"/>
+            <a:off x="4885438" y="4874071"/>
+            <a:ext cx="995090" cy="2718820"/>
+            <a:chOff x="2591507" y="2530569"/>
+            <a:chExt cx="995090" cy="2718820"/>
           </a:xfrm>
         </p:grpSpPr>
-        <p:grpSp>
-          <p:nvGrpSpPr>
-            <p:cNvPr id="195" name="Group 194">
+        <p:sp>
+          <p:nvSpPr>
+            <p:cNvPr id="222" name="Rectangle 221">
               <a:extLst>
                 <a:ext uri="{FF2B5EF4-FFF2-40B4-BE49-F238E27FC236}">
-                  <a16:creationId xmlns:a16="http://schemas.microsoft.com/office/drawing/2014/main" id="{38C30CC2-162F-43F1-AAE7-B0E722025136}"/>
+                  <a16:creationId xmlns:a16="http://schemas.microsoft.com/office/drawing/2014/main" id="{FA5D4ADE-19D1-415A-BFF4-7F32E0A30F76}"/>
                 </a:ext>
               </a:extLst>
             </p:cNvPr>
-            <p:cNvGrpSpPr/>
+            <p:cNvSpPr/>
             <p:nvPr/>
-          </p:nvGrpSpPr>
-          <p:grpSpPr>
-            <a:xfrm>
-              <a:off x="5580578" y="8833166"/>
-              <a:ext cx="995090" cy="2718820"/>
-              <a:chOff x="2591507" y="2530569"/>
-              <a:chExt cx="995090" cy="2718820"/>
-            </a:xfrm>
-          </p:grpSpPr>
-          <p:sp>
-            <p:nvSpPr>
-              <p:cNvPr id="222" name="Rectangle 221">
-                <a:extLst>
-                  <a:ext uri="{FF2B5EF4-FFF2-40B4-BE49-F238E27FC236}">
-                    <a16:creationId xmlns:a16="http://schemas.microsoft.com/office/drawing/2014/main" id="{FA5D4ADE-19D1-415A-BFF4-7F32E0A30F76}"/>
-                  </a:ext>
-                </a:extLst>
-              </p:cNvPr>
-              <p:cNvSpPr/>
-              <p:nvPr/>
-            </p:nvSpPr>
-            <p:spPr>
-              <a:xfrm>
-                <a:off x="2591507" y="4534640"/>
-                <a:ext cx="180000" cy="108000"/>
-              </a:xfrm>
-              <a:prstGeom prst="rect">
-                <a:avLst/>
-              </a:prstGeom>
-              <a:solidFill>
-                <a:srgbClr val="F2A068"/>
-              </a:solidFill>
-              <a:ln>
-                <a:noFill/>
-              </a:ln>
-            </p:spPr>
-            <p:style>
-              <a:lnRef idx="2">
-                <a:schemeClr val="accent1">
-                  <a:shade val="50000"/>
-                </a:schemeClr>
-              </a:lnRef>
-              <a:fillRef idx="1">
-                <a:schemeClr val="accent1"/>
-              </a:fillRef>
-              <a:effectRef idx="0">
-                <a:schemeClr val="accent1"/>
-              </a:effectRef>
-              <a:fontRef idx="minor">
-                <a:schemeClr val="lt1"/>
-              </a:fontRef>
-            </p:style>
-            <p:txBody>
-              <a:bodyPr rtlCol="0" anchor="ctr"/>
-              <a:lstStyle/>
-              <a:p>
-                <a:pPr algn="ctr"/>
-                <a:endParaRPr lang="en-GB"/>
-              </a:p>
-            </p:txBody>
-          </p:sp>
-          <p:sp>
-            <p:nvSpPr>
-              <p:cNvPr id="223" name="Rectangle 222">
-                <a:extLst>
-                  <a:ext uri="{FF2B5EF4-FFF2-40B4-BE49-F238E27FC236}">
-                    <a16:creationId xmlns:a16="http://schemas.microsoft.com/office/drawing/2014/main" id="{D3F44C70-0A1D-4151-B5A4-F93331386FEF}"/>
-                  </a:ext>
-                </a:extLst>
-              </p:cNvPr>
-              <p:cNvSpPr/>
-              <p:nvPr/>
-            </p:nvSpPr>
-            <p:spPr>
-              <a:xfrm>
-                <a:off x="2591507" y="4709846"/>
-                <a:ext cx="180000" cy="108000"/>
-              </a:xfrm>
-              <a:prstGeom prst="rect">
-                <a:avLst/>
-              </a:prstGeom>
-              <a:solidFill>
-                <a:schemeClr val="accent2">
-                  <a:lumMod val="60000"/>
-                  <a:lumOff val="40000"/>
-                </a:schemeClr>
-              </a:solidFill>
-              <a:ln>
-                <a:noFill/>
-              </a:ln>
-            </p:spPr>
-            <p:style>
-              <a:lnRef idx="2">
-                <a:schemeClr val="accent1">
-                  <a:shade val="50000"/>
-                </a:schemeClr>
-              </a:lnRef>
-              <a:fillRef idx="1">
-                <a:schemeClr val="accent1"/>
-              </a:fillRef>
-              <a:effectRef idx="0">
-                <a:schemeClr val="accent1"/>
-              </a:effectRef>
-              <a:fontRef idx="minor">
-                <a:schemeClr val="lt1"/>
-              </a:fontRef>
-            </p:style>
-            <p:txBody>
-              <a:bodyPr rtlCol="0" anchor="ctr"/>
-              <a:lstStyle/>
-              <a:p>
-                <a:pPr algn="ctr"/>
-                <a:endParaRPr lang="en-GB"/>
-              </a:p>
-            </p:txBody>
-          </p:sp>
-          <p:sp>
-            <p:nvSpPr>
-              <p:cNvPr id="224" name="Rectangle 223">
-                <a:extLst>
-                  <a:ext uri="{FF2B5EF4-FFF2-40B4-BE49-F238E27FC236}">
-                    <a16:creationId xmlns:a16="http://schemas.microsoft.com/office/drawing/2014/main" id="{57302CF9-2020-43E9-BFA8-0AFC9FA1BA15}"/>
-                  </a:ext>
-                </a:extLst>
-              </p:cNvPr>
-              <p:cNvSpPr/>
-              <p:nvPr/>
-            </p:nvSpPr>
-            <p:spPr>
-              <a:xfrm>
-                <a:off x="2591507" y="4885052"/>
-                <a:ext cx="180000" cy="108000"/>
-              </a:xfrm>
-              <a:prstGeom prst="rect">
-                <a:avLst/>
-              </a:prstGeom>
-              <a:solidFill>
-                <a:schemeClr val="accent2">
-                  <a:lumMod val="40000"/>
-                  <a:lumOff val="60000"/>
-                </a:schemeClr>
-              </a:solidFill>
-              <a:ln>
-                <a:noFill/>
-              </a:ln>
-            </p:spPr>
-            <p:style>
-              <a:lnRef idx="2">
-                <a:schemeClr val="accent1">
-                  <a:shade val="50000"/>
-                </a:schemeClr>
-              </a:lnRef>
-              <a:fillRef idx="1">
-                <a:schemeClr val="accent1"/>
-              </a:fillRef>
-              <a:effectRef idx="0">
-                <a:schemeClr val="accent1"/>
-              </a:effectRef>
-              <a:fontRef idx="minor">
-                <a:schemeClr val="lt1"/>
-              </a:fontRef>
-            </p:style>
-            <p:txBody>
-              <a:bodyPr rtlCol="0" anchor="ctr"/>
-              <a:lstStyle/>
-              <a:p>
-                <a:pPr algn="ctr"/>
-                <a:endParaRPr lang="en-GB"/>
-              </a:p>
-            </p:txBody>
-          </p:sp>
-          <p:sp>
-            <p:nvSpPr>
-              <p:cNvPr id="225" name="Rectangle 224">
-                <a:extLst>
-                  <a:ext uri="{FF2B5EF4-FFF2-40B4-BE49-F238E27FC236}">
-                    <a16:creationId xmlns:a16="http://schemas.microsoft.com/office/drawing/2014/main" id="{6887CF0C-BB5F-4719-B5AE-8A5F753733CD}"/>
-                  </a:ext>
-                </a:extLst>
-              </p:cNvPr>
-              <p:cNvSpPr/>
-              <p:nvPr/>
-            </p:nvSpPr>
-            <p:spPr>
-              <a:xfrm>
-                <a:off x="2591507" y="5060252"/>
-                <a:ext cx="180000" cy="108000"/>
-              </a:xfrm>
-              <a:prstGeom prst="rect">
-                <a:avLst/>
-              </a:prstGeom>
-              <a:solidFill>
-                <a:schemeClr val="accent2">
-                  <a:lumMod val="20000"/>
-                  <a:lumOff val="80000"/>
-                </a:schemeClr>
-              </a:solidFill>
-              <a:ln>
-                <a:noFill/>
-              </a:ln>
-            </p:spPr>
-            <p:style>
-              <a:lnRef idx="2">
-                <a:schemeClr val="accent1">
-                  <a:shade val="50000"/>
-                </a:schemeClr>
-              </a:lnRef>
-              <a:fillRef idx="1">
-                <a:schemeClr val="accent1"/>
-              </a:fillRef>
-              <a:effectRef idx="0">
-                <a:schemeClr val="accent1"/>
-              </a:effectRef>
-              <a:fontRef idx="minor">
-                <a:schemeClr val="lt1"/>
-              </a:fontRef>
-            </p:style>
-            <p:txBody>
-              <a:bodyPr rtlCol="0" anchor="ctr"/>
-              <a:lstStyle/>
-              <a:p>
-                <a:pPr algn="ctr"/>
-                <a:endParaRPr lang="en-GB"/>
-              </a:p>
-            </p:txBody>
-          </p:sp>
-          <p:sp>
-            <p:nvSpPr>
-              <p:cNvPr id="226" name="TextBox 225">
-                <a:extLst>
-                  <a:ext uri="{FF2B5EF4-FFF2-40B4-BE49-F238E27FC236}">
-                    <a16:creationId xmlns:a16="http://schemas.microsoft.com/office/drawing/2014/main" id="{CFFC4630-967F-4104-89A9-F630FDB76B6E}"/>
-                  </a:ext>
-                </a:extLst>
-              </p:cNvPr>
-              <p:cNvSpPr txBox="1"/>
-              <p:nvPr/>
-            </p:nvSpPr>
-            <p:spPr>
-              <a:xfrm>
-                <a:off x="2732593" y="5003168"/>
-                <a:ext cx="662232" cy="246221"/>
-              </a:xfrm>
-              <a:prstGeom prst="rect">
-                <a:avLst/>
-              </a:prstGeom>
-              <a:noFill/>
-            </p:spPr>
-            <p:txBody>
-              <a:bodyPr wrap="square" rtlCol="0">
-                <a:spAutoFit/>
-              </a:bodyPr>
-              <a:lstStyle/>
-              <a:p>
-                <a:r>
-                  <a:rPr lang="en-GB" sz="1000" dirty="0"/>
-                  <a:t>0 </a:t>
-                </a:r>
-                <a:r>
-                  <a:rPr lang="it-IT" sz="1000" dirty="0"/>
-                  <a:t>- 5</a:t>
-                </a:r>
-                <a:endParaRPr lang="en-GB" sz="1000" dirty="0"/>
-              </a:p>
-            </p:txBody>
-          </p:sp>
-          <p:sp>
-            <p:nvSpPr>
-              <p:cNvPr id="227" name="TextBox 226">
-                <a:extLst>
-                  <a:ext uri="{FF2B5EF4-FFF2-40B4-BE49-F238E27FC236}">
-                    <a16:creationId xmlns:a16="http://schemas.microsoft.com/office/drawing/2014/main" id="{0295C434-527B-4353-8CDB-6D8CE6363E97}"/>
-                  </a:ext>
-                </a:extLst>
-              </p:cNvPr>
-              <p:cNvSpPr txBox="1"/>
-              <p:nvPr/>
-            </p:nvSpPr>
-            <p:spPr>
-              <a:xfrm>
-                <a:off x="2732593" y="4808247"/>
-                <a:ext cx="662232" cy="246221"/>
-              </a:xfrm>
-              <a:prstGeom prst="rect">
-                <a:avLst/>
-              </a:prstGeom>
-              <a:noFill/>
-            </p:spPr>
-            <p:txBody>
-              <a:bodyPr wrap="square" rtlCol="0">
-                <a:spAutoFit/>
-              </a:bodyPr>
-              <a:lstStyle/>
-              <a:p>
-                <a:r>
-                  <a:rPr lang="it-IT" sz="1000" dirty="0"/>
-                  <a:t>5 - 10</a:t>
-                </a:r>
-                <a:endParaRPr lang="en-GB" sz="1000" dirty="0"/>
-              </a:p>
-            </p:txBody>
-          </p:sp>
-          <p:sp>
-            <p:nvSpPr>
-              <p:cNvPr id="228" name="TextBox 227">
-                <a:extLst>
-                  <a:ext uri="{FF2B5EF4-FFF2-40B4-BE49-F238E27FC236}">
-                    <a16:creationId xmlns:a16="http://schemas.microsoft.com/office/drawing/2014/main" id="{5349082E-00FB-48AF-A445-2B81D51E7764}"/>
-                  </a:ext>
-                </a:extLst>
-              </p:cNvPr>
-              <p:cNvSpPr txBox="1"/>
-              <p:nvPr/>
-            </p:nvSpPr>
-            <p:spPr>
-              <a:xfrm>
-                <a:off x="2732593" y="4633041"/>
-                <a:ext cx="662232" cy="246221"/>
-              </a:xfrm>
-              <a:prstGeom prst="rect">
-                <a:avLst/>
-              </a:prstGeom>
-              <a:noFill/>
-            </p:spPr>
-            <p:txBody>
-              <a:bodyPr wrap="square" rtlCol="0">
-                <a:spAutoFit/>
-              </a:bodyPr>
-              <a:lstStyle/>
-              <a:p>
-                <a:r>
-                  <a:rPr lang="it-IT" sz="1000" dirty="0"/>
-                  <a:t>10 - 15</a:t>
-                </a:r>
-              </a:p>
-            </p:txBody>
-          </p:sp>
-          <p:sp>
-            <p:nvSpPr>
-              <p:cNvPr id="229" name="TextBox 228">
-                <a:extLst>
-                  <a:ext uri="{FF2B5EF4-FFF2-40B4-BE49-F238E27FC236}">
-                    <a16:creationId xmlns:a16="http://schemas.microsoft.com/office/drawing/2014/main" id="{296C9E54-D41F-4866-B943-6C27979931F3}"/>
-                  </a:ext>
-                </a:extLst>
-              </p:cNvPr>
-              <p:cNvSpPr txBox="1"/>
-              <p:nvPr/>
-            </p:nvSpPr>
-            <p:spPr>
-              <a:xfrm>
-                <a:off x="2732593" y="4457835"/>
-                <a:ext cx="662232" cy="246221"/>
-              </a:xfrm>
-              <a:prstGeom prst="rect">
-                <a:avLst/>
-              </a:prstGeom>
-              <a:noFill/>
-            </p:spPr>
-            <p:txBody>
-              <a:bodyPr wrap="square" rtlCol="0">
-                <a:spAutoFit/>
-              </a:bodyPr>
-              <a:lstStyle/>
-              <a:p>
-                <a:r>
-                  <a:rPr lang="it-IT" sz="1000" dirty="0"/>
-                  <a:t>15 - 20</a:t>
-                </a:r>
-              </a:p>
-            </p:txBody>
-          </p:sp>
-          <p:sp>
-            <p:nvSpPr>
-              <p:cNvPr id="230" name="TextBox 229">
-                <a:extLst>
-                  <a:ext uri="{FF2B5EF4-FFF2-40B4-BE49-F238E27FC236}">
-                    <a16:creationId xmlns:a16="http://schemas.microsoft.com/office/drawing/2014/main" id="{5C5F7E5C-40D0-4404-AF79-EA2FE5BF9D29}"/>
-                  </a:ext>
-                </a:extLst>
-              </p:cNvPr>
-              <p:cNvSpPr txBox="1"/>
-              <p:nvPr/>
-            </p:nvSpPr>
-            <p:spPr>
-              <a:xfrm>
-                <a:off x="2732593" y="4282629"/>
-                <a:ext cx="662232" cy="246221"/>
-              </a:xfrm>
-              <a:prstGeom prst="rect">
-                <a:avLst/>
-              </a:prstGeom>
-              <a:noFill/>
-            </p:spPr>
-            <p:txBody>
-              <a:bodyPr wrap="square" rtlCol="0">
-                <a:spAutoFit/>
-              </a:bodyPr>
-              <a:lstStyle/>
-              <a:p>
-                <a:r>
-                  <a:rPr lang="it-IT" sz="1000" dirty="0"/>
-                  <a:t>20 - 30</a:t>
-                </a:r>
-              </a:p>
-            </p:txBody>
-          </p:sp>
-          <p:sp>
-            <p:nvSpPr>
-              <p:cNvPr id="231" name="TextBox 230">
-                <a:extLst>
-                  <a:ext uri="{FF2B5EF4-FFF2-40B4-BE49-F238E27FC236}">
-                    <a16:creationId xmlns:a16="http://schemas.microsoft.com/office/drawing/2014/main" id="{63EC534E-F923-4622-9FF7-0E86BB901474}"/>
-                  </a:ext>
-                </a:extLst>
-              </p:cNvPr>
-              <p:cNvSpPr txBox="1"/>
-              <p:nvPr/>
-            </p:nvSpPr>
-            <p:spPr>
-              <a:xfrm>
-                <a:off x="2732593" y="4107423"/>
-                <a:ext cx="662232" cy="246221"/>
-              </a:xfrm>
-              <a:prstGeom prst="rect">
-                <a:avLst/>
-              </a:prstGeom>
-              <a:noFill/>
-            </p:spPr>
-            <p:txBody>
-              <a:bodyPr wrap="square" rtlCol="0">
-                <a:spAutoFit/>
-              </a:bodyPr>
-              <a:lstStyle/>
-              <a:p>
-                <a:r>
-                  <a:rPr lang="it-IT" sz="1000" dirty="0"/>
-                  <a:t>30 - 40</a:t>
-                </a:r>
-              </a:p>
-            </p:txBody>
-          </p:sp>
-          <p:sp>
-            <p:nvSpPr>
-              <p:cNvPr id="232" name="TextBox 231">
-                <a:extLst>
-                  <a:ext uri="{FF2B5EF4-FFF2-40B4-BE49-F238E27FC236}">
-                    <a16:creationId xmlns:a16="http://schemas.microsoft.com/office/drawing/2014/main" id="{9E313F42-5E49-469A-A948-7A0F0CF048E0}"/>
-                  </a:ext>
-                </a:extLst>
-              </p:cNvPr>
-              <p:cNvSpPr txBox="1"/>
-              <p:nvPr/>
-            </p:nvSpPr>
-            <p:spPr>
-              <a:xfrm>
-                <a:off x="2732593" y="3932217"/>
-                <a:ext cx="662232" cy="246221"/>
-              </a:xfrm>
-              <a:prstGeom prst="rect">
-                <a:avLst/>
-              </a:prstGeom>
-              <a:noFill/>
-            </p:spPr>
-            <p:txBody>
-              <a:bodyPr wrap="square" rtlCol="0">
-                <a:spAutoFit/>
-              </a:bodyPr>
-              <a:lstStyle/>
-              <a:p>
-                <a:r>
-                  <a:rPr lang="it-IT" sz="1000" dirty="0"/>
-                  <a:t>40 - 50</a:t>
-                </a:r>
-              </a:p>
-            </p:txBody>
-          </p:sp>
-          <p:sp>
-            <p:nvSpPr>
-              <p:cNvPr id="233" name="TextBox 232">
-                <a:extLst>
-                  <a:ext uri="{FF2B5EF4-FFF2-40B4-BE49-F238E27FC236}">
-                    <a16:creationId xmlns:a16="http://schemas.microsoft.com/office/drawing/2014/main" id="{74AD475F-7786-49F6-9E62-AE6CE8B5626E}"/>
-                  </a:ext>
-                </a:extLst>
-              </p:cNvPr>
-              <p:cNvSpPr txBox="1"/>
-              <p:nvPr/>
-            </p:nvSpPr>
-            <p:spPr>
-              <a:xfrm>
-                <a:off x="2732593" y="3757011"/>
-                <a:ext cx="662232" cy="246221"/>
-              </a:xfrm>
-              <a:prstGeom prst="rect">
-                <a:avLst/>
-              </a:prstGeom>
-              <a:noFill/>
-            </p:spPr>
-            <p:txBody>
-              <a:bodyPr wrap="square" rtlCol="0">
-                <a:spAutoFit/>
-              </a:bodyPr>
-              <a:lstStyle/>
-              <a:p>
-                <a:r>
-                  <a:rPr lang="it-IT" sz="1000" dirty="0"/>
-                  <a:t>50 - 60</a:t>
-                </a:r>
-              </a:p>
-            </p:txBody>
-          </p:sp>
-          <p:sp>
-            <p:nvSpPr>
-              <p:cNvPr id="234" name="TextBox 233">
-                <a:extLst>
-                  <a:ext uri="{FF2B5EF4-FFF2-40B4-BE49-F238E27FC236}">
-                    <a16:creationId xmlns:a16="http://schemas.microsoft.com/office/drawing/2014/main" id="{1627617A-600F-4F7A-BAB6-B7CDB86FF983}"/>
-                  </a:ext>
-                </a:extLst>
-              </p:cNvPr>
-              <p:cNvSpPr txBox="1"/>
-              <p:nvPr/>
-            </p:nvSpPr>
-            <p:spPr>
-              <a:xfrm>
-                <a:off x="2732593" y="3581805"/>
-                <a:ext cx="662232" cy="246221"/>
-              </a:xfrm>
-              <a:prstGeom prst="rect">
-                <a:avLst/>
-              </a:prstGeom>
-              <a:noFill/>
-            </p:spPr>
-            <p:txBody>
-              <a:bodyPr wrap="square" rtlCol="0">
-                <a:spAutoFit/>
-              </a:bodyPr>
-              <a:lstStyle/>
-              <a:p>
-                <a:r>
-                  <a:rPr lang="it-IT" sz="1000" dirty="0"/>
-                  <a:t>60 - 70</a:t>
-                </a:r>
-              </a:p>
-            </p:txBody>
-          </p:sp>
-          <p:sp>
-            <p:nvSpPr>
-              <p:cNvPr id="235" name="TextBox 234">
-                <a:extLst>
-                  <a:ext uri="{FF2B5EF4-FFF2-40B4-BE49-F238E27FC236}">
-                    <a16:creationId xmlns:a16="http://schemas.microsoft.com/office/drawing/2014/main" id="{C5A772C7-BD7B-4F33-A8C5-7AFD50CFBEED}"/>
-                  </a:ext>
-                </a:extLst>
-              </p:cNvPr>
-              <p:cNvSpPr txBox="1"/>
-              <p:nvPr/>
-            </p:nvSpPr>
-            <p:spPr>
-              <a:xfrm>
-                <a:off x="2732593" y="3406599"/>
-                <a:ext cx="662232" cy="246221"/>
-              </a:xfrm>
-              <a:prstGeom prst="rect">
-                <a:avLst/>
-              </a:prstGeom>
-              <a:noFill/>
-            </p:spPr>
-            <p:txBody>
-              <a:bodyPr wrap="square" rtlCol="0">
-                <a:spAutoFit/>
-              </a:bodyPr>
-              <a:lstStyle/>
-              <a:p>
-                <a:r>
-                  <a:rPr lang="it-IT" sz="1000" dirty="0"/>
-                  <a:t>70 - 80</a:t>
-                </a:r>
-              </a:p>
-            </p:txBody>
-          </p:sp>
-          <p:sp>
-            <p:nvSpPr>
-              <p:cNvPr id="236" name="TextBox 235">
-                <a:extLst>
-                  <a:ext uri="{FF2B5EF4-FFF2-40B4-BE49-F238E27FC236}">
-                    <a16:creationId xmlns:a16="http://schemas.microsoft.com/office/drawing/2014/main" id="{2753D96C-C548-4F6B-9FEF-E3671AD7DF4D}"/>
-                  </a:ext>
-                </a:extLst>
-              </p:cNvPr>
-              <p:cNvSpPr txBox="1"/>
-              <p:nvPr/>
-            </p:nvSpPr>
-            <p:spPr>
-              <a:xfrm>
-                <a:off x="2732593" y="3231393"/>
-                <a:ext cx="662232" cy="246221"/>
-              </a:xfrm>
-              <a:prstGeom prst="rect">
-                <a:avLst/>
-              </a:prstGeom>
-              <a:noFill/>
-            </p:spPr>
-            <p:txBody>
-              <a:bodyPr wrap="square" rtlCol="0">
-                <a:spAutoFit/>
-              </a:bodyPr>
-              <a:lstStyle/>
-              <a:p>
-                <a:r>
-                  <a:rPr lang="it-IT" sz="1000" dirty="0"/>
-                  <a:t>80 - 90</a:t>
-                </a:r>
-              </a:p>
-            </p:txBody>
-          </p:sp>
-          <p:sp>
-            <p:nvSpPr>
-              <p:cNvPr id="237" name="TextBox 236">
-                <a:extLst>
-                  <a:ext uri="{FF2B5EF4-FFF2-40B4-BE49-F238E27FC236}">
-                    <a16:creationId xmlns:a16="http://schemas.microsoft.com/office/drawing/2014/main" id="{351D3152-4B07-403F-AB18-15453C394568}"/>
-                  </a:ext>
-                </a:extLst>
-              </p:cNvPr>
-              <p:cNvSpPr txBox="1"/>
-              <p:nvPr/>
-            </p:nvSpPr>
-            <p:spPr>
-              <a:xfrm>
-                <a:off x="2732593" y="3056187"/>
-                <a:ext cx="662232" cy="246221"/>
-              </a:xfrm>
-              <a:prstGeom prst="rect">
-                <a:avLst/>
-              </a:prstGeom>
-              <a:noFill/>
-            </p:spPr>
-            <p:txBody>
-              <a:bodyPr wrap="square" rtlCol="0">
-                <a:spAutoFit/>
-              </a:bodyPr>
-              <a:lstStyle/>
-              <a:p>
-                <a:r>
-                  <a:rPr lang="it-IT" sz="1000" dirty="0"/>
-                  <a:t>90 - 100</a:t>
-                </a:r>
-              </a:p>
-            </p:txBody>
-          </p:sp>
-          <p:sp>
-            <p:nvSpPr>
-              <p:cNvPr id="238" name="TextBox 237">
-                <a:extLst>
-                  <a:ext uri="{FF2B5EF4-FFF2-40B4-BE49-F238E27FC236}">
-                    <a16:creationId xmlns:a16="http://schemas.microsoft.com/office/drawing/2014/main" id="{E513ECF2-B1B0-4717-88AD-F47013290A09}"/>
-                  </a:ext>
-                </a:extLst>
-              </p:cNvPr>
-              <p:cNvSpPr txBox="1"/>
-              <p:nvPr/>
-            </p:nvSpPr>
-            <p:spPr>
-              <a:xfrm>
-                <a:off x="2732593" y="2880981"/>
-                <a:ext cx="854004" cy="246221"/>
-              </a:xfrm>
-              <a:prstGeom prst="rect">
-                <a:avLst/>
-              </a:prstGeom>
-              <a:noFill/>
-            </p:spPr>
-            <p:txBody>
-              <a:bodyPr wrap="square" rtlCol="0">
-                <a:spAutoFit/>
-              </a:bodyPr>
-              <a:lstStyle/>
-              <a:p>
-                <a:r>
-                  <a:rPr lang="it-IT" sz="1000" dirty="0"/>
-                  <a:t>100 - 200</a:t>
-                </a:r>
-              </a:p>
-            </p:txBody>
-          </p:sp>
-          <p:sp>
-            <p:nvSpPr>
-              <p:cNvPr id="239" name="TextBox 238">
-                <a:extLst>
-                  <a:ext uri="{FF2B5EF4-FFF2-40B4-BE49-F238E27FC236}">
-                    <a16:creationId xmlns:a16="http://schemas.microsoft.com/office/drawing/2014/main" id="{3F1FE446-17CF-46EE-8429-1A5638B6F722}"/>
-                  </a:ext>
-                </a:extLst>
-              </p:cNvPr>
-              <p:cNvSpPr txBox="1"/>
-              <p:nvPr/>
-            </p:nvSpPr>
-            <p:spPr>
-              <a:xfrm>
-                <a:off x="2732593" y="2705775"/>
-                <a:ext cx="854004" cy="246221"/>
-              </a:xfrm>
-              <a:prstGeom prst="rect">
-                <a:avLst/>
-              </a:prstGeom>
-              <a:noFill/>
-            </p:spPr>
-            <p:txBody>
-              <a:bodyPr wrap="square" rtlCol="0">
-                <a:spAutoFit/>
-              </a:bodyPr>
-              <a:lstStyle/>
-              <a:p>
-                <a:r>
-                  <a:rPr lang="it-IT" sz="1000" dirty="0"/>
-                  <a:t>200 - 300</a:t>
-                </a:r>
-              </a:p>
-            </p:txBody>
-          </p:sp>
-          <p:sp>
-            <p:nvSpPr>
-              <p:cNvPr id="240" name="TextBox 239">
-                <a:extLst>
-                  <a:ext uri="{FF2B5EF4-FFF2-40B4-BE49-F238E27FC236}">
-                    <a16:creationId xmlns:a16="http://schemas.microsoft.com/office/drawing/2014/main" id="{566D3A46-294E-4EE1-B817-42801BD3AF22}"/>
-                  </a:ext>
-                </a:extLst>
-              </p:cNvPr>
-              <p:cNvSpPr txBox="1"/>
-              <p:nvPr/>
-            </p:nvSpPr>
-            <p:spPr>
-              <a:xfrm>
-                <a:off x="2732593" y="2530569"/>
-                <a:ext cx="854004" cy="246221"/>
-              </a:xfrm>
-              <a:prstGeom prst="rect">
-                <a:avLst/>
-              </a:prstGeom>
-              <a:noFill/>
-            </p:spPr>
-            <p:txBody>
-              <a:bodyPr wrap="square" rtlCol="0">
-                <a:spAutoFit/>
-              </a:bodyPr>
-              <a:lstStyle/>
-              <a:p>
-                <a:r>
-                  <a:rPr lang="it-IT" sz="1000" dirty="0"/>
-                  <a:t>300 - 400</a:t>
-                </a:r>
-              </a:p>
-            </p:txBody>
-          </p:sp>
-          <p:sp>
-            <p:nvSpPr>
-              <p:cNvPr id="241" name="Rectangle 240">
-                <a:extLst>
-                  <a:ext uri="{FF2B5EF4-FFF2-40B4-BE49-F238E27FC236}">
-                    <a16:creationId xmlns:a16="http://schemas.microsoft.com/office/drawing/2014/main" id="{8F63F9D6-66A3-4A36-9C6F-7971C5E18357}"/>
-                  </a:ext>
-                </a:extLst>
-              </p:cNvPr>
-              <p:cNvSpPr/>
-              <p:nvPr/>
-            </p:nvSpPr>
-            <p:spPr>
-              <a:xfrm>
-                <a:off x="2591507" y="4359434"/>
-                <a:ext cx="180000" cy="108000"/>
-              </a:xfrm>
-              <a:prstGeom prst="rect">
-                <a:avLst/>
-              </a:prstGeom>
-              <a:solidFill>
-                <a:srgbClr val="F0904E"/>
-              </a:solidFill>
-              <a:ln>
-                <a:noFill/>
-              </a:ln>
-            </p:spPr>
-            <p:style>
-              <a:lnRef idx="2">
-                <a:schemeClr val="accent1">
-                  <a:shade val="50000"/>
-                </a:schemeClr>
-              </a:lnRef>
-              <a:fillRef idx="1">
-                <a:schemeClr val="accent1"/>
-              </a:fillRef>
-              <a:effectRef idx="0">
-                <a:schemeClr val="accent1"/>
-              </a:effectRef>
-              <a:fontRef idx="minor">
-                <a:schemeClr val="lt1"/>
-              </a:fontRef>
-            </p:style>
-            <p:txBody>
-              <a:bodyPr rtlCol="0" anchor="ctr"/>
-              <a:lstStyle/>
-              <a:p>
-                <a:pPr algn="ctr"/>
-                <a:endParaRPr lang="en-GB" dirty="0"/>
-              </a:p>
-            </p:txBody>
-          </p:sp>
-          <p:sp>
-            <p:nvSpPr>
-              <p:cNvPr id="242" name="Rectangle 241">
-                <a:extLst>
-                  <a:ext uri="{FF2B5EF4-FFF2-40B4-BE49-F238E27FC236}">
-                    <a16:creationId xmlns:a16="http://schemas.microsoft.com/office/drawing/2014/main" id="{201251B4-7C06-42E4-A62E-253B03FE3984}"/>
-                  </a:ext>
-                </a:extLst>
-              </p:cNvPr>
-              <p:cNvSpPr/>
-              <p:nvPr/>
-            </p:nvSpPr>
-            <p:spPr>
-              <a:xfrm>
-                <a:off x="2591507" y="4184228"/>
-                <a:ext cx="180000" cy="108000"/>
-              </a:xfrm>
-              <a:prstGeom prst="rect">
-                <a:avLst/>
-              </a:prstGeom>
-              <a:solidFill>
-                <a:srgbClr val="ED7C2F"/>
-              </a:solidFill>
-              <a:ln>
-                <a:noFill/>
-              </a:ln>
-            </p:spPr>
-            <p:style>
-              <a:lnRef idx="2">
-                <a:schemeClr val="accent1">
-                  <a:shade val="50000"/>
-                </a:schemeClr>
-              </a:lnRef>
-              <a:fillRef idx="1">
-                <a:schemeClr val="accent1"/>
-              </a:fillRef>
-              <a:effectRef idx="0">
-                <a:schemeClr val="accent1"/>
-              </a:effectRef>
-              <a:fontRef idx="minor">
-                <a:schemeClr val="lt1"/>
-              </a:fontRef>
-            </p:style>
-            <p:txBody>
-              <a:bodyPr rtlCol="0" anchor="ctr"/>
-              <a:lstStyle/>
-              <a:p>
-                <a:pPr algn="ctr"/>
-                <a:endParaRPr lang="en-GB"/>
-              </a:p>
-            </p:txBody>
-          </p:sp>
-          <p:sp>
-            <p:nvSpPr>
-              <p:cNvPr id="243" name="Rectangle 242">
-                <a:extLst>
-                  <a:ext uri="{FF2B5EF4-FFF2-40B4-BE49-F238E27FC236}">
-                    <a16:creationId xmlns:a16="http://schemas.microsoft.com/office/drawing/2014/main" id="{E802D561-41B4-471D-85A5-933FE50FC47E}"/>
-                  </a:ext>
-                </a:extLst>
-              </p:cNvPr>
-              <p:cNvSpPr/>
-              <p:nvPr/>
-            </p:nvSpPr>
-            <p:spPr>
-              <a:xfrm>
-                <a:off x="2591507" y="4009022"/>
-                <a:ext cx="180000" cy="108000"/>
-              </a:xfrm>
-              <a:prstGeom prst="rect">
-                <a:avLst/>
-              </a:prstGeom>
-              <a:solidFill>
-                <a:srgbClr val="E66914"/>
-              </a:solidFill>
-              <a:ln>
-                <a:noFill/>
-              </a:ln>
-            </p:spPr>
-            <p:style>
-              <a:lnRef idx="2">
-                <a:schemeClr val="accent1">
-                  <a:shade val="50000"/>
-                </a:schemeClr>
-              </a:lnRef>
-              <a:fillRef idx="1">
-                <a:schemeClr val="accent1"/>
-              </a:fillRef>
-              <a:effectRef idx="0">
-                <a:schemeClr val="accent1"/>
-              </a:effectRef>
-              <a:fontRef idx="minor">
-                <a:schemeClr val="lt1"/>
-              </a:fontRef>
-            </p:style>
-            <p:txBody>
-              <a:bodyPr rtlCol="0" anchor="ctr"/>
-              <a:lstStyle/>
-              <a:p>
-                <a:pPr algn="ctr"/>
-                <a:endParaRPr lang="en-GB"/>
-              </a:p>
-            </p:txBody>
-          </p:sp>
-          <p:sp>
-            <p:nvSpPr>
-              <p:cNvPr id="244" name="Rectangle 243">
-                <a:extLst>
-                  <a:ext uri="{FF2B5EF4-FFF2-40B4-BE49-F238E27FC236}">
-                    <a16:creationId xmlns:a16="http://schemas.microsoft.com/office/drawing/2014/main" id="{07C784B3-AB3E-473A-9FB9-E21961807D25}"/>
-                  </a:ext>
-                </a:extLst>
-              </p:cNvPr>
-              <p:cNvSpPr/>
-              <p:nvPr/>
-            </p:nvSpPr>
-            <p:spPr>
-              <a:xfrm>
-                <a:off x="2591507" y="3833816"/>
-                <a:ext cx="180000" cy="108000"/>
-              </a:xfrm>
-              <a:prstGeom prst="rect">
-                <a:avLst/>
-              </a:prstGeom>
-              <a:solidFill>
-                <a:srgbClr val="D46112"/>
-              </a:solidFill>
-              <a:ln>
-                <a:noFill/>
-              </a:ln>
-            </p:spPr>
-            <p:style>
-              <a:lnRef idx="2">
-                <a:schemeClr val="accent1">
-                  <a:shade val="50000"/>
-                </a:schemeClr>
-              </a:lnRef>
-              <a:fillRef idx="1">
-                <a:schemeClr val="accent1"/>
-              </a:fillRef>
-              <a:effectRef idx="0">
-                <a:schemeClr val="accent1"/>
-              </a:effectRef>
-              <a:fontRef idx="minor">
-                <a:schemeClr val="lt1"/>
-              </a:fontRef>
-            </p:style>
-            <p:txBody>
-              <a:bodyPr rtlCol="0" anchor="ctr"/>
-              <a:lstStyle/>
-              <a:p>
-                <a:pPr algn="ctr"/>
-                <a:endParaRPr lang="en-GB"/>
-              </a:p>
-            </p:txBody>
-          </p:sp>
-          <p:sp>
-            <p:nvSpPr>
-              <p:cNvPr id="245" name="Rectangle 244">
-                <a:extLst>
-                  <a:ext uri="{FF2B5EF4-FFF2-40B4-BE49-F238E27FC236}">
-                    <a16:creationId xmlns:a16="http://schemas.microsoft.com/office/drawing/2014/main" id="{824D9C1F-D9EE-4DF1-AF60-10129CC8BAF2}"/>
-                  </a:ext>
-                </a:extLst>
-              </p:cNvPr>
-              <p:cNvSpPr/>
-              <p:nvPr/>
-            </p:nvSpPr>
-            <p:spPr>
-              <a:xfrm>
-                <a:off x="2591507" y="3658610"/>
-                <a:ext cx="180000" cy="108000"/>
-              </a:xfrm>
-              <a:prstGeom prst="rect">
-                <a:avLst/>
-              </a:prstGeom>
-              <a:solidFill>
-                <a:srgbClr val="C25810"/>
-              </a:solidFill>
-              <a:ln>
-                <a:noFill/>
-              </a:ln>
-            </p:spPr>
-            <p:style>
-              <a:lnRef idx="2">
-                <a:schemeClr val="accent1">
-                  <a:shade val="50000"/>
-                </a:schemeClr>
-              </a:lnRef>
-              <a:fillRef idx="1">
-                <a:schemeClr val="accent1"/>
-              </a:fillRef>
-              <a:effectRef idx="0">
-                <a:schemeClr val="accent1"/>
-              </a:effectRef>
-              <a:fontRef idx="minor">
-                <a:schemeClr val="lt1"/>
-              </a:fontRef>
-            </p:style>
-            <p:txBody>
-              <a:bodyPr rtlCol="0" anchor="ctr"/>
-              <a:lstStyle/>
-              <a:p>
-                <a:pPr algn="ctr"/>
-                <a:endParaRPr lang="en-GB"/>
-              </a:p>
-            </p:txBody>
-          </p:sp>
-          <p:sp>
-            <p:nvSpPr>
-              <p:cNvPr id="246" name="Rectangle 245">
-                <a:extLst>
-                  <a:ext uri="{FF2B5EF4-FFF2-40B4-BE49-F238E27FC236}">
-                    <a16:creationId xmlns:a16="http://schemas.microsoft.com/office/drawing/2014/main" id="{E480BB1F-BA13-461B-A8C7-13AFC5B59CD8}"/>
-                  </a:ext>
-                </a:extLst>
-              </p:cNvPr>
-              <p:cNvSpPr/>
-              <p:nvPr/>
-            </p:nvSpPr>
-            <p:spPr>
-              <a:xfrm>
-                <a:off x="2591507" y="3483404"/>
-                <a:ext cx="180000" cy="108000"/>
-              </a:xfrm>
-              <a:prstGeom prst="rect">
-                <a:avLst/>
-              </a:prstGeom>
-              <a:solidFill>
-                <a:srgbClr val="AE4F0E"/>
-              </a:solidFill>
-              <a:ln>
-                <a:noFill/>
-              </a:ln>
-            </p:spPr>
-            <p:style>
-              <a:lnRef idx="2">
-                <a:schemeClr val="accent1">
-                  <a:shade val="50000"/>
-                </a:schemeClr>
-              </a:lnRef>
-              <a:fillRef idx="1">
-                <a:schemeClr val="accent1"/>
-              </a:fillRef>
-              <a:effectRef idx="0">
-                <a:schemeClr val="accent1"/>
-              </a:effectRef>
-              <a:fontRef idx="minor">
-                <a:schemeClr val="lt1"/>
-              </a:fontRef>
-            </p:style>
-            <p:txBody>
-              <a:bodyPr rtlCol="0" anchor="ctr"/>
-              <a:lstStyle/>
-              <a:p>
-                <a:pPr algn="ctr"/>
-                <a:endParaRPr lang="en-GB"/>
-              </a:p>
-            </p:txBody>
-          </p:sp>
-          <p:sp>
-            <p:nvSpPr>
-              <p:cNvPr id="247" name="Rectangle 246">
-                <a:extLst>
-                  <a:ext uri="{FF2B5EF4-FFF2-40B4-BE49-F238E27FC236}">
-                    <a16:creationId xmlns:a16="http://schemas.microsoft.com/office/drawing/2014/main" id="{287DA8F9-ABA4-4286-8036-64D53844F9F3}"/>
-                  </a:ext>
-                </a:extLst>
-              </p:cNvPr>
-              <p:cNvSpPr/>
-              <p:nvPr/>
-            </p:nvSpPr>
-            <p:spPr>
-              <a:xfrm>
-                <a:off x="2591507" y="3308198"/>
-                <a:ext cx="180000" cy="108000"/>
-              </a:xfrm>
-              <a:prstGeom prst="rect">
-                <a:avLst/>
-              </a:prstGeom>
-              <a:solidFill>
-                <a:srgbClr val="9B460D"/>
-              </a:solidFill>
-              <a:ln>
-                <a:noFill/>
-              </a:ln>
-            </p:spPr>
-            <p:style>
-              <a:lnRef idx="2">
-                <a:schemeClr val="accent1">
-                  <a:shade val="50000"/>
-                </a:schemeClr>
-              </a:lnRef>
-              <a:fillRef idx="1">
-                <a:schemeClr val="accent1"/>
-              </a:fillRef>
-              <a:effectRef idx="0">
-                <a:schemeClr val="accent1"/>
-              </a:effectRef>
-              <a:fontRef idx="minor">
-                <a:schemeClr val="lt1"/>
-              </a:fontRef>
-            </p:style>
-            <p:txBody>
-              <a:bodyPr rtlCol="0" anchor="ctr"/>
-              <a:lstStyle/>
-              <a:p>
-                <a:pPr algn="ctr"/>
-                <a:endParaRPr lang="en-GB"/>
-              </a:p>
-            </p:txBody>
-          </p:sp>
-          <p:sp>
-            <p:nvSpPr>
-              <p:cNvPr id="248" name="Rectangle 247">
-                <a:extLst>
-                  <a:ext uri="{FF2B5EF4-FFF2-40B4-BE49-F238E27FC236}">
-                    <a16:creationId xmlns:a16="http://schemas.microsoft.com/office/drawing/2014/main" id="{0D48C767-FDAF-467B-8268-F4A8966041C4}"/>
-                  </a:ext>
-                </a:extLst>
-              </p:cNvPr>
-              <p:cNvSpPr/>
-              <p:nvPr/>
-            </p:nvSpPr>
-            <p:spPr>
-              <a:xfrm>
-                <a:off x="2591507" y="3132992"/>
-                <a:ext cx="180000" cy="108000"/>
-              </a:xfrm>
-              <a:prstGeom prst="rect">
-                <a:avLst/>
-              </a:prstGeom>
-              <a:solidFill>
-                <a:srgbClr val="8B3F0B"/>
-              </a:solidFill>
-              <a:ln>
-                <a:noFill/>
-              </a:ln>
-            </p:spPr>
-            <p:style>
-              <a:lnRef idx="2">
-                <a:schemeClr val="accent1">
-                  <a:shade val="50000"/>
-                </a:schemeClr>
-              </a:lnRef>
-              <a:fillRef idx="1">
-                <a:schemeClr val="accent1"/>
-              </a:fillRef>
-              <a:effectRef idx="0">
-                <a:schemeClr val="accent1"/>
-              </a:effectRef>
-              <a:fontRef idx="minor">
-                <a:schemeClr val="lt1"/>
-              </a:fontRef>
-            </p:style>
-            <p:txBody>
-              <a:bodyPr rtlCol="0" anchor="ctr"/>
-              <a:lstStyle/>
-              <a:p>
-                <a:pPr algn="ctr"/>
-                <a:endParaRPr lang="en-GB"/>
-              </a:p>
-            </p:txBody>
-          </p:sp>
-          <p:sp>
-            <p:nvSpPr>
-              <p:cNvPr id="249" name="Rectangle 248">
-                <a:extLst>
-                  <a:ext uri="{FF2B5EF4-FFF2-40B4-BE49-F238E27FC236}">
-                    <a16:creationId xmlns:a16="http://schemas.microsoft.com/office/drawing/2014/main" id="{882D3E31-1579-48DB-9AC8-1C207822207C}"/>
-                  </a:ext>
-                </a:extLst>
-              </p:cNvPr>
-              <p:cNvSpPr/>
-              <p:nvPr/>
-            </p:nvSpPr>
-            <p:spPr>
-              <a:xfrm>
-                <a:off x="2591507" y="2957786"/>
-                <a:ext cx="180000" cy="108000"/>
-              </a:xfrm>
-              <a:prstGeom prst="rect">
-                <a:avLst/>
-              </a:prstGeom>
-              <a:solidFill>
-                <a:srgbClr val="803A0A"/>
-              </a:solidFill>
-              <a:ln>
-                <a:noFill/>
-              </a:ln>
-            </p:spPr>
-            <p:style>
-              <a:lnRef idx="2">
-                <a:schemeClr val="accent1">
-                  <a:shade val="50000"/>
-                </a:schemeClr>
-              </a:lnRef>
-              <a:fillRef idx="1">
-                <a:schemeClr val="accent1"/>
-              </a:fillRef>
-              <a:effectRef idx="0">
-                <a:schemeClr val="accent1"/>
-              </a:effectRef>
-              <a:fontRef idx="minor">
-                <a:schemeClr val="lt1"/>
-              </a:fontRef>
-            </p:style>
-            <p:txBody>
-              <a:bodyPr rtlCol="0" anchor="ctr"/>
-              <a:lstStyle/>
-              <a:p>
-                <a:pPr algn="ctr"/>
-                <a:endParaRPr lang="en-GB"/>
-              </a:p>
-            </p:txBody>
-          </p:sp>
-          <p:sp>
-            <p:nvSpPr>
-              <p:cNvPr id="250" name="Rectangle 249">
-                <a:extLst>
-                  <a:ext uri="{FF2B5EF4-FFF2-40B4-BE49-F238E27FC236}">
-                    <a16:creationId xmlns:a16="http://schemas.microsoft.com/office/drawing/2014/main" id="{AA53A63A-4527-4F93-835F-59103D082DD9}"/>
-                  </a:ext>
-                </a:extLst>
-              </p:cNvPr>
-              <p:cNvSpPr/>
-              <p:nvPr/>
-            </p:nvSpPr>
-            <p:spPr>
-              <a:xfrm>
-                <a:off x="2591507" y="2782580"/>
-                <a:ext cx="180000" cy="108000"/>
-              </a:xfrm>
-              <a:prstGeom prst="rect">
-                <a:avLst/>
-              </a:prstGeom>
-              <a:solidFill>
-                <a:srgbClr val="682F08"/>
-              </a:solidFill>
-              <a:ln>
-                <a:noFill/>
-              </a:ln>
-            </p:spPr>
-            <p:style>
-              <a:lnRef idx="2">
-                <a:schemeClr val="accent1">
-                  <a:shade val="50000"/>
-                </a:schemeClr>
-              </a:lnRef>
-              <a:fillRef idx="1">
-                <a:schemeClr val="accent1"/>
-              </a:fillRef>
-              <a:effectRef idx="0">
-                <a:schemeClr val="accent1"/>
-              </a:effectRef>
-              <a:fontRef idx="minor">
-                <a:schemeClr val="lt1"/>
-              </a:fontRef>
-            </p:style>
-            <p:txBody>
-              <a:bodyPr rtlCol="0" anchor="ctr"/>
-              <a:lstStyle/>
-              <a:p>
-                <a:pPr algn="ctr"/>
-                <a:endParaRPr lang="en-GB"/>
-              </a:p>
-            </p:txBody>
-          </p:sp>
-          <p:sp>
-            <p:nvSpPr>
-              <p:cNvPr id="251" name="Rectangle 250">
-                <a:extLst>
-                  <a:ext uri="{FF2B5EF4-FFF2-40B4-BE49-F238E27FC236}">
-                    <a16:creationId xmlns:a16="http://schemas.microsoft.com/office/drawing/2014/main" id="{3E3616AF-3D42-45D3-9FF5-566A874A0276}"/>
-                  </a:ext>
-                </a:extLst>
-              </p:cNvPr>
-              <p:cNvSpPr/>
-              <p:nvPr/>
-            </p:nvSpPr>
-            <p:spPr>
-              <a:xfrm>
-                <a:off x="2591507" y="2607374"/>
-                <a:ext cx="180000" cy="108000"/>
-              </a:xfrm>
-              <a:prstGeom prst="rect">
-                <a:avLst/>
-              </a:prstGeom>
-              <a:solidFill>
-                <a:srgbClr val="411D05"/>
-              </a:solidFill>
-              <a:ln>
-                <a:noFill/>
-              </a:ln>
-            </p:spPr>
-            <p:style>
-              <a:lnRef idx="2">
-                <a:schemeClr val="accent1">
-                  <a:shade val="50000"/>
-                </a:schemeClr>
-              </a:lnRef>
-              <a:fillRef idx="1">
-                <a:schemeClr val="accent1"/>
-              </a:fillRef>
-              <a:effectRef idx="0">
-                <a:schemeClr val="accent1"/>
-              </a:effectRef>
-              <a:fontRef idx="minor">
-                <a:schemeClr val="lt1"/>
-              </a:fontRef>
-            </p:style>
-            <p:txBody>
-              <a:bodyPr rtlCol="0" anchor="ctr"/>
-              <a:lstStyle/>
-              <a:p>
-                <a:pPr algn="ctr"/>
-                <a:endParaRPr lang="en-GB"/>
-              </a:p>
-            </p:txBody>
-          </p:sp>
-          <p:sp>
-            <p:nvSpPr>
-              <p:cNvPr id="252" name="TextBox 251">
-                <a:extLst>
-                  <a:ext uri="{FF2B5EF4-FFF2-40B4-BE49-F238E27FC236}">
-                    <a16:creationId xmlns:a16="http://schemas.microsoft.com/office/drawing/2014/main" id="{51DAC668-8AB1-4901-A419-D6ACE3879328}"/>
-                  </a:ext>
-                </a:extLst>
-              </p:cNvPr>
-              <p:cNvSpPr txBox="1"/>
-              <p:nvPr/>
-            </p:nvSpPr>
-            <p:spPr>
-              <a:xfrm rot="16200000">
-                <a:off x="2123803" y="3764705"/>
-                <a:ext cx="2569537" cy="246221"/>
-              </a:xfrm>
-              <a:prstGeom prst="rect">
-                <a:avLst/>
-              </a:prstGeom>
-              <a:noFill/>
-            </p:spPr>
-            <p:txBody>
-              <a:bodyPr wrap="square" rtlCol="0">
-                <a:spAutoFit/>
-              </a:bodyPr>
-              <a:lstStyle/>
-              <a:p>
-                <a:pPr algn="ctr"/>
-                <a:r>
-                  <a:rPr lang="it-IT" sz="1000" dirty="0"/>
-                  <a:t>[</a:t>
-                </a:r>
-                <a:r>
-                  <a:rPr lang="en-GB" sz="1000" dirty="0"/>
-                  <a:t>people</a:t>
-                </a:r>
-                <a:r>
-                  <a:rPr lang="it-IT" sz="1000" dirty="0"/>
-                  <a:t>/km2]</a:t>
-                </a:r>
-              </a:p>
-            </p:txBody>
-          </p:sp>
-        </p:grpSp>
-        <p:pic>
-          <p:nvPicPr>
-            <p:cNvPr id="196" name="Picture 195" descr="Map&#10;&#10;Description automatically generated">
-              <a:extLst>
-                <a:ext uri="{FF2B5EF4-FFF2-40B4-BE49-F238E27FC236}">
-                  <a16:creationId xmlns:a16="http://schemas.microsoft.com/office/drawing/2014/main" id="{B58C8CEE-863D-4AF5-944A-06815392DD64}"/>
-                </a:ext>
-              </a:extLst>
-            </p:cNvPr>
-            <p:cNvPicPr>
-              <a:picLocks noChangeAspect="1"/>
-            </p:cNvPicPr>
-            <p:nvPr/>
-          </p:nvPicPr>
-          <p:blipFill>
-            <a:blip r:embed="rId5">
-              <a:extLst>
-                <a:ext uri="{28A0092B-C50C-407E-A947-70E740481C1C}">
-                  <a14:useLocalDpi xmlns:a14="http://schemas.microsoft.com/office/drawing/2010/main" val="0"/>
-                </a:ext>
-              </a:extLst>
-            </a:blip>
-            <a:stretch>
-              <a:fillRect/>
-            </a:stretch>
-          </p:blipFill>
+          </p:nvSpPr>
           <p:spPr>
             <a:xfrm>
-              <a:off x="3223778" y="8905644"/>
-              <a:ext cx="2301407" cy="2565205"/>
+              <a:off x="2591507" y="4534640"/>
+              <a:ext cx="180000" cy="108000"/>
             </a:xfrm>
             <a:prstGeom prst="rect">
               <a:avLst/>
             </a:prstGeom>
+            <a:solidFill>
+              <a:srgbClr val="F2A068"/>
+            </a:solidFill>
             <a:ln>
-              <a:solidFill>
-                <a:schemeClr val="tx1"/>
-              </a:solidFill>
+              <a:noFill/>
             </a:ln>
           </p:spPr>
-        </p:pic>
+          <p:style>
+            <a:lnRef idx="2">
+              <a:schemeClr val="accent1">
+                <a:shade val="50000"/>
+              </a:schemeClr>
+            </a:lnRef>
+            <a:fillRef idx="1">
+              <a:schemeClr val="accent1"/>
+            </a:fillRef>
+            <a:effectRef idx="0">
+              <a:schemeClr val="accent1"/>
+            </a:effectRef>
+            <a:fontRef idx="minor">
+              <a:schemeClr val="lt1"/>
+            </a:fontRef>
+          </p:style>
+          <p:txBody>
+            <a:bodyPr rtlCol="0" anchor="ctr"/>
+            <a:lstStyle/>
+            <a:p>
+              <a:pPr algn="ctr"/>
+              <a:endParaRPr lang="en-GB"/>
+            </a:p>
+          </p:txBody>
+        </p:sp>
         <p:sp>
           <p:nvSpPr>
-            <p:cNvPr id="197" name="TextBox 196">
+            <p:cNvPr id="223" name="Rectangle 222">
               <a:extLst>
                 <a:ext uri="{FF2B5EF4-FFF2-40B4-BE49-F238E27FC236}">
-                  <a16:creationId xmlns:a16="http://schemas.microsoft.com/office/drawing/2014/main" id="{A122E27E-B89D-4646-A9C8-604EA8A20BBC}"/>
+                  <a16:creationId xmlns:a16="http://schemas.microsoft.com/office/drawing/2014/main" id="{D3F44C70-0A1D-4151-B5A4-F93331386FEF}"/>
+                </a:ext>
+              </a:extLst>
+            </p:cNvPr>
+            <p:cNvSpPr/>
+            <p:nvPr/>
+          </p:nvSpPr>
+          <p:spPr>
+            <a:xfrm>
+              <a:off x="2591507" y="4709846"/>
+              <a:ext cx="180000" cy="108000"/>
+            </a:xfrm>
+            <a:prstGeom prst="rect">
+              <a:avLst/>
+            </a:prstGeom>
+            <a:solidFill>
+              <a:schemeClr val="accent2">
+                <a:lumMod val="60000"/>
+                <a:lumOff val="40000"/>
+              </a:schemeClr>
+            </a:solidFill>
+            <a:ln>
+              <a:noFill/>
+            </a:ln>
+          </p:spPr>
+          <p:style>
+            <a:lnRef idx="2">
+              <a:schemeClr val="accent1">
+                <a:shade val="50000"/>
+              </a:schemeClr>
+            </a:lnRef>
+            <a:fillRef idx="1">
+              <a:schemeClr val="accent1"/>
+            </a:fillRef>
+            <a:effectRef idx="0">
+              <a:schemeClr val="accent1"/>
+            </a:effectRef>
+            <a:fontRef idx="minor">
+              <a:schemeClr val="lt1"/>
+            </a:fontRef>
+          </p:style>
+          <p:txBody>
+            <a:bodyPr rtlCol="0" anchor="ctr"/>
+            <a:lstStyle/>
+            <a:p>
+              <a:pPr algn="ctr"/>
+              <a:endParaRPr lang="en-GB"/>
+            </a:p>
+          </p:txBody>
+        </p:sp>
+        <p:sp>
+          <p:nvSpPr>
+            <p:cNvPr id="224" name="Rectangle 223">
+              <a:extLst>
+                <a:ext uri="{FF2B5EF4-FFF2-40B4-BE49-F238E27FC236}">
+                  <a16:creationId xmlns:a16="http://schemas.microsoft.com/office/drawing/2014/main" id="{57302CF9-2020-43E9-BFA8-0AFC9FA1BA15}"/>
+                </a:ext>
+              </a:extLst>
+            </p:cNvPr>
+            <p:cNvSpPr/>
+            <p:nvPr/>
+          </p:nvSpPr>
+          <p:spPr>
+            <a:xfrm>
+              <a:off x="2591507" y="4885052"/>
+              <a:ext cx="180000" cy="108000"/>
+            </a:xfrm>
+            <a:prstGeom prst="rect">
+              <a:avLst/>
+            </a:prstGeom>
+            <a:solidFill>
+              <a:schemeClr val="accent2">
+                <a:lumMod val="40000"/>
+                <a:lumOff val="60000"/>
+              </a:schemeClr>
+            </a:solidFill>
+            <a:ln>
+              <a:noFill/>
+            </a:ln>
+          </p:spPr>
+          <p:style>
+            <a:lnRef idx="2">
+              <a:schemeClr val="accent1">
+                <a:shade val="50000"/>
+              </a:schemeClr>
+            </a:lnRef>
+            <a:fillRef idx="1">
+              <a:schemeClr val="accent1"/>
+            </a:fillRef>
+            <a:effectRef idx="0">
+              <a:schemeClr val="accent1"/>
+            </a:effectRef>
+            <a:fontRef idx="minor">
+              <a:schemeClr val="lt1"/>
+            </a:fontRef>
+          </p:style>
+          <p:txBody>
+            <a:bodyPr rtlCol="0" anchor="ctr"/>
+            <a:lstStyle/>
+            <a:p>
+              <a:pPr algn="ctr"/>
+              <a:endParaRPr lang="en-GB"/>
+            </a:p>
+          </p:txBody>
+        </p:sp>
+        <p:sp>
+          <p:nvSpPr>
+            <p:cNvPr id="225" name="Rectangle 224">
+              <a:extLst>
+                <a:ext uri="{FF2B5EF4-FFF2-40B4-BE49-F238E27FC236}">
+                  <a16:creationId xmlns:a16="http://schemas.microsoft.com/office/drawing/2014/main" id="{6887CF0C-BB5F-4719-B5AE-8A5F753733CD}"/>
+                </a:ext>
+              </a:extLst>
+            </p:cNvPr>
+            <p:cNvSpPr/>
+            <p:nvPr/>
+          </p:nvSpPr>
+          <p:spPr>
+            <a:xfrm>
+              <a:off x="2591507" y="5060252"/>
+              <a:ext cx="180000" cy="108000"/>
+            </a:xfrm>
+            <a:prstGeom prst="rect">
+              <a:avLst/>
+            </a:prstGeom>
+            <a:solidFill>
+              <a:schemeClr val="accent2">
+                <a:lumMod val="20000"/>
+                <a:lumOff val="80000"/>
+              </a:schemeClr>
+            </a:solidFill>
+            <a:ln>
+              <a:noFill/>
+            </a:ln>
+          </p:spPr>
+          <p:style>
+            <a:lnRef idx="2">
+              <a:schemeClr val="accent1">
+                <a:shade val="50000"/>
+              </a:schemeClr>
+            </a:lnRef>
+            <a:fillRef idx="1">
+              <a:schemeClr val="accent1"/>
+            </a:fillRef>
+            <a:effectRef idx="0">
+              <a:schemeClr val="accent1"/>
+            </a:effectRef>
+            <a:fontRef idx="minor">
+              <a:schemeClr val="lt1"/>
+            </a:fontRef>
+          </p:style>
+          <p:txBody>
+            <a:bodyPr rtlCol="0" anchor="ctr"/>
+            <a:lstStyle/>
+            <a:p>
+              <a:pPr algn="ctr"/>
+              <a:endParaRPr lang="en-GB"/>
+            </a:p>
+          </p:txBody>
+        </p:sp>
+        <p:sp>
+          <p:nvSpPr>
+            <p:cNvPr id="226" name="TextBox 225">
+              <a:extLst>
+                <a:ext uri="{FF2B5EF4-FFF2-40B4-BE49-F238E27FC236}">
+                  <a16:creationId xmlns:a16="http://schemas.microsoft.com/office/drawing/2014/main" id="{CFFC4630-967F-4104-89A9-F630FDB76B6E}"/>
                 </a:ext>
               </a:extLst>
             </p:cNvPr>
@@ -7694,8 +6989,8 @@
           </p:nvSpPr>
           <p:spPr>
             <a:xfrm>
-              <a:off x="3858176" y="9086267"/>
-              <a:ext cx="414636" cy="246221"/>
+              <a:off x="2732593" y="5003168"/>
+              <a:ext cx="662232" cy="246221"/>
             </a:xfrm>
             <a:prstGeom prst="rect">
               <a:avLst/>
@@ -7709,22 +7004,23 @@
             <a:lstStyle/>
             <a:p>
               <a:r>
-                <a:rPr lang="it-IT" sz="1000" b="1" dirty="0">
-                  <a:solidFill>
-                    <a:schemeClr val="bg1"/>
-                  </a:solidFill>
-                </a:rPr>
-                <a:t>1</a:t>
+                <a:rPr lang="en-GB" sz="1000" dirty="0"/>
+                <a:t>0 </a:t>
               </a:r>
+              <a:r>
+                <a:rPr lang="it-IT" sz="1000" dirty="0"/>
+                <a:t>- 5</a:t>
+              </a:r>
+              <a:endParaRPr lang="en-GB" sz="1000" dirty="0"/>
             </a:p>
           </p:txBody>
         </p:sp>
         <p:sp>
           <p:nvSpPr>
-            <p:cNvPr id="198" name="TextBox 197">
+            <p:cNvPr id="227" name="TextBox 226">
               <a:extLst>
                 <a:ext uri="{FF2B5EF4-FFF2-40B4-BE49-F238E27FC236}">
-                  <a16:creationId xmlns:a16="http://schemas.microsoft.com/office/drawing/2014/main" id="{379409AB-DFC5-4F74-8EFF-327F74CCD4E6}"/>
+                  <a16:creationId xmlns:a16="http://schemas.microsoft.com/office/drawing/2014/main" id="{0295C434-527B-4353-8CDB-6D8CE6363E97}"/>
                 </a:ext>
               </a:extLst>
             </p:cNvPr>
@@ -7733,8 +7029,8 @@
           </p:nvSpPr>
           <p:spPr>
             <a:xfrm>
-              <a:off x="3533608" y="9547395"/>
-              <a:ext cx="414636" cy="246221"/>
+              <a:off x="2732593" y="4808247"/>
+              <a:ext cx="662232" cy="246221"/>
             </a:xfrm>
             <a:prstGeom prst="rect">
               <a:avLst/>
@@ -7748,22 +7044,19 @@
             <a:lstStyle/>
             <a:p>
               <a:r>
-                <a:rPr lang="it-IT" sz="1000" b="1" dirty="0">
-                  <a:solidFill>
-                    <a:schemeClr val="bg1"/>
-                  </a:solidFill>
-                </a:rPr>
-                <a:t>2</a:t>
+                <a:rPr lang="it-IT" sz="1000" dirty="0"/>
+                <a:t>5 - 10</a:t>
               </a:r>
+              <a:endParaRPr lang="en-GB" sz="1000" dirty="0"/>
             </a:p>
           </p:txBody>
         </p:sp>
         <p:sp>
           <p:nvSpPr>
-            <p:cNvPr id="199" name="TextBox 198">
+            <p:cNvPr id="228" name="TextBox 227">
               <a:extLst>
                 <a:ext uri="{FF2B5EF4-FFF2-40B4-BE49-F238E27FC236}">
-                  <a16:creationId xmlns:a16="http://schemas.microsoft.com/office/drawing/2014/main" id="{C4C3754B-DDFD-4ADE-A96A-E912CB88EBE3}"/>
+                  <a16:creationId xmlns:a16="http://schemas.microsoft.com/office/drawing/2014/main" id="{5349082E-00FB-48AF-A445-2B81D51E7764}"/>
                 </a:ext>
               </a:extLst>
             </p:cNvPr>
@@ -7772,8 +7065,8 @@
           </p:nvSpPr>
           <p:spPr>
             <a:xfrm>
-              <a:off x="3294987" y="10211646"/>
-              <a:ext cx="414636" cy="246221"/>
+              <a:off x="2732593" y="4633041"/>
+              <a:ext cx="662232" cy="246221"/>
             </a:xfrm>
             <a:prstGeom prst="rect">
               <a:avLst/>
@@ -7787,22 +7080,18 @@
             <a:lstStyle/>
             <a:p>
               <a:r>
-                <a:rPr lang="it-IT" sz="1000" b="1" dirty="0">
-                  <a:solidFill>
-                    <a:schemeClr val="bg1"/>
-                  </a:solidFill>
-                </a:rPr>
-                <a:t>3</a:t>
+                <a:rPr lang="it-IT" sz="1000" dirty="0"/>
+                <a:t>10 - 15</a:t>
               </a:r>
             </a:p>
           </p:txBody>
         </p:sp>
         <p:sp>
           <p:nvSpPr>
-            <p:cNvPr id="200" name="TextBox 199">
+            <p:cNvPr id="229" name="TextBox 228">
               <a:extLst>
                 <a:ext uri="{FF2B5EF4-FFF2-40B4-BE49-F238E27FC236}">
-                  <a16:creationId xmlns:a16="http://schemas.microsoft.com/office/drawing/2014/main" id="{F889760E-5B5A-4525-8C2F-6846026E1D19}"/>
+                  <a16:creationId xmlns:a16="http://schemas.microsoft.com/office/drawing/2014/main" id="{296C9E54-D41F-4866-B943-6C27979931F3}"/>
                 </a:ext>
               </a:extLst>
             </p:cNvPr>
@@ -7811,8 +7100,8 @@
           </p:nvSpPr>
           <p:spPr>
             <a:xfrm>
-              <a:off x="3484367" y="10078484"/>
-              <a:ext cx="414636" cy="246221"/>
+              <a:off x="2732593" y="4457835"/>
+              <a:ext cx="662232" cy="246221"/>
             </a:xfrm>
             <a:prstGeom prst="rect">
               <a:avLst/>
@@ -7826,22 +7115,18 @@
             <a:lstStyle/>
             <a:p>
               <a:r>
-                <a:rPr lang="it-IT" sz="1000" b="1" dirty="0">
-                  <a:solidFill>
-                    <a:schemeClr val="bg1"/>
-                  </a:solidFill>
-                </a:rPr>
-                <a:t>11</a:t>
+                <a:rPr lang="it-IT" sz="1000" dirty="0"/>
+                <a:t>15 - 20</a:t>
               </a:r>
             </a:p>
           </p:txBody>
         </p:sp>
         <p:sp>
           <p:nvSpPr>
-            <p:cNvPr id="201" name="TextBox 200">
+            <p:cNvPr id="230" name="TextBox 229">
               <a:extLst>
                 <a:ext uri="{FF2B5EF4-FFF2-40B4-BE49-F238E27FC236}">
-                  <a16:creationId xmlns:a16="http://schemas.microsoft.com/office/drawing/2014/main" id="{AE5AB460-0903-4B8B-87FA-7CE6510E3056}"/>
+                  <a16:creationId xmlns:a16="http://schemas.microsoft.com/office/drawing/2014/main" id="{5C5F7E5C-40D0-4404-AF79-EA2FE5BF9D29}"/>
                 </a:ext>
               </a:extLst>
             </p:cNvPr>
@@ -7850,8 +7135,8 @@
           </p:nvSpPr>
           <p:spPr>
             <a:xfrm>
-              <a:off x="4309788" y="9090715"/>
-              <a:ext cx="414636" cy="246221"/>
+              <a:off x="2732593" y="4282629"/>
+              <a:ext cx="662232" cy="246221"/>
             </a:xfrm>
             <a:prstGeom prst="rect">
               <a:avLst/>
@@ -7865,22 +7150,18 @@
             <a:lstStyle/>
             <a:p>
               <a:r>
-                <a:rPr lang="it-IT" sz="1000" b="1" dirty="0">
-                  <a:solidFill>
-                    <a:schemeClr val="bg1"/>
-                  </a:solidFill>
-                </a:rPr>
-                <a:t>4</a:t>
+                <a:rPr lang="it-IT" sz="1000" dirty="0"/>
+                <a:t>20 - 30</a:t>
               </a:r>
             </a:p>
           </p:txBody>
         </p:sp>
         <p:sp>
           <p:nvSpPr>
-            <p:cNvPr id="202" name="TextBox 201">
+            <p:cNvPr id="231" name="TextBox 230">
               <a:extLst>
                 <a:ext uri="{FF2B5EF4-FFF2-40B4-BE49-F238E27FC236}">
-                  <a16:creationId xmlns:a16="http://schemas.microsoft.com/office/drawing/2014/main" id="{11B187C6-3A57-4F86-ABB6-ADF882708D3A}"/>
+                  <a16:creationId xmlns:a16="http://schemas.microsoft.com/office/drawing/2014/main" id="{63EC534E-F923-4622-9FF7-0E86BB901474}"/>
                 </a:ext>
               </a:extLst>
             </p:cNvPr>
@@ -7889,8 +7170,8 @@
           </p:nvSpPr>
           <p:spPr>
             <a:xfrm>
-              <a:off x="4107845" y="9398029"/>
-              <a:ext cx="414636" cy="246221"/>
+              <a:off x="2732593" y="4107423"/>
+              <a:ext cx="662232" cy="246221"/>
             </a:xfrm>
             <a:prstGeom prst="rect">
               <a:avLst/>
@@ -7904,22 +7185,18 @@
             <a:lstStyle/>
             <a:p>
               <a:r>
-                <a:rPr lang="it-IT" sz="1000" b="1" dirty="0">
-                  <a:solidFill>
-                    <a:schemeClr val="bg1"/>
-                  </a:solidFill>
-                </a:rPr>
-                <a:t>6</a:t>
+                <a:rPr lang="it-IT" sz="1000" dirty="0"/>
+                <a:t>30 - 40</a:t>
               </a:r>
             </a:p>
           </p:txBody>
         </p:sp>
         <p:sp>
           <p:nvSpPr>
-            <p:cNvPr id="203" name="TextBox 202">
+            <p:cNvPr id="232" name="TextBox 231">
               <a:extLst>
                 <a:ext uri="{FF2B5EF4-FFF2-40B4-BE49-F238E27FC236}">
-                  <a16:creationId xmlns:a16="http://schemas.microsoft.com/office/drawing/2014/main" id="{3BBEAE37-D32B-49AC-87EC-DDA126F8A175}"/>
+                  <a16:creationId xmlns:a16="http://schemas.microsoft.com/office/drawing/2014/main" id="{9E313F42-5E49-469A-A948-7A0F0CF048E0}"/>
                 </a:ext>
               </a:extLst>
             </p:cNvPr>
@@ -7928,8 +7205,8 @@
           </p:nvSpPr>
           <p:spPr>
             <a:xfrm>
-              <a:off x="3819322" y="9462296"/>
-              <a:ext cx="414636" cy="246221"/>
+              <a:off x="2732593" y="3932217"/>
+              <a:ext cx="662232" cy="246221"/>
             </a:xfrm>
             <a:prstGeom prst="rect">
               <a:avLst/>
@@ -7943,22 +7220,18 @@
             <a:lstStyle/>
             <a:p>
               <a:r>
-                <a:rPr lang="it-IT" sz="1000" b="1" dirty="0">
-                  <a:solidFill>
-                    <a:schemeClr val="bg1"/>
-                  </a:solidFill>
-                </a:rPr>
-                <a:t>7</a:t>
+                <a:rPr lang="it-IT" sz="1000" dirty="0"/>
+                <a:t>40 - 50</a:t>
               </a:r>
             </a:p>
           </p:txBody>
         </p:sp>
         <p:sp>
           <p:nvSpPr>
-            <p:cNvPr id="204" name="TextBox 203">
+            <p:cNvPr id="233" name="TextBox 232">
               <a:extLst>
                 <a:ext uri="{FF2B5EF4-FFF2-40B4-BE49-F238E27FC236}">
-                  <a16:creationId xmlns:a16="http://schemas.microsoft.com/office/drawing/2014/main" id="{CDA2E1F3-6E5C-466F-8830-EB44DDC8CEBD}"/>
+                  <a16:creationId xmlns:a16="http://schemas.microsoft.com/office/drawing/2014/main" id="{74AD475F-7786-49F6-9E62-AE6CE8B5626E}"/>
                 </a:ext>
               </a:extLst>
             </p:cNvPr>
@@ -7967,8 +7240,8 @@
           </p:nvSpPr>
           <p:spPr>
             <a:xfrm>
-              <a:off x="3672830" y="9928777"/>
-              <a:ext cx="414636" cy="246221"/>
+              <a:off x="2732593" y="3757011"/>
+              <a:ext cx="662232" cy="246221"/>
             </a:xfrm>
             <a:prstGeom prst="rect">
               <a:avLst/>
@@ -7982,22 +7255,18 @@
             <a:lstStyle/>
             <a:p>
               <a:r>
-                <a:rPr lang="it-IT" sz="1000" b="1" dirty="0">
-                  <a:solidFill>
-                    <a:schemeClr val="bg1"/>
-                  </a:solidFill>
-                </a:rPr>
-                <a:t>9</a:t>
+                <a:rPr lang="it-IT" sz="1000" dirty="0"/>
+                <a:t>50 - 60</a:t>
               </a:r>
             </a:p>
           </p:txBody>
         </p:sp>
         <p:sp>
           <p:nvSpPr>
-            <p:cNvPr id="205" name="TextBox 204">
+            <p:cNvPr id="234" name="TextBox 233">
               <a:extLst>
                 <a:ext uri="{FF2B5EF4-FFF2-40B4-BE49-F238E27FC236}">
-                  <a16:creationId xmlns:a16="http://schemas.microsoft.com/office/drawing/2014/main" id="{B91C911D-78B0-4CB8-BC0E-9582F95A773B}"/>
+                  <a16:creationId xmlns:a16="http://schemas.microsoft.com/office/drawing/2014/main" id="{1627617A-600F-4F7A-BAB6-B7CDB86FF983}"/>
                 </a:ext>
               </a:extLst>
             </p:cNvPr>
@@ -8006,8 +7275,8 @@
           </p:nvSpPr>
           <p:spPr>
             <a:xfrm>
-              <a:off x="3962259" y="9686154"/>
-              <a:ext cx="414636" cy="246221"/>
+              <a:off x="2732593" y="3581805"/>
+              <a:ext cx="662232" cy="246221"/>
             </a:xfrm>
             <a:prstGeom prst="rect">
               <a:avLst/>
@@ -8021,22 +7290,18 @@
             <a:lstStyle/>
             <a:p>
               <a:r>
-                <a:rPr lang="it-IT" sz="1000" b="1" dirty="0">
-                  <a:solidFill>
-                    <a:schemeClr val="bg1"/>
-                  </a:solidFill>
-                </a:rPr>
-                <a:t>8</a:t>
+                <a:rPr lang="it-IT" sz="1000" dirty="0"/>
+                <a:t>60 - 70</a:t>
               </a:r>
             </a:p>
           </p:txBody>
         </p:sp>
         <p:sp>
           <p:nvSpPr>
-            <p:cNvPr id="206" name="TextBox 205">
+            <p:cNvPr id="235" name="TextBox 234">
               <a:extLst>
                 <a:ext uri="{FF2B5EF4-FFF2-40B4-BE49-F238E27FC236}">
-                  <a16:creationId xmlns:a16="http://schemas.microsoft.com/office/drawing/2014/main" id="{06B5B641-3648-4EE6-B60D-1641E16BA69E}"/>
+                  <a16:creationId xmlns:a16="http://schemas.microsoft.com/office/drawing/2014/main" id="{C5A772C7-BD7B-4F33-A8C5-7AFD50CFBEED}"/>
                 </a:ext>
               </a:extLst>
             </p:cNvPr>
@@ -8045,8 +7310,8 @@
           </p:nvSpPr>
           <p:spPr>
             <a:xfrm>
-              <a:off x="3840930" y="9982425"/>
-              <a:ext cx="414636" cy="246221"/>
+              <a:off x="2732593" y="3406599"/>
+              <a:ext cx="662232" cy="246221"/>
             </a:xfrm>
             <a:prstGeom prst="rect">
               <a:avLst/>
@@ -8060,22 +7325,18 @@
             <a:lstStyle/>
             <a:p>
               <a:r>
-                <a:rPr lang="it-IT" sz="1000" b="1" dirty="0">
-                  <a:solidFill>
-                    <a:schemeClr val="bg1"/>
-                  </a:solidFill>
-                </a:rPr>
-                <a:t>10</a:t>
+                <a:rPr lang="it-IT" sz="1000" dirty="0"/>
+                <a:t>70 - 80</a:t>
               </a:r>
             </a:p>
           </p:txBody>
         </p:sp>
         <p:sp>
           <p:nvSpPr>
-            <p:cNvPr id="207" name="TextBox 206">
+            <p:cNvPr id="236" name="TextBox 235">
               <a:extLst>
                 <a:ext uri="{FF2B5EF4-FFF2-40B4-BE49-F238E27FC236}">
-                  <a16:creationId xmlns:a16="http://schemas.microsoft.com/office/drawing/2014/main" id="{0C7EE2B8-6492-4229-8AF1-2C8A637C4736}"/>
+                  <a16:creationId xmlns:a16="http://schemas.microsoft.com/office/drawing/2014/main" id="{2753D96C-C548-4F6B-9FEF-E3671AD7DF4D}"/>
                 </a:ext>
               </a:extLst>
             </p:cNvPr>
@@ -8084,8 +7345,8 @@
           </p:nvSpPr>
           <p:spPr>
             <a:xfrm>
-              <a:off x="4051587" y="9859050"/>
-              <a:ext cx="414636" cy="246221"/>
+              <a:off x="2732593" y="3231393"/>
+              <a:ext cx="662232" cy="246221"/>
             </a:xfrm>
             <a:prstGeom prst="rect">
               <a:avLst/>
@@ -8099,22 +7360,18 @@
             <a:lstStyle/>
             <a:p>
               <a:r>
-                <a:rPr lang="it-IT" sz="1000" b="1" dirty="0">
-                  <a:solidFill>
-                    <a:schemeClr val="bg1"/>
-                  </a:solidFill>
-                </a:rPr>
-                <a:t>13</a:t>
+                <a:rPr lang="it-IT" sz="1000" dirty="0"/>
+                <a:t>80 - 90</a:t>
               </a:r>
             </a:p>
           </p:txBody>
         </p:sp>
         <p:sp>
           <p:nvSpPr>
-            <p:cNvPr id="208" name="TextBox 207">
+            <p:cNvPr id="237" name="TextBox 236">
               <a:extLst>
                 <a:ext uri="{FF2B5EF4-FFF2-40B4-BE49-F238E27FC236}">
-                  <a16:creationId xmlns:a16="http://schemas.microsoft.com/office/drawing/2014/main" id="{69E9C4FF-1BD0-4A18-8A99-B9BDBEF379FE}"/>
+                  <a16:creationId xmlns:a16="http://schemas.microsoft.com/office/drawing/2014/main" id="{351D3152-4B07-403F-AB18-15453C394568}"/>
                 </a:ext>
               </a:extLst>
             </p:cNvPr>
@@ -8123,8 +7380,8 @@
           </p:nvSpPr>
           <p:spPr>
             <a:xfrm>
-              <a:off x="3976518" y="10130473"/>
-              <a:ext cx="414636" cy="246221"/>
+              <a:off x="2732593" y="3056187"/>
+              <a:ext cx="662232" cy="246221"/>
             </a:xfrm>
             <a:prstGeom prst="rect">
               <a:avLst/>
@@ -8138,22 +7395,18 @@
             <a:lstStyle/>
             <a:p>
               <a:r>
-                <a:rPr lang="it-IT" sz="1000" b="1" dirty="0">
-                  <a:solidFill>
-                    <a:schemeClr val="bg1"/>
-                  </a:solidFill>
-                </a:rPr>
-                <a:t>14</a:t>
+                <a:rPr lang="it-IT" sz="1000" dirty="0"/>
+                <a:t>90 - 100</a:t>
               </a:r>
             </a:p>
           </p:txBody>
         </p:sp>
         <p:sp>
           <p:nvSpPr>
-            <p:cNvPr id="209" name="TextBox 208">
+            <p:cNvPr id="238" name="TextBox 237">
               <a:extLst>
                 <a:ext uri="{FF2B5EF4-FFF2-40B4-BE49-F238E27FC236}">
-                  <a16:creationId xmlns:a16="http://schemas.microsoft.com/office/drawing/2014/main" id="{8019F4E5-D25D-4A18-B72A-CC23EBF8391A}"/>
+                  <a16:creationId xmlns:a16="http://schemas.microsoft.com/office/drawing/2014/main" id="{E513ECF2-B1B0-4717-88AD-F47013290A09}"/>
                 </a:ext>
               </a:extLst>
             </p:cNvPr>
@@ -8162,8 +7415,8 @@
           </p:nvSpPr>
           <p:spPr>
             <a:xfrm>
-              <a:off x="3873516" y="10357644"/>
-              <a:ext cx="414636" cy="246221"/>
+              <a:off x="2732593" y="2880981"/>
+              <a:ext cx="854004" cy="246221"/>
             </a:xfrm>
             <a:prstGeom prst="rect">
               <a:avLst/>
@@ -8177,22 +7430,18 @@
             <a:lstStyle/>
             <a:p>
               <a:r>
-                <a:rPr lang="it-IT" sz="1000" b="1" dirty="0">
-                  <a:solidFill>
-                    <a:schemeClr val="bg1"/>
-                  </a:solidFill>
-                </a:rPr>
-                <a:t>15</a:t>
+                <a:rPr lang="it-IT" sz="1000" dirty="0"/>
+                <a:t>100 - 200</a:t>
               </a:r>
             </a:p>
           </p:txBody>
         </p:sp>
         <p:sp>
           <p:nvSpPr>
-            <p:cNvPr id="210" name="TextBox 209">
+            <p:cNvPr id="239" name="TextBox 238">
               <a:extLst>
                 <a:ext uri="{FF2B5EF4-FFF2-40B4-BE49-F238E27FC236}">
-                  <a16:creationId xmlns:a16="http://schemas.microsoft.com/office/drawing/2014/main" id="{9D258644-3F29-4A69-B938-4B094E3A0E4C}"/>
+                  <a16:creationId xmlns:a16="http://schemas.microsoft.com/office/drawing/2014/main" id="{3F1FE446-17CF-46EE-8429-1A5638B6F722}"/>
                 </a:ext>
               </a:extLst>
             </p:cNvPr>
@@ -8201,8 +7450,8 @@
           </p:nvSpPr>
           <p:spPr>
             <a:xfrm>
-              <a:off x="3770384" y="10557326"/>
-              <a:ext cx="414636" cy="246221"/>
+              <a:off x="2732593" y="2705775"/>
+              <a:ext cx="854004" cy="246221"/>
             </a:xfrm>
             <a:prstGeom prst="rect">
               <a:avLst/>
@@ -8216,22 +7465,18 @@
             <a:lstStyle/>
             <a:p>
               <a:r>
-                <a:rPr lang="it-IT" sz="1000" b="1" dirty="0">
-                  <a:solidFill>
-                    <a:schemeClr val="bg1"/>
-                  </a:solidFill>
-                </a:rPr>
-                <a:t>16</a:t>
+                <a:rPr lang="it-IT" sz="1000" dirty="0"/>
+                <a:t>200 - 300</a:t>
               </a:r>
             </a:p>
           </p:txBody>
         </p:sp>
         <p:sp>
           <p:nvSpPr>
-            <p:cNvPr id="211" name="TextBox 210">
+            <p:cNvPr id="240" name="TextBox 239">
               <a:extLst>
                 <a:ext uri="{FF2B5EF4-FFF2-40B4-BE49-F238E27FC236}">
-                  <a16:creationId xmlns:a16="http://schemas.microsoft.com/office/drawing/2014/main" id="{304FCF33-E449-4E41-BE44-C341DC61F5AC}"/>
+                  <a16:creationId xmlns:a16="http://schemas.microsoft.com/office/drawing/2014/main" id="{566D3A46-294E-4EE1-B817-42801BD3AF22}"/>
                 </a:ext>
               </a:extLst>
             </p:cNvPr>
@@ -8240,8 +7485,8 @@
           </p:nvSpPr>
           <p:spPr>
             <a:xfrm>
-              <a:off x="3535268" y="10754362"/>
-              <a:ext cx="414636" cy="246221"/>
+              <a:off x="2732593" y="2530569"/>
+              <a:ext cx="854004" cy="246221"/>
             </a:xfrm>
             <a:prstGeom prst="rect">
               <a:avLst/>
@@ -8255,22 +7500,590 @@
             <a:lstStyle/>
             <a:p>
               <a:r>
-                <a:rPr lang="it-IT" sz="1000" b="1" dirty="0">
-                  <a:solidFill>
-                    <a:schemeClr val="bg1"/>
-                  </a:solidFill>
-                </a:rPr>
-                <a:t>17</a:t>
+                <a:rPr lang="it-IT" sz="1000" dirty="0"/>
+                <a:t>300 - 400</a:t>
               </a:r>
             </a:p>
           </p:txBody>
         </p:sp>
         <p:sp>
           <p:nvSpPr>
-            <p:cNvPr id="212" name="TextBox 211">
+            <p:cNvPr id="241" name="Rectangle 240">
               <a:extLst>
                 <a:ext uri="{FF2B5EF4-FFF2-40B4-BE49-F238E27FC236}">
-                  <a16:creationId xmlns:a16="http://schemas.microsoft.com/office/drawing/2014/main" id="{8A828F02-C7F0-40C9-A558-5B22C5580A78}"/>
+                  <a16:creationId xmlns:a16="http://schemas.microsoft.com/office/drawing/2014/main" id="{8F63F9D6-66A3-4A36-9C6F-7971C5E18357}"/>
+                </a:ext>
+              </a:extLst>
+            </p:cNvPr>
+            <p:cNvSpPr/>
+            <p:nvPr/>
+          </p:nvSpPr>
+          <p:spPr>
+            <a:xfrm>
+              <a:off x="2591507" y="4359434"/>
+              <a:ext cx="180000" cy="108000"/>
+            </a:xfrm>
+            <a:prstGeom prst="rect">
+              <a:avLst/>
+            </a:prstGeom>
+            <a:solidFill>
+              <a:srgbClr val="F0904E"/>
+            </a:solidFill>
+            <a:ln>
+              <a:noFill/>
+            </a:ln>
+          </p:spPr>
+          <p:style>
+            <a:lnRef idx="2">
+              <a:schemeClr val="accent1">
+                <a:shade val="50000"/>
+              </a:schemeClr>
+            </a:lnRef>
+            <a:fillRef idx="1">
+              <a:schemeClr val="accent1"/>
+            </a:fillRef>
+            <a:effectRef idx="0">
+              <a:schemeClr val="accent1"/>
+            </a:effectRef>
+            <a:fontRef idx="minor">
+              <a:schemeClr val="lt1"/>
+            </a:fontRef>
+          </p:style>
+          <p:txBody>
+            <a:bodyPr rtlCol="0" anchor="ctr"/>
+            <a:lstStyle/>
+            <a:p>
+              <a:pPr algn="ctr"/>
+              <a:endParaRPr lang="en-GB" dirty="0"/>
+            </a:p>
+          </p:txBody>
+        </p:sp>
+        <p:sp>
+          <p:nvSpPr>
+            <p:cNvPr id="242" name="Rectangle 241">
+              <a:extLst>
+                <a:ext uri="{FF2B5EF4-FFF2-40B4-BE49-F238E27FC236}">
+                  <a16:creationId xmlns:a16="http://schemas.microsoft.com/office/drawing/2014/main" id="{201251B4-7C06-42E4-A62E-253B03FE3984}"/>
+                </a:ext>
+              </a:extLst>
+            </p:cNvPr>
+            <p:cNvSpPr/>
+            <p:nvPr/>
+          </p:nvSpPr>
+          <p:spPr>
+            <a:xfrm>
+              <a:off x="2591507" y="4184228"/>
+              <a:ext cx="180000" cy="108000"/>
+            </a:xfrm>
+            <a:prstGeom prst="rect">
+              <a:avLst/>
+            </a:prstGeom>
+            <a:solidFill>
+              <a:srgbClr val="ED7C2F"/>
+            </a:solidFill>
+            <a:ln>
+              <a:noFill/>
+            </a:ln>
+          </p:spPr>
+          <p:style>
+            <a:lnRef idx="2">
+              <a:schemeClr val="accent1">
+                <a:shade val="50000"/>
+              </a:schemeClr>
+            </a:lnRef>
+            <a:fillRef idx="1">
+              <a:schemeClr val="accent1"/>
+            </a:fillRef>
+            <a:effectRef idx="0">
+              <a:schemeClr val="accent1"/>
+            </a:effectRef>
+            <a:fontRef idx="minor">
+              <a:schemeClr val="lt1"/>
+            </a:fontRef>
+          </p:style>
+          <p:txBody>
+            <a:bodyPr rtlCol="0" anchor="ctr"/>
+            <a:lstStyle/>
+            <a:p>
+              <a:pPr algn="ctr"/>
+              <a:endParaRPr lang="en-GB"/>
+            </a:p>
+          </p:txBody>
+        </p:sp>
+        <p:sp>
+          <p:nvSpPr>
+            <p:cNvPr id="243" name="Rectangle 242">
+              <a:extLst>
+                <a:ext uri="{FF2B5EF4-FFF2-40B4-BE49-F238E27FC236}">
+                  <a16:creationId xmlns:a16="http://schemas.microsoft.com/office/drawing/2014/main" id="{E802D561-41B4-471D-85A5-933FE50FC47E}"/>
+                </a:ext>
+              </a:extLst>
+            </p:cNvPr>
+            <p:cNvSpPr/>
+            <p:nvPr/>
+          </p:nvSpPr>
+          <p:spPr>
+            <a:xfrm>
+              <a:off x="2591507" y="4009022"/>
+              <a:ext cx="180000" cy="108000"/>
+            </a:xfrm>
+            <a:prstGeom prst="rect">
+              <a:avLst/>
+            </a:prstGeom>
+            <a:solidFill>
+              <a:srgbClr val="E66914"/>
+            </a:solidFill>
+            <a:ln>
+              <a:noFill/>
+            </a:ln>
+          </p:spPr>
+          <p:style>
+            <a:lnRef idx="2">
+              <a:schemeClr val="accent1">
+                <a:shade val="50000"/>
+              </a:schemeClr>
+            </a:lnRef>
+            <a:fillRef idx="1">
+              <a:schemeClr val="accent1"/>
+            </a:fillRef>
+            <a:effectRef idx="0">
+              <a:schemeClr val="accent1"/>
+            </a:effectRef>
+            <a:fontRef idx="minor">
+              <a:schemeClr val="lt1"/>
+            </a:fontRef>
+          </p:style>
+          <p:txBody>
+            <a:bodyPr rtlCol="0" anchor="ctr"/>
+            <a:lstStyle/>
+            <a:p>
+              <a:pPr algn="ctr"/>
+              <a:endParaRPr lang="en-GB"/>
+            </a:p>
+          </p:txBody>
+        </p:sp>
+        <p:sp>
+          <p:nvSpPr>
+            <p:cNvPr id="244" name="Rectangle 243">
+              <a:extLst>
+                <a:ext uri="{FF2B5EF4-FFF2-40B4-BE49-F238E27FC236}">
+                  <a16:creationId xmlns:a16="http://schemas.microsoft.com/office/drawing/2014/main" id="{07C784B3-AB3E-473A-9FB9-E21961807D25}"/>
+                </a:ext>
+              </a:extLst>
+            </p:cNvPr>
+            <p:cNvSpPr/>
+            <p:nvPr/>
+          </p:nvSpPr>
+          <p:spPr>
+            <a:xfrm>
+              <a:off x="2591507" y="3833816"/>
+              <a:ext cx="180000" cy="108000"/>
+            </a:xfrm>
+            <a:prstGeom prst="rect">
+              <a:avLst/>
+            </a:prstGeom>
+            <a:solidFill>
+              <a:srgbClr val="D46112"/>
+            </a:solidFill>
+            <a:ln>
+              <a:noFill/>
+            </a:ln>
+          </p:spPr>
+          <p:style>
+            <a:lnRef idx="2">
+              <a:schemeClr val="accent1">
+                <a:shade val="50000"/>
+              </a:schemeClr>
+            </a:lnRef>
+            <a:fillRef idx="1">
+              <a:schemeClr val="accent1"/>
+            </a:fillRef>
+            <a:effectRef idx="0">
+              <a:schemeClr val="accent1"/>
+            </a:effectRef>
+            <a:fontRef idx="minor">
+              <a:schemeClr val="lt1"/>
+            </a:fontRef>
+          </p:style>
+          <p:txBody>
+            <a:bodyPr rtlCol="0" anchor="ctr"/>
+            <a:lstStyle/>
+            <a:p>
+              <a:pPr algn="ctr"/>
+              <a:endParaRPr lang="en-GB"/>
+            </a:p>
+          </p:txBody>
+        </p:sp>
+        <p:sp>
+          <p:nvSpPr>
+            <p:cNvPr id="245" name="Rectangle 244">
+              <a:extLst>
+                <a:ext uri="{FF2B5EF4-FFF2-40B4-BE49-F238E27FC236}">
+                  <a16:creationId xmlns:a16="http://schemas.microsoft.com/office/drawing/2014/main" id="{824D9C1F-D9EE-4DF1-AF60-10129CC8BAF2}"/>
+                </a:ext>
+              </a:extLst>
+            </p:cNvPr>
+            <p:cNvSpPr/>
+            <p:nvPr/>
+          </p:nvSpPr>
+          <p:spPr>
+            <a:xfrm>
+              <a:off x="2591507" y="3658610"/>
+              <a:ext cx="180000" cy="108000"/>
+            </a:xfrm>
+            <a:prstGeom prst="rect">
+              <a:avLst/>
+            </a:prstGeom>
+            <a:solidFill>
+              <a:srgbClr val="C25810"/>
+            </a:solidFill>
+            <a:ln>
+              <a:noFill/>
+            </a:ln>
+          </p:spPr>
+          <p:style>
+            <a:lnRef idx="2">
+              <a:schemeClr val="accent1">
+                <a:shade val="50000"/>
+              </a:schemeClr>
+            </a:lnRef>
+            <a:fillRef idx="1">
+              <a:schemeClr val="accent1"/>
+            </a:fillRef>
+            <a:effectRef idx="0">
+              <a:schemeClr val="accent1"/>
+            </a:effectRef>
+            <a:fontRef idx="minor">
+              <a:schemeClr val="lt1"/>
+            </a:fontRef>
+          </p:style>
+          <p:txBody>
+            <a:bodyPr rtlCol="0" anchor="ctr"/>
+            <a:lstStyle/>
+            <a:p>
+              <a:pPr algn="ctr"/>
+              <a:endParaRPr lang="en-GB"/>
+            </a:p>
+          </p:txBody>
+        </p:sp>
+        <p:sp>
+          <p:nvSpPr>
+            <p:cNvPr id="246" name="Rectangle 245">
+              <a:extLst>
+                <a:ext uri="{FF2B5EF4-FFF2-40B4-BE49-F238E27FC236}">
+                  <a16:creationId xmlns:a16="http://schemas.microsoft.com/office/drawing/2014/main" id="{E480BB1F-BA13-461B-A8C7-13AFC5B59CD8}"/>
+                </a:ext>
+              </a:extLst>
+            </p:cNvPr>
+            <p:cNvSpPr/>
+            <p:nvPr/>
+          </p:nvSpPr>
+          <p:spPr>
+            <a:xfrm>
+              <a:off x="2591507" y="3483404"/>
+              <a:ext cx="180000" cy="108000"/>
+            </a:xfrm>
+            <a:prstGeom prst="rect">
+              <a:avLst/>
+            </a:prstGeom>
+            <a:solidFill>
+              <a:srgbClr val="AE4F0E"/>
+            </a:solidFill>
+            <a:ln>
+              <a:noFill/>
+            </a:ln>
+          </p:spPr>
+          <p:style>
+            <a:lnRef idx="2">
+              <a:schemeClr val="accent1">
+                <a:shade val="50000"/>
+              </a:schemeClr>
+            </a:lnRef>
+            <a:fillRef idx="1">
+              <a:schemeClr val="accent1"/>
+            </a:fillRef>
+            <a:effectRef idx="0">
+              <a:schemeClr val="accent1"/>
+            </a:effectRef>
+            <a:fontRef idx="minor">
+              <a:schemeClr val="lt1"/>
+            </a:fontRef>
+          </p:style>
+          <p:txBody>
+            <a:bodyPr rtlCol="0" anchor="ctr"/>
+            <a:lstStyle/>
+            <a:p>
+              <a:pPr algn="ctr"/>
+              <a:endParaRPr lang="en-GB"/>
+            </a:p>
+          </p:txBody>
+        </p:sp>
+        <p:sp>
+          <p:nvSpPr>
+            <p:cNvPr id="247" name="Rectangle 246">
+              <a:extLst>
+                <a:ext uri="{FF2B5EF4-FFF2-40B4-BE49-F238E27FC236}">
+                  <a16:creationId xmlns:a16="http://schemas.microsoft.com/office/drawing/2014/main" id="{287DA8F9-ABA4-4286-8036-64D53844F9F3}"/>
+                </a:ext>
+              </a:extLst>
+            </p:cNvPr>
+            <p:cNvSpPr/>
+            <p:nvPr/>
+          </p:nvSpPr>
+          <p:spPr>
+            <a:xfrm>
+              <a:off x="2591507" y="3308198"/>
+              <a:ext cx="180000" cy="108000"/>
+            </a:xfrm>
+            <a:prstGeom prst="rect">
+              <a:avLst/>
+            </a:prstGeom>
+            <a:solidFill>
+              <a:srgbClr val="9B460D"/>
+            </a:solidFill>
+            <a:ln>
+              <a:noFill/>
+            </a:ln>
+          </p:spPr>
+          <p:style>
+            <a:lnRef idx="2">
+              <a:schemeClr val="accent1">
+                <a:shade val="50000"/>
+              </a:schemeClr>
+            </a:lnRef>
+            <a:fillRef idx="1">
+              <a:schemeClr val="accent1"/>
+            </a:fillRef>
+            <a:effectRef idx="0">
+              <a:schemeClr val="accent1"/>
+            </a:effectRef>
+            <a:fontRef idx="minor">
+              <a:schemeClr val="lt1"/>
+            </a:fontRef>
+          </p:style>
+          <p:txBody>
+            <a:bodyPr rtlCol="0" anchor="ctr"/>
+            <a:lstStyle/>
+            <a:p>
+              <a:pPr algn="ctr"/>
+              <a:endParaRPr lang="en-GB"/>
+            </a:p>
+          </p:txBody>
+        </p:sp>
+        <p:sp>
+          <p:nvSpPr>
+            <p:cNvPr id="248" name="Rectangle 247">
+              <a:extLst>
+                <a:ext uri="{FF2B5EF4-FFF2-40B4-BE49-F238E27FC236}">
+                  <a16:creationId xmlns:a16="http://schemas.microsoft.com/office/drawing/2014/main" id="{0D48C767-FDAF-467B-8268-F4A8966041C4}"/>
+                </a:ext>
+              </a:extLst>
+            </p:cNvPr>
+            <p:cNvSpPr/>
+            <p:nvPr/>
+          </p:nvSpPr>
+          <p:spPr>
+            <a:xfrm>
+              <a:off x="2591507" y="3132992"/>
+              <a:ext cx="180000" cy="108000"/>
+            </a:xfrm>
+            <a:prstGeom prst="rect">
+              <a:avLst/>
+            </a:prstGeom>
+            <a:solidFill>
+              <a:srgbClr val="8B3F0B"/>
+            </a:solidFill>
+            <a:ln>
+              <a:noFill/>
+            </a:ln>
+          </p:spPr>
+          <p:style>
+            <a:lnRef idx="2">
+              <a:schemeClr val="accent1">
+                <a:shade val="50000"/>
+              </a:schemeClr>
+            </a:lnRef>
+            <a:fillRef idx="1">
+              <a:schemeClr val="accent1"/>
+            </a:fillRef>
+            <a:effectRef idx="0">
+              <a:schemeClr val="accent1"/>
+            </a:effectRef>
+            <a:fontRef idx="minor">
+              <a:schemeClr val="lt1"/>
+            </a:fontRef>
+          </p:style>
+          <p:txBody>
+            <a:bodyPr rtlCol="0" anchor="ctr"/>
+            <a:lstStyle/>
+            <a:p>
+              <a:pPr algn="ctr"/>
+              <a:endParaRPr lang="en-GB"/>
+            </a:p>
+          </p:txBody>
+        </p:sp>
+        <p:sp>
+          <p:nvSpPr>
+            <p:cNvPr id="249" name="Rectangle 248">
+              <a:extLst>
+                <a:ext uri="{FF2B5EF4-FFF2-40B4-BE49-F238E27FC236}">
+                  <a16:creationId xmlns:a16="http://schemas.microsoft.com/office/drawing/2014/main" id="{882D3E31-1579-48DB-9AC8-1C207822207C}"/>
+                </a:ext>
+              </a:extLst>
+            </p:cNvPr>
+            <p:cNvSpPr/>
+            <p:nvPr/>
+          </p:nvSpPr>
+          <p:spPr>
+            <a:xfrm>
+              <a:off x="2591507" y="2957786"/>
+              <a:ext cx="180000" cy="108000"/>
+            </a:xfrm>
+            <a:prstGeom prst="rect">
+              <a:avLst/>
+            </a:prstGeom>
+            <a:solidFill>
+              <a:srgbClr val="803A0A"/>
+            </a:solidFill>
+            <a:ln>
+              <a:noFill/>
+            </a:ln>
+          </p:spPr>
+          <p:style>
+            <a:lnRef idx="2">
+              <a:schemeClr val="accent1">
+                <a:shade val="50000"/>
+              </a:schemeClr>
+            </a:lnRef>
+            <a:fillRef idx="1">
+              <a:schemeClr val="accent1"/>
+            </a:fillRef>
+            <a:effectRef idx="0">
+              <a:schemeClr val="accent1"/>
+            </a:effectRef>
+            <a:fontRef idx="minor">
+              <a:schemeClr val="lt1"/>
+            </a:fontRef>
+          </p:style>
+          <p:txBody>
+            <a:bodyPr rtlCol="0" anchor="ctr"/>
+            <a:lstStyle/>
+            <a:p>
+              <a:pPr algn="ctr"/>
+              <a:endParaRPr lang="en-GB"/>
+            </a:p>
+          </p:txBody>
+        </p:sp>
+        <p:sp>
+          <p:nvSpPr>
+            <p:cNvPr id="250" name="Rectangle 249">
+              <a:extLst>
+                <a:ext uri="{FF2B5EF4-FFF2-40B4-BE49-F238E27FC236}">
+                  <a16:creationId xmlns:a16="http://schemas.microsoft.com/office/drawing/2014/main" id="{AA53A63A-4527-4F93-835F-59103D082DD9}"/>
+                </a:ext>
+              </a:extLst>
+            </p:cNvPr>
+            <p:cNvSpPr/>
+            <p:nvPr/>
+          </p:nvSpPr>
+          <p:spPr>
+            <a:xfrm>
+              <a:off x="2591507" y="2782580"/>
+              <a:ext cx="180000" cy="108000"/>
+            </a:xfrm>
+            <a:prstGeom prst="rect">
+              <a:avLst/>
+            </a:prstGeom>
+            <a:solidFill>
+              <a:srgbClr val="682F08"/>
+            </a:solidFill>
+            <a:ln>
+              <a:noFill/>
+            </a:ln>
+          </p:spPr>
+          <p:style>
+            <a:lnRef idx="2">
+              <a:schemeClr val="accent1">
+                <a:shade val="50000"/>
+              </a:schemeClr>
+            </a:lnRef>
+            <a:fillRef idx="1">
+              <a:schemeClr val="accent1"/>
+            </a:fillRef>
+            <a:effectRef idx="0">
+              <a:schemeClr val="accent1"/>
+            </a:effectRef>
+            <a:fontRef idx="minor">
+              <a:schemeClr val="lt1"/>
+            </a:fontRef>
+          </p:style>
+          <p:txBody>
+            <a:bodyPr rtlCol="0" anchor="ctr"/>
+            <a:lstStyle/>
+            <a:p>
+              <a:pPr algn="ctr"/>
+              <a:endParaRPr lang="en-GB"/>
+            </a:p>
+          </p:txBody>
+        </p:sp>
+        <p:sp>
+          <p:nvSpPr>
+            <p:cNvPr id="251" name="Rectangle 250">
+              <a:extLst>
+                <a:ext uri="{FF2B5EF4-FFF2-40B4-BE49-F238E27FC236}">
+                  <a16:creationId xmlns:a16="http://schemas.microsoft.com/office/drawing/2014/main" id="{3E3616AF-3D42-45D3-9FF5-566A874A0276}"/>
+                </a:ext>
+              </a:extLst>
+            </p:cNvPr>
+            <p:cNvSpPr/>
+            <p:nvPr/>
+          </p:nvSpPr>
+          <p:spPr>
+            <a:xfrm>
+              <a:off x="2591507" y="2607374"/>
+              <a:ext cx="180000" cy="108000"/>
+            </a:xfrm>
+            <a:prstGeom prst="rect">
+              <a:avLst/>
+            </a:prstGeom>
+            <a:solidFill>
+              <a:srgbClr val="411D05"/>
+            </a:solidFill>
+            <a:ln>
+              <a:noFill/>
+            </a:ln>
+          </p:spPr>
+          <p:style>
+            <a:lnRef idx="2">
+              <a:schemeClr val="accent1">
+                <a:shade val="50000"/>
+              </a:schemeClr>
+            </a:lnRef>
+            <a:fillRef idx="1">
+              <a:schemeClr val="accent1"/>
+            </a:fillRef>
+            <a:effectRef idx="0">
+              <a:schemeClr val="accent1"/>
+            </a:effectRef>
+            <a:fontRef idx="minor">
+              <a:schemeClr val="lt1"/>
+            </a:fontRef>
+          </p:style>
+          <p:txBody>
+            <a:bodyPr rtlCol="0" anchor="ctr"/>
+            <a:lstStyle/>
+            <a:p>
+              <a:pPr algn="ctr"/>
+              <a:endParaRPr lang="en-GB"/>
+            </a:p>
+          </p:txBody>
+        </p:sp>
+        <p:sp>
+          <p:nvSpPr>
+            <p:cNvPr id="252" name="TextBox 251">
+              <a:extLst>
+                <a:ext uri="{FF2B5EF4-FFF2-40B4-BE49-F238E27FC236}">
+                  <a16:creationId xmlns:a16="http://schemas.microsoft.com/office/drawing/2014/main" id="{51DAC668-8AB1-4901-A419-D6ACE3879328}"/>
                 </a:ext>
               </a:extLst>
             </p:cNvPr>
@@ -8278,9 +8091,9 @@
             <p:nvPr/>
           </p:nvSpPr>
           <p:spPr>
-            <a:xfrm>
-              <a:off x="3601484" y="10992156"/>
-              <a:ext cx="414636" cy="246221"/>
+            <a:xfrm rot="16200000">
+              <a:off x="2123803" y="3764705"/>
+              <a:ext cx="2569537" cy="246221"/>
             </a:xfrm>
             <a:prstGeom prst="rect">
               <a:avLst/>
@@ -8293,308 +8106,978 @@
             </a:bodyPr>
             <a:lstStyle/>
             <a:p>
-              <a:r>
-                <a:rPr lang="it-IT" sz="1000" b="1" dirty="0">
-                  <a:solidFill>
-                    <a:schemeClr val="bg1"/>
-                  </a:solidFill>
-                </a:rPr>
-                <a:t>18</a:t>
-              </a:r>
-            </a:p>
-          </p:txBody>
-        </p:sp>
-        <p:sp>
-          <p:nvSpPr>
-            <p:cNvPr id="213" name="TextBox 212">
-              <a:extLst>
-                <a:ext uri="{FF2B5EF4-FFF2-40B4-BE49-F238E27FC236}">
-                  <a16:creationId xmlns:a16="http://schemas.microsoft.com/office/drawing/2014/main" id="{1657D5C5-96C7-4413-8DC8-25116FCCF52C}"/>
-                </a:ext>
-              </a:extLst>
-            </p:cNvPr>
-            <p:cNvSpPr txBox="1"/>
-            <p:nvPr/>
-          </p:nvSpPr>
-          <p:spPr>
-            <a:xfrm>
-              <a:off x="4862901" y="9371804"/>
-              <a:ext cx="414636" cy="246221"/>
-            </a:xfrm>
-            <a:prstGeom prst="rect">
-              <a:avLst/>
-            </a:prstGeom>
-            <a:noFill/>
-          </p:spPr>
-          <p:txBody>
-            <a:bodyPr wrap="square" rtlCol="0">
-              <a:spAutoFit/>
-            </a:bodyPr>
-            <a:lstStyle/>
-            <a:p>
-              <a:r>
-                <a:rPr lang="it-IT" sz="1000" b="1" dirty="0"/>
-                <a:t>19</a:t>
-              </a:r>
-            </a:p>
-          </p:txBody>
-        </p:sp>
-        <p:sp>
-          <p:nvSpPr>
-            <p:cNvPr id="214" name="TextBox 213">
-              <a:extLst>
-                <a:ext uri="{FF2B5EF4-FFF2-40B4-BE49-F238E27FC236}">
-                  <a16:creationId xmlns:a16="http://schemas.microsoft.com/office/drawing/2014/main" id="{4FDCB11B-5181-4C4A-AD3B-BABC6C0DBB04}"/>
-                </a:ext>
-              </a:extLst>
-            </p:cNvPr>
-            <p:cNvSpPr txBox="1"/>
-            <p:nvPr/>
-          </p:nvSpPr>
-          <p:spPr>
-            <a:xfrm>
-              <a:off x="4278587" y="9591626"/>
-              <a:ext cx="414636" cy="246221"/>
-            </a:xfrm>
-            <a:prstGeom prst="rect">
-              <a:avLst/>
-            </a:prstGeom>
-            <a:noFill/>
-          </p:spPr>
-          <p:txBody>
-            <a:bodyPr wrap="square" rtlCol="0">
-              <a:spAutoFit/>
-            </a:bodyPr>
-            <a:lstStyle/>
-            <a:p>
-              <a:r>
-                <a:rPr lang="it-IT" sz="1000" b="1" dirty="0"/>
-                <a:t>12</a:t>
-              </a:r>
-            </a:p>
-          </p:txBody>
-        </p:sp>
-        <p:sp>
-          <p:nvSpPr>
-            <p:cNvPr id="215" name="TextBox 214">
-              <a:extLst>
-                <a:ext uri="{FF2B5EF4-FFF2-40B4-BE49-F238E27FC236}">
-                  <a16:creationId xmlns:a16="http://schemas.microsoft.com/office/drawing/2014/main" id="{43CCB5C4-5A20-495D-96F0-B57215A7AA21}"/>
-                </a:ext>
-              </a:extLst>
-            </p:cNvPr>
-            <p:cNvSpPr txBox="1"/>
-            <p:nvPr/>
-          </p:nvSpPr>
-          <p:spPr>
-            <a:xfrm>
-              <a:off x="4891657" y="9657100"/>
-              <a:ext cx="414636" cy="246221"/>
-            </a:xfrm>
-            <a:prstGeom prst="rect">
-              <a:avLst/>
-            </a:prstGeom>
-            <a:noFill/>
-          </p:spPr>
-          <p:txBody>
-            <a:bodyPr wrap="square" rtlCol="0">
-              <a:spAutoFit/>
-            </a:bodyPr>
-            <a:lstStyle/>
-            <a:p>
-              <a:r>
-                <a:rPr lang="it-IT" sz="1000" b="1" dirty="0"/>
-                <a:t>20</a:t>
-              </a:r>
-            </a:p>
-          </p:txBody>
-        </p:sp>
-        <p:sp>
-          <p:nvSpPr>
-            <p:cNvPr id="216" name="TextBox 215">
-              <a:extLst>
-                <a:ext uri="{FF2B5EF4-FFF2-40B4-BE49-F238E27FC236}">
-                  <a16:creationId xmlns:a16="http://schemas.microsoft.com/office/drawing/2014/main" id="{626F3178-8FE6-4D24-B3DF-8CD2FDE1FA43}"/>
-                </a:ext>
-              </a:extLst>
-            </p:cNvPr>
-            <p:cNvSpPr txBox="1"/>
-            <p:nvPr/>
-          </p:nvSpPr>
-          <p:spPr>
-            <a:xfrm>
-              <a:off x="4702358" y="10051887"/>
-              <a:ext cx="414636" cy="246221"/>
-            </a:xfrm>
-            <a:prstGeom prst="rect">
-              <a:avLst/>
-            </a:prstGeom>
-            <a:noFill/>
-          </p:spPr>
-          <p:txBody>
-            <a:bodyPr wrap="square" rtlCol="0">
-              <a:spAutoFit/>
-            </a:bodyPr>
-            <a:lstStyle/>
-            <a:p>
-              <a:r>
-                <a:rPr lang="it-IT" sz="1000" b="1" dirty="0"/>
-                <a:t>21</a:t>
-              </a:r>
-            </a:p>
-          </p:txBody>
-        </p:sp>
-        <p:sp>
-          <p:nvSpPr>
-            <p:cNvPr id="217" name="TextBox 216">
-              <a:extLst>
-                <a:ext uri="{FF2B5EF4-FFF2-40B4-BE49-F238E27FC236}">
-                  <a16:creationId xmlns:a16="http://schemas.microsoft.com/office/drawing/2014/main" id="{E7A7B55A-342A-49E5-BC78-851EEDEDD0BC}"/>
-                </a:ext>
-              </a:extLst>
-            </p:cNvPr>
-            <p:cNvSpPr txBox="1"/>
-            <p:nvPr/>
-          </p:nvSpPr>
-          <p:spPr>
-            <a:xfrm>
-              <a:off x="4288022" y="10339547"/>
-              <a:ext cx="414636" cy="246221"/>
-            </a:xfrm>
-            <a:prstGeom prst="rect">
-              <a:avLst/>
-            </a:prstGeom>
-            <a:noFill/>
-          </p:spPr>
-          <p:txBody>
-            <a:bodyPr wrap="square" rtlCol="0">
-              <a:spAutoFit/>
-            </a:bodyPr>
-            <a:lstStyle/>
-            <a:p>
-              <a:r>
-                <a:rPr lang="it-IT" sz="1000" b="1" dirty="0"/>
-                <a:t>22</a:t>
-              </a:r>
-            </a:p>
-          </p:txBody>
-        </p:sp>
-        <p:sp>
-          <p:nvSpPr>
-            <p:cNvPr id="218" name="TextBox 217">
-              <a:extLst>
-                <a:ext uri="{FF2B5EF4-FFF2-40B4-BE49-F238E27FC236}">
-                  <a16:creationId xmlns:a16="http://schemas.microsoft.com/office/drawing/2014/main" id="{EB701E82-7422-442B-AB98-CB1DC6B3014E}"/>
-                </a:ext>
-              </a:extLst>
-            </p:cNvPr>
-            <p:cNvSpPr txBox="1"/>
-            <p:nvPr/>
-          </p:nvSpPr>
-          <p:spPr>
-            <a:xfrm>
-              <a:off x="3930854" y="10934986"/>
-              <a:ext cx="414636" cy="246221"/>
-            </a:xfrm>
-            <a:prstGeom prst="rect">
-              <a:avLst/>
-            </a:prstGeom>
-            <a:noFill/>
-          </p:spPr>
-          <p:txBody>
-            <a:bodyPr wrap="square" rtlCol="0">
-              <a:spAutoFit/>
-            </a:bodyPr>
-            <a:lstStyle/>
-            <a:p>
-              <a:r>
-                <a:rPr lang="it-IT" sz="1000" b="1" dirty="0"/>
-                <a:t>23</a:t>
-              </a:r>
-            </a:p>
-          </p:txBody>
-        </p:sp>
-        <p:sp>
-          <p:nvSpPr>
-            <p:cNvPr id="219" name="TextBox 218">
-              <a:extLst>
-                <a:ext uri="{FF2B5EF4-FFF2-40B4-BE49-F238E27FC236}">
-                  <a16:creationId xmlns:a16="http://schemas.microsoft.com/office/drawing/2014/main" id="{1BDE16C1-EA00-4492-8274-0E8E1431C785}"/>
-                </a:ext>
-              </a:extLst>
-            </p:cNvPr>
-            <p:cNvSpPr txBox="1"/>
-            <p:nvPr/>
-          </p:nvSpPr>
-          <p:spPr>
-            <a:xfrm>
-              <a:off x="3295662" y="8991243"/>
-              <a:ext cx="229660" cy="276999"/>
-            </a:xfrm>
-            <a:prstGeom prst="rect">
-              <a:avLst/>
-            </a:prstGeom>
-            <a:noFill/>
-            <a:ln w="28575">
-              <a:solidFill>
-                <a:schemeClr val="tx1"/>
-              </a:solidFill>
-            </a:ln>
-          </p:spPr>
-          <p:txBody>
-            <a:bodyPr wrap="square" rtlCol="0">
-              <a:spAutoFit/>
-            </a:bodyPr>
-            <a:lstStyle/>
-            <a:p>
               <a:pPr algn="ctr"/>
               <a:r>
-                <a:rPr lang="en-GB" sz="1200" b="1" dirty="0"/>
-                <a:t>c</a:t>
+                <a:rPr lang="it-IT" sz="1000" dirty="0"/>
+                <a:t>[</a:t>
               </a:r>
-            </a:p>
-          </p:txBody>
-        </p:sp>
-        <p:sp>
-          <p:nvSpPr>
-            <p:cNvPr id="220" name="TextBox 219">
-              <a:extLst>
-                <a:ext uri="{FF2B5EF4-FFF2-40B4-BE49-F238E27FC236}">
-                  <a16:creationId xmlns:a16="http://schemas.microsoft.com/office/drawing/2014/main" id="{20316B05-E1B0-45E8-9CED-EBA7E50D97C5}"/>
-                </a:ext>
-              </a:extLst>
-            </p:cNvPr>
-            <p:cNvSpPr txBox="1"/>
-            <p:nvPr/>
-          </p:nvSpPr>
-          <p:spPr>
-            <a:xfrm>
-              <a:off x="4189438" y="9196180"/>
-              <a:ext cx="414636" cy="246221"/>
-            </a:xfrm>
-            <a:prstGeom prst="rect">
-              <a:avLst/>
-            </a:prstGeom>
-            <a:noFill/>
-          </p:spPr>
-          <p:txBody>
-            <a:bodyPr wrap="square" rtlCol="0">
-              <a:spAutoFit/>
-            </a:bodyPr>
-            <a:lstStyle/>
-            <a:p>
               <a:r>
-                <a:rPr lang="it-IT" sz="1000" b="1" dirty="0">
-                  <a:solidFill>
-                    <a:schemeClr val="bg1"/>
-                  </a:solidFill>
-                </a:rPr>
-                <a:t>5</a:t>
+                <a:rPr lang="en-GB" sz="1000" dirty="0"/>
+                <a:t>people</a:t>
+              </a:r>
+              <a:r>
+                <a:rPr lang="it-IT" sz="1000" dirty="0"/>
+                <a:t>/km2]</a:t>
               </a:r>
             </a:p>
           </p:txBody>
         </p:sp>
       </p:grpSp>
+      <p:pic>
+        <p:nvPicPr>
+          <p:cNvPr id="196" name="Picture 195" descr="Map&#10;&#10;Description automatically generated">
+            <a:extLst>
+              <a:ext uri="{FF2B5EF4-FFF2-40B4-BE49-F238E27FC236}">
+                <a16:creationId xmlns:a16="http://schemas.microsoft.com/office/drawing/2014/main" id="{B58C8CEE-863D-4AF5-944A-06815392DD64}"/>
+              </a:ext>
+            </a:extLst>
+          </p:cNvPr>
+          <p:cNvPicPr>
+            <a:picLocks noChangeAspect="1"/>
+          </p:cNvPicPr>
+          <p:nvPr/>
+        </p:nvPicPr>
+        <p:blipFill>
+          <a:blip r:embed="rId5">
+            <a:extLst>
+              <a:ext uri="{28A0092B-C50C-407E-A947-70E740481C1C}">
+                <a14:useLocalDpi xmlns:a14="http://schemas.microsoft.com/office/drawing/2010/main" val="0"/>
+              </a:ext>
+            </a:extLst>
+          </a:blip>
+          <a:stretch>
+            <a:fillRect/>
+          </a:stretch>
+        </p:blipFill>
+        <p:spPr>
+          <a:xfrm>
+            <a:off x="2528638" y="4946549"/>
+            <a:ext cx="2301407" cy="2565205"/>
+          </a:xfrm>
+          <a:prstGeom prst="rect">
+            <a:avLst/>
+          </a:prstGeom>
+          <a:ln>
+            <a:solidFill>
+              <a:schemeClr val="tx1"/>
+            </a:solidFill>
+          </a:ln>
+        </p:spPr>
+      </p:pic>
+      <p:sp>
+        <p:nvSpPr>
+          <p:cNvPr id="197" name="TextBox 196">
+            <a:extLst>
+              <a:ext uri="{FF2B5EF4-FFF2-40B4-BE49-F238E27FC236}">
+                <a16:creationId xmlns:a16="http://schemas.microsoft.com/office/drawing/2014/main" id="{A122E27E-B89D-4646-A9C8-604EA8A20BBC}"/>
+              </a:ext>
+            </a:extLst>
+          </p:cNvPr>
+          <p:cNvSpPr txBox="1"/>
+          <p:nvPr/>
+        </p:nvSpPr>
+        <p:spPr>
+          <a:xfrm>
+            <a:off x="3163036" y="5127172"/>
+            <a:ext cx="414636" cy="246221"/>
+          </a:xfrm>
+          <a:prstGeom prst="rect">
+            <a:avLst/>
+          </a:prstGeom>
+          <a:noFill/>
+        </p:spPr>
+        <p:txBody>
+          <a:bodyPr wrap="square" rtlCol="0">
+            <a:spAutoFit/>
+          </a:bodyPr>
+          <a:lstStyle/>
+          <a:p>
+            <a:r>
+              <a:rPr lang="it-IT" sz="1000" b="1" dirty="0">
+                <a:solidFill>
+                  <a:schemeClr val="bg1"/>
+                </a:solidFill>
+              </a:rPr>
+              <a:t>1</a:t>
+            </a:r>
+          </a:p>
+        </p:txBody>
+      </p:sp>
+      <p:sp>
+        <p:nvSpPr>
+          <p:cNvPr id="198" name="TextBox 197">
+            <a:extLst>
+              <a:ext uri="{FF2B5EF4-FFF2-40B4-BE49-F238E27FC236}">
+                <a16:creationId xmlns:a16="http://schemas.microsoft.com/office/drawing/2014/main" id="{379409AB-DFC5-4F74-8EFF-327F74CCD4E6}"/>
+              </a:ext>
+            </a:extLst>
+          </p:cNvPr>
+          <p:cNvSpPr txBox="1"/>
+          <p:nvPr/>
+        </p:nvSpPr>
+        <p:spPr>
+          <a:xfrm>
+            <a:off x="2838468" y="5588300"/>
+            <a:ext cx="414636" cy="246221"/>
+          </a:xfrm>
+          <a:prstGeom prst="rect">
+            <a:avLst/>
+          </a:prstGeom>
+          <a:noFill/>
+        </p:spPr>
+        <p:txBody>
+          <a:bodyPr wrap="square" rtlCol="0">
+            <a:spAutoFit/>
+          </a:bodyPr>
+          <a:lstStyle/>
+          <a:p>
+            <a:r>
+              <a:rPr lang="it-IT" sz="1000" b="1" dirty="0">
+                <a:solidFill>
+                  <a:schemeClr val="bg1"/>
+                </a:solidFill>
+              </a:rPr>
+              <a:t>2</a:t>
+            </a:r>
+          </a:p>
+        </p:txBody>
+      </p:sp>
+      <p:sp>
+        <p:nvSpPr>
+          <p:cNvPr id="199" name="TextBox 198">
+            <a:extLst>
+              <a:ext uri="{FF2B5EF4-FFF2-40B4-BE49-F238E27FC236}">
+                <a16:creationId xmlns:a16="http://schemas.microsoft.com/office/drawing/2014/main" id="{C4C3754B-DDFD-4ADE-A96A-E912CB88EBE3}"/>
+              </a:ext>
+            </a:extLst>
+          </p:cNvPr>
+          <p:cNvSpPr txBox="1"/>
+          <p:nvPr/>
+        </p:nvSpPr>
+        <p:spPr>
+          <a:xfrm>
+            <a:off x="2599847" y="6252551"/>
+            <a:ext cx="414636" cy="246221"/>
+          </a:xfrm>
+          <a:prstGeom prst="rect">
+            <a:avLst/>
+          </a:prstGeom>
+          <a:noFill/>
+        </p:spPr>
+        <p:txBody>
+          <a:bodyPr wrap="square" rtlCol="0">
+            <a:spAutoFit/>
+          </a:bodyPr>
+          <a:lstStyle/>
+          <a:p>
+            <a:r>
+              <a:rPr lang="it-IT" sz="1000" b="1" dirty="0">
+                <a:solidFill>
+                  <a:schemeClr val="bg1"/>
+                </a:solidFill>
+              </a:rPr>
+              <a:t>3</a:t>
+            </a:r>
+          </a:p>
+        </p:txBody>
+      </p:sp>
+      <p:sp>
+        <p:nvSpPr>
+          <p:cNvPr id="200" name="TextBox 199">
+            <a:extLst>
+              <a:ext uri="{FF2B5EF4-FFF2-40B4-BE49-F238E27FC236}">
+                <a16:creationId xmlns:a16="http://schemas.microsoft.com/office/drawing/2014/main" id="{F889760E-5B5A-4525-8C2F-6846026E1D19}"/>
+              </a:ext>
+            </a:extLst>
+          </p:cNvPr>
+          <p:cNvSpPr txBox="1"/>
+          <p:nvPr/>
+        </p:nvSpPr>
+        <p:spPr>
+          <a:xfrm>
+            <a:off x="2789227" y="6119389"/>
+            <a:ext cx="414636" cy="246221"/>
+          </a:xfrm>
+          <a:prstGeom prst="rect">
+            <a:avLst/>
+          </a:prstGeom>
+          <a:noFill/>
+        </p:spPr>
+        <p:txBody>
+          <a:bodyPr wrap="square" rtlCol="0">
+            <a:spAutoFit/>
+          </a:bodyPr>
+          <a:lstStyle/>
+          <a:p>
+            <a:r>
+              <a:rPr lang="it-IT" sz="1000" b="1" dirty="0">
+                <a:solidFill>
+                  <a:schemeClr val="bg1"/>
+                </a:solidFill>
+              </a:rPr>
+              <a:t>11</a:t>
+            </a:r>
+          </a:p>
+        </p:txBody>
+      </p:sp>
+      <p:sp>
+        <p:nvSpPr>
+          <p:cNvPr id="201" name="TextBox 200">
+            <a:extLst>
+              <a:ext uri="{FF2B5EF4-FFF2-40B4-BE49-F238E27FC236}">
+                <a16:creationId xmlns:a16="http://schemas.microsoft.com/office/drawing/2014/main" id="{AE5AB460-0903-4B8B-87FA-7CE6510E3056}"/>
+              </a:ext>
+            </a:extLst>
+          </p:cNvPr>
+          <p:cNvSpPr txBox="1"/>
+          <p:nvPr/>
+        </p:nvSpPr>
+        <p:spPr>
+          <a:xfrm>
+            <a:off x="3614648" y="5131620"/>
+            <a:ext cx="414636" cy="246221"/>
+          </a:xfrm>
+          <a:prstGeom prst="rect">
+            <a:avLst/>
+          </a:prstGeom>
+          <a:noFill/>
+        </p:spPr>
+        <p:txBody>
+          <a:bodyPr wrap="square" rtlCol="0">
+            <a:spAutoFit/>
+          </a:bodyPr>
+          <a:lstStyle/>
+          <a:p>
+            <a:r>
+              <a:rPr lang="it-IT" sz="1000" b="1" dirty="0">
+                <a:solidFill>
+                  <a:schemeClr val="bg1"/>
+                </a:solidFill>
+              </a:rPr>
+              <a:t>4</a:t>
+            </a:r>
+          </a:p>
+        </p:txBody>
+      </p:sp>
+      <p:sp>
+        <p:nvSpPr>
+          <p:cNvPr id="202" name="TextBox 201">
+            <a:extLst>
+              <a:ext uri="{FF2B5EF4-FFF2-40B4-BE49-F238E27FC236}">
+                <a16:creationId xmlns:a16="http://schemas.microsoft.com/office/drawing/2014/main" id="{11B187C6-3A57-4F86-ABB6-ADF882708D3A}"/>
+              </a:ext>
+            </a:extLst>
+          </p:cNvPr>
+          <p:cNvSpPr txBox="1"/>
+          <p:nvPr/>
+        </p:nvSpPr>
+        <p:spPr>
+          <a:xfrm>
+            <a:off x="3412705" y="5438934"/>
+            <a:ext cx="414636" cy="246221"/>
+          </a:xfrm>
+          <a:prstGeom prst="rect">
+            <a:avLst/>
+          </a:prstGeom>
+          <a:noFill/>
+        </p:spPr>
+        <p:txBody>
+          <a:bodyPr wrap="square" rtlCol="0">
+            <a:spAutoFit/>
+          </a:bodyPr>
+          <a:lstStyle/>
+          <a:p>
+            <a:r>
+              <a:rPr lang="it-IT" sz="1000" b="1" dirty="0">
+                <a:solidFill>
+                  <a:schemeClr val="bg1"/>
+                </a:solidFill>
+              </a:rPr>
+              <a:t>6</a:t>
+            </a:r>
+          </a:p>
+        </p:txBody>
+      </p:sp>
+      <p:sp>
+        <p:nvSpPr>
+          <p:cNvPr id="203" name="TextBox 202">
+            <a:extLst>
+              <a:ext uri="{FF2B5EF4-FFF2-40B4-BE49-F238E27FC236}">
+                <a16:creationId xmlns:a16="http://schemas.microsoft.com/office/drawing/2014/main" id="{3BBEAE37-D32B-49AC-87EC-DDA126F8A175}"/>
+              </a:ext>
+            </a:extLst>
+          </p:cNvPr>
+          <p:cNvSpPr txBox="1"/>
+          <p:nvPr/>
+        </p:nvSpPr>
+        <p:spPr>
+          <a:xfrm>
+            <a:off x="3124182" y="5503201"/>
+            <a:ext cx="414636" cy="246221"/>
+          </a:xfrm>
+          <a:prstGeom prst="rect">
+            <a:avLst/>
+          </a:prstGeom>
+          <a:noFill/>
+        </p:spPr>
+        <p:txBody>
+          <a:bodyPr wrap="square" rtlCol="0">
+            <a:spAutoFit/>
+          </a:bodyPr>
+          <a:lstStyle/>
+          <a:p>
+            <a:r>
+              <a:rPr lang="it-IT" sz="1000" b="1" dirty="0">
+                <a:solidFill>
+                  <a:schemeClr val="bg1"/>
+                </a:solidFill>
+              </a:rPr>
+              <a:t>7</a:t>
+            </a:r>
+          </a:p>
+        </p:txBody>
+      </p:sp>
+      <p:sp>
+        <p:nvSpPr>
+          <p:cNvPr id="204" name="TextBox 203">
+            <a:extLst>
+              <a:ext uri="{FF2B5EF4-FFF2-40B4-BE49-F238E27FC236}">
+                <a16:creationId xmlns:a16="http://schemas.microsoft.com/office/drawing/2014/main" id="{CDA2E1F3-6E5C-466F-8830-EB44DDC8CEBD}"/>
+              </a:ext>
+            </a:extLst>
+          </p:cNvPr>
+          <p:cNvSpPr txBox="1"/>
+          <p:nvPr/>
+        </p:nvSpPr>
+        <p:spPr>
+          <a:xfrm>
+            <a:off x="2977690" y="5969682"/>
+            <a:ext cx="414636" cy="246221"/>
+          </a:xfrm>
+          <a:prstGeom prst="rect">
+            <a:avLst/>
+          </a:prstGeom>
+          <a:noFill/>
+        </p:spPr>
+        <p:txBody>
+          <a:bodyPr wrap="square" rtlCol="0">
+            <a:spAutoFit/>
+          </a:bodyPr>
+          <a:lstStyle/>
+          <a:p>
+            <a:r>
+              <a:rPr lang="it-IT" sz="1000" b="1" dirty="0">
+                <a:solidFill>
+                  <a:schemeClr val="bg1"/>
+                </a:solidFill>
+              </a:rPr>
+              <a:t>9</a:t>
+            </a:r>
+          </a:p>
+        </p:txBody>
+      </p:sp>
+      <p:sp>
+        <p:nvSpPr>
+          <p:cNvPr id="205" name="TextBox 204">
+            <a:extLst>
+              <a:ext uri="{FF2B5EF4-FFF2-40B4-BE49-F238E27FC236}">
+                <a16:creationId xmlns:a16="http://schemas.microsoft.com/office/drawing/2014/main" id="{B91C911D-78B0-4CB8-BC0E-9582F95A773B}"/>
+              </a:ext>
+            </a:extLst>
+          </p:cNvPr>
+          <p:cNvSpPr txBox="1"/>
+          <p:nvPr/>
+        </p:nvSpPr>
+        <p:spPr>
+          <a:xfrm>
+            <a:off x="3267119" y="5727059"/>
+            <a:ext cx="414636" cy="246221"/>
+          </a:xfrm>
+          <a:prstGeom prst="rect">
+            <a:avLst/>
+          </a:prstGeom>
+          <a:noFill/>
+        </p:spPr>
+        <p:txBody>
+          <a:bodyPr wrap="square" rtlCol="0">
+            <a:spAutoFit/>
+          </a:bodyPr>
+          <a:lstStyle/>
+          <a:p>
+            <a:r>
+              <a:rPr lang="it-IT" sz="1000" b="1" dirty="0">
+                <a:solidFill>
+                  <a:schemeClr val="bg1"/>
+                </a:solidFill>
+              </a:rPr>
+              <a:t>8</a:t>
+            </a:r>
+          </a:p>
+        </p:txBody>
+      </p:sp>
+      <p:sp>
+        <p:nvSpPr>
+          <p:cNvPr id="206" name="TextBox 205">
+            <a:extLst>
+              <a:ext uri="{FF2B5EF4-FFF2-40B4-BE49-F238E27FC236}">
+                <a16:creationId xmlns:a16="http://schemas.microsoft.com/office/drawing/2014/main" id="{06B5B641-3648-4EE6-B60D-1641E16BA69E}"/>
+              </a:ext>
+            </a:extLst>
+          </p:cNvPr>
+          <p:cNvSpPr txBox="1"/>
+          <p:nvPr/>
+        </p:nvSpPr>
+        <p:spPr>
+          <a:xfrm>
+            <a:off x="3145790" y="6023330"/>
+            <a:ext cx="414636" cy="246221"/>
+          </a:xfrm>
+          <a:prstGeom prst="rect">
+            <a:avLst/>
+          </a:prstGeom>
+          <a:noFill/>
+        </p:spPr>
+        <p:txBody>
+          <a:bodyPr wrap="square" rtlCol="0">
+            <a:spAutoFit/>
+          </a:bodyPr>
+          <a:lstStyle/>
+          <a:p>
+            <a:r>
+              <a:rPr lang="it-IT" sz="1000" b="1" dirty="0">
+                <a:solidFill>
+                  <a:schemeClr val="bg1"/>
+                </a:solidFill>
+              </a:rPr>
+              <a:t>10</a:t>
+            </a:r>
+          </a:p>
+        </p:txBody>
+      </p:sp>
+      <p:sp>
+        <p:nvSpPr>
+          <p:cNvPr id="207" name="TextBox 206">
+            <a:extLst>
+              <a:ext uri="{FF2B5EF4-FFF2-40B4-BE49-F238E27FC236}">
+                <a16:creationId xmlns:a16="http://schemas.microsoft.com/office/drawing/2014/main" id="{0C7EE2B8-6492-4229-8AF1-2C8A637C4736}"/>
+              </a:ext>
+            </a:extLst>
+          </p:cNvPr>
+          <p:cNvSpPr txBox="1"/>
+          <p:nvPr/>
+        </p:nvSpPr>
+        <p:spPr>
+          <a:xfrm>
+            <a:off x="3356447" y="5899955"/>
+            <a:ext cx="414636" cy="246221"/>
+          </a:xfrm>
+          <a:prstGeom prst="rect">
+            <a:avLst/>
+          </a:prstGeom>
+          <a:noFill/>
+        </p:spPr>
+        <p:txBody>
+          <a:bodyPr wrap="square" rtlCol="0">
+            <a:spAutoFit/>
+          </a:bodyPr>
+          <a:lstStyle/>
+          <a:p>
+            <a:r>
+              <a:rPr lang="it-IT" sz="1000" b="1" dirty="0">
+                <a:solidFill>
+                  <a:schemeClr val="bg1"/>
+                </a:solidFill>
+              </a:rPr>
+              <a:t>13</a:t>
+            </a:r>
+          </a:p>
+        </p:txBody>
+      </p:sp>
+      <p:sp>
+        <p:nvSpPr>
+          <p:cNvPr id="208" name="TextBox 207">
+            <a:extLst>
+              <a:ext uri="{FF2B5EF4-FFF2-40B4-BE49-F238E27FC236}">
+                <a16:creationId xmlns:a16="http://schemas.microsoft.com/office/drawing/2014/main" id="{69E9C4FF-1BD0-4A18-8A99-B9BDBEF379FE}"/>
+              </a:ext>
+            </a:extLst>
+          </p:cNvPr>
+          <p:cNvSpPr txBox="1"/>
+          <p:nvPr/>
+        </p:nvSpPr>
+        <p:spPr>
+          <a:xfrm>
+            <a:off x="3281378" y="6171378"/>
+            <a:ext cx="414636" cy="246221"/>
+          </a:xfrm>
+          <a:prstGeom prst="rect">
+            <a:avLst/>
+          </a:prstGeom>
+          <a:noFill/>
+        </p:spPr>
+        <p:txBody>
+          <a:bodyPr wrap="square" rtlCol="0">
+            <a:spAutoFit/>
+          </a:bodyPr>
+          <a:lstStyle/>
+          <a:p>
+            <a:r>
+              <a:rPr lang="it-IT" sz="1000" b="1" dirty="0">
+                <a:solidFill>
+                  <a:schemeClr val="bg1"/>
+                </a:solidFill>
+              </a:rPr>
+              <a:t>14</a:t>
+            </a:r>
+          </a:p>
+        </p:txBody>
+      </p:sp>
+      <p:sp>
+        <p:nvSpPr>
+          <p:cNvPr id="209" name="TextBox 208">
+            <a:extLst>
+              <a:ext uri="{FF2B5EF4-FFF2-40B4-BE49-F238E27FC236}">
+                <a16:creationId xmlns:a16="http://schemas.microsoft.com/office/drawing/2014/main" id="{8019F4E5-D25D-4A18-B72A-CC23EBF8391A}"/>
+              </a:ext>
+            </a:extLst>
+          </p:cNvPr>
+          <p:cNvSpPr txBox="1"/>
+          <p:nvPr/>
+        </p:nvSpPr>
+        <p:spPr>
+          <a:xfrm>
+            <a:off x="3178376" y="6398549"/>
+            <a:ext cx="414636" cy="246221"/>
+          </a:xfrm>
+          <a:prstGeom prst="rect">
+            <a:avLst/>
+          </a:prstGeom>
+          <a:noFill/>
+        </p:spPr>
+        <p:txBody>
+          <a:bodyPr wrap="square" rtlCol="0">
+            <a:spAutoFit/>
+          </a:bodyPr>
+          <a:lstStyle/>
+          <a:p>
+            <a:r>
+              <a:rPr lang="it-IT" sz="1000" b="1" dirty="0">
+                <a:solidFill>
+                  <a:schemeClr val="bg1"/>
+                </a:solidFill>
+              </a:rPr>
+              <a:t>15</a:t>
+            </a:r>
+          </a:p>
+        </p:txBody>
+      </p:sp>
+      <p:sp>
+        <p:nvSpPr>
+          <p:cNvPr id="210" name="TextBox 209">
+            <a:extLst>
+              <a:ext uri="{FF2B5EF4-FFF2-40B4-BE49-F238E27FC236}">
+                <a16:creationId xmlns:a16="http://schemas.microsoft.com/office/drawing/2014/main" id="{9D258644-3F29-4A69-B938-4B094E3A0E4C}"/>
+              </a:ext>
+            </a:extLst>
+          </p:cNvPr>
+          <p:cNvSpPr txBox="1"/>
+          <p:nvPr/>
+        </p:nvSpPr>
+        <p:spPr>
+          <a:xfrm>
+            <a:off x="3075244" y="6598231"/>
+            <a:ext cx="414636" cy="246221"/>
+          </a:xfrm>
+          <a:prstGeom prst="rect">
+            <a:avLst/>
+          </a:prstGeom>
+          <a:noFill/>
+        </p:spPr>
+        <p:txBody>
+          <a:bodyPr wrap="square" rtlCol="0">
+            <a:spAutoFit/>
+          </a:bodyPr>
+          <a:lstStyle/>
+          <a:p>
+            <a:r>
+              <a:rPr lang="it-IT" sz="1000" b="1" dirty="0">
+                <a:solidFill>
+                  <a:schemeClr val="bg1"/>
+                </a:solidFill>
+              </a:rPr>
+              <a:t>16</a:t>
+            </a:r>
+          </a:p>
+        </p:txBody>
+      </p:sp>
+      <p:sp>
+        <p:nvSpPr>
+          <p:cNvPr id="211" name="TextBox 210">
+            <a:extLst>
+              <a:ext uri="{FF2B5EF4-FFF2-40B4-BE49-F238E27FC236}">
+                <a16:creationId xmlns:a16="http://schemas.microsoft.com/office/drawing/2014/main" id="{304FCF33-E449-4E41-BE44-C341DC61F5AC}"/>
+              </a:ext>
+            </a:extLst>
+          </p:cNvPr>
+          <p:cNvSpPr txBox="1"/>
+          <p:nvPr/>
+        </p:nvSpPr>
+        <p:spPr>
+          <a:xfrm>
+            <a:off x="2840128" y="6795267"/>
+            <a:ext cx="414636" cy="246221"/>
+          </a:xfrm>
+          <a:prstGeom prst="rect">
+            <a:avLst/>
+          </a:prstGeom>
+          <a:noFill/>
+        </p:spPr>
+        <p:txBody>
+          <a:bodyPr wrap="square" rtlCol="0">
+            <a:spAutoFit/>
+          </a:bodyPr>
+          <a:lstStyle/>
+          <a:p>
+            <a:r>
+              <a:rPr lang="it-IT" sz="1000" b="1" dirty="0">
+                <a:solidFill>
+                  <a:schemeClr val="bg1"/>
+                </a:solidFill>
+              </a:rPr>
+              <a:t>17</a:t>
+            </a:r>
+          </a:p>
+        </p:txBody>
+      </p:sp>
+      <p:sp>
+        <p:nvSpPr>
+          <p:cNvPr id="212" name="TextBox 211">
+            <a:extLst>
+              <a:ext uri="{FF2B5EF4-FFF2-40B4-BE49-F238E27FC236}">
+                <a16:creationId xmlns:a16="http://schemas.microsoft.com/office/drawing/2014/main" id="{8A828F02-C7F0-40C9-A558-5B22C5580A78}"/>
+              </a:ext>
+            </a:extLst>
+          </p:cNvPr>
+          <p:cNvSpPr txBox="1"/>
+          <p:nvPr/>
+        </p:nvSpPr>
+        <p:spPr>
+          <a:xfrm>
+            <a:off x="2906344" y="7033061"/>
+            <a:ext cx="414636" cy="246221"/>
+          </a:xfrm>
+          <a:prstGeom prst="rect">
+            <a:avLst/>
+          </a:prstGeom>
+          <a:noFill/>
+        </p:spPr>
+        <p:txBody>
+          <a:bodyPr wrap="square" rtlCol="0">
+            <a:spAutoFit/>
+          </a:bodyPr>
+          <a:lstStyle/>
+          <a:p>
+            <a:r>
+              <a:rPr lang="it-IT" sz="1000" b="1" dirty="0">
+                <a:solidFill>
+                  <a:schemeClr val="bg1"/>
+                </a:solidFill>
+              </a:rPr>
+              <a:t>18</a:t>
+            </a:r>
+          </a:p>
+        </p:txBody>
+      </p:sp>
+      <p:sp>
+        <p:nvSpPr>
+          <p:cNvPr id="213" name="TextBox 212">
+            <a:extLst>
+              <a:ext uri="{FF2B5EF4-FFF2-40B4-BE49-F238E27FC236}">
+                <a16:creationId xmlns:a16="http://schemas.microsoft.com/office/drawing/2014/main" id="{1657D5C5-96C7-4413-8DC8-25116FCCF52C}"/>
+              </a:ext>
+            </a:extLst>
+          </p:cNvPr>
+          <p:cNvSpPr txBox="1"/>
+          <p:nvPr/>
+        </p:nvSpPr>
+        <p:spPr>
+          <a:xfrm>
+            <a:off x="4167761" y="5412709"/>
+            <a:ext cx="414636" cy="246221"/>
+          </a:xfrm>
+          <a:prstGeom prst="rect">
+            <a:avLst/>
+          </a:prstGeom>
+          <a:noFill/>
+        </p:spPr>
+        <p:txBody>
+          <a:bodyPr wrap="square" rtlCol="0">
+            <a:spAutoFit/>
+          </a:bodyPr>
+          <a:lstStyle/>
+          <a:p>
+            <a:r>
+              <a:rPr lang="it-IT" sz="1000" b="1" dirty="0"/>
+              <a:t>19</a:t>
+            </a:r>
+          </a:p>
+        </p:txBody>
+      </p:sp>
+      <p:sp>
+        <p:nvSpPr>
+          <p:cNvPr id="214" name="TextBox 213">
+            <a:extLst>
+              <a:ext uri="{FF2B5EF4-FFF2-40B4-BE49-F238E27FC236}">
+                <a16:creationId xmlns:a16="http://schemas.microsoft.com/office/drawing/2014/main" id="{4FDCB11B-5181-4C4A-AD3B-BABC6C0DBB04}"/>
+              </a:ext>
+            </a:extLst>
+          </p:cNvPr>
+          <p:cNvSpPr txBox="1"/>
+          <p:nvPr/>
+        </p:nvSpPr>
+        <p:spPr>
+          <a:xfrm>
+            <a:off x="3583447" y="5632531"/>
+            <a:ext cx="414636" cy="246221"/>
+          </a:xfrm>
+          <a:prstGeom prst="rect">
+            <a:avLst/>
+          </a:prstGeom>
+          <a:noFill/>
+        </p:spPr>
+        <p:txBody>
+          <a:bodyPr wrap="square" rtlCol="0">
+            <a:spAutoFit/>
+          </a:bodyPr>
+          <a:lstStyle/>
+          <a:p>
+            <a:r>
+              <a:rPr lang="it-IT" sz="1000" b="1" dirty="0"/>
+              <a:t>12</a:t>
+            </a:r>
+          </a:p>
+        </p:txBody>
+      </p:sp>
+      <p:sp>
+        <p:nvSpPr>
+          <p:cNvPr id="215" name="TextBox 214">
+            <a:extLst>
+              <a:ext uri="{FF2B5EF4-FFF2-40B4-BE49-F238E27FC236}">
+                <a16:creationId xmlns:a16="http://schemas.microsoft.com/office/drawing/2014/main" id="{43CCB5C4-5A20-495D-96F0-B57215A7AA21}"/>
+              </a:ext>
+            </a:extLst>
+          </p:cNvPr>
+          <p:cNvSpPr txBox="1"/>
+          <p:nvPr/>
+        </p:nvSpPr>
+        <p:spPr>
+          <a:xfrm>
+            <a:off x="4196517" y="5698005"/>
+            <a:ext cx="414636" cy="246221"/>
+          </a:xfrm>
+          <a:prstGeom prst="rect">
+            <a:avLst/>
+          </a:prstGeom>
+          <a:noFill/>
+        </p:spPr>
+        <p:txBody>
+          <a:bodyPr wrap="square" rtlCol="0">
+            <a:spAutoFit/>
+          </a:bodyPr>
+          <a:lstStyle/>
+          <a:p>
+            <a:r>
+              <a:rPr lang="it-IT" sz="1000" b="1" dirty="0"/>
+              <a:t>20</a:t>
+            </a:r>
+          </a:p>
+        </p:txBody>
+      </p:sp>
+      <p:sp>
+        <p:nvSpPr>
+          <p:cNvPr id="216" name="TextBox 215">
+            <a:extLst>
+              <a:ext uri="{FF2B5EF4-FFF2-40B4-BE49-F238E27FC236}">
+                <a16:creationId xmlns:a16="http://schemas.microsoft.com/office/drawing/2014/main" id="{626F3178-8FE6-4D24-B3DF-8CD2FDE1FA43}"/>
+              </a:ext>
+            </a:extLst>
+          </p:cNvPr>
+          <p:cNvSpPr txBox="1"/>
+          <p:nvPr/>
+        </p:nvSpPr>
+        <p:spPr>
+          <a:xfrm>
+            <a:off x="4007218" y="6092792"/>
+            <a:ext cx="414636" cy="246221"/>
+          </a:xfrm>
+          <a:prstGeom prst="rect">
+            <a:avLst/>
+          </a:prstGeom>
+          <a:noFill/>
+        </p:spPr>
+        <p:txBody>
+          <a:bodyPr wrap="square" rtlCol="0">
+            <a:spAutoFit/>
+          </a:bodyPr>
+          <a:lstStyle/>
+          <a:p>
+            <a:r>
+              <a:rPr lang="it-IT" sz="1000" b="1" dirty="0"/>
+              <a:t>21</a:t>
+            </a:r>
+          </a:p>
+        </p:txBody>
+      </p:sp>
+      <p:sp>
+        <p:nvSpPr>
+          <p:cNvPr id="217" name="TextBox 216">
+            <a:extLst>
+              <a:ext uri="{FF2B5EF4-FFF2-40B4-BE49-F238E27FC236}">
+                <a16:creationId xmlns:a16="http://schemas.microsoft.com/office/drawing/2014/main" id="{E7A7B55A-342A-49E5-BC78-851EEDEDD0BC}"/>
+              </a:ext>
+            </a:extLst>
+          </p:cNvPr>
+          <p:cNvSpPr txBox="1"/>
+          <p:nvPr/>
+        </p:nvSpPr>
+        <p:spPr>
+          <a:xfrm>
+            <a:off x="3592882" y="6380452"/>
+            <a:ext cx="414636" cy="246221"/>
+          </a:xfrm>
+          <a:prstGeom prst="rect">
+            <a:avLst/>
+          </a:prstGeom>
+          <a:noFill/>
+        </p:spPr>
+        <p:txBody>
+          <a:bodyPr wrap="square" rtlCol="0">
+            <a:spAutoFit/>
+          </a:bodyPr>
+          <a:lstStyle/>
+          <a:p>
+            <a:r>
+              <a:rPr lang="it-IT" sz="1000" b="1" dirty="0"/>
+              <a:t>22</a:t>
+            </a:r>
+          </a:p>
+        </p:txBody>
+      </p:sp>
+      <p:sp>
+        <p:nvSpPr>
+          <p:cNvPr id="218" name="TextBox 217">
+            <a:extLst>
+              <a:ext uri="{FF2B5EF4-FFF2-40B4-BE49-F238E27FC236}">
+                <a16:creationId xmlns:a16="http://schemas.microsoft.com/office/drawing/2014/main" id="{EB701E82-7422-442B-AB98-CB1DC6B3014E}"/>
+              </a:ext>
+            </a:extLst>
+          </p:cNvPr>
+          <p:cNvSpPr txBox="1"/>
+          <p:nvPr/>
+        </p:nvSpPr>
+        <p:spPr>
+          <a:xfrm>
+            <a:off x="3235714" y="6975891"/>
+            <a:ext cx="414636" cy="246221"/>
+          </a:xfrm>
+          <a:prstGeom prst="rect">
+            <a:avLst/>
+          </a:prstGeom>
+          <a:noFill/>
+        </p:spPr>
+        <p:txBody>
+          <a:bodyPr wrap="square" rtlCol="0">
+            <a:spAutoFit/>
+          </a:bodyPr>
+          <a:lstStyle/>
+          <a:p>
+            <a:r>
+              <a:rPr lang="it-IT" sz="1000" b="1" dirty="0"/>
+              <a:t>23</a:t>
+            </a:r>
+          </a:p>
+        </p:txBody>
+      </p:sp>
+      <p:sp>
+        <p:nvSpPr>
+          <p:cNvPr id="219" name="TextBox 218">
+            <a:extLst>
+              <a:ext uri="{FF2B5EF4-FFF2-40B4-BE49-F238E27FC236}">
+                <a16:creationId xmlns:a16="http://schemas.microsoft.com/office/drawing/2014/main" id="{1BDE16C1-EA00-4492-8274-0E8E1431C785}"/>
+              </a:ext>
+            </a:extLst>
+          </p:cNvPr>
+          <p:cNvSpPr txBox="1"/>
+          <p:nvPr/>
+        </p:nvSpPr>
+        <p:spPr>
+          <a:xfrm>
+            <a:off x="2600522" y="5032148"/>
+            <a:ext cx="229660" cy="246221"/>
+          </a:xfrm>
+          <a:prstGeom prst="rect">
+            <a:avLst/>
+          </a:prstGeom>
+          <a:noFill/>
+          <a:ln w="9525">
+            <a:solidFill>
+              <a:schemeClr val="tx1"/>
+            </a:solidFill>
+          </a:ln>
+        </p:spPr>
+        <p:txBody>
+          <a:bodyPr wrap="square" rtlCol="0">
+            <a:spAutoFit/>
+          </a:bodyPr>
+          <a:lstStyle/>
+          <a:p>
+            <a:pPr algn="ctr"/>
+            <a:r>
+              <a:rPr lang="en-GB" sz="1000" dirty="0"/>
+              <a:t>c</a:t>
+            </a:r>
+          </a:p>
+        </p:txBody>
+      </p:sp>
+      <p:sp>
+        <p:nvSpPr>
+          <p:cNvPr id="220" name="TextBox 219">
+            <a:extLst>
+              <a:ext uri="{FF2B5EF4-FFF2-40B4-BE49-F238E27FC236}">
+                <a16:creationId xmlns:a16="http://schemas.microsoft.com/office/drawing/2014/main" id="{20316B05-E1B0-45E8-9CED-EBA7E50D97C5}"/>
+              </a:ext>
+            </a:extLst>
+          </p:cNvPr>
+          <p:cNvSpPr txBox="1"/>
+          <p:nvPr/>
+        </p:nvSpPr>
+        <p:spPr>
+          <a:xfrm>
+            <a:off x="3494298" y="5237085"/>
+            <a:ext cx="414636" cy="246221"/>
+          </a:xfrm>
+          <a:prstGeom prst="rect">
+            <a:avLst/>
+          </a:prstGeom>
+          <a:noFill/>
+        </p:spPr>
+        <p:txBody>
+          <a:bodyPr wrap="square" rtlCol="0">
+            <a:spAutoFit/>
+          </a:bodyPr>
+          <a:lstStyle/>
+          <a:p>
+            <a:r>
+              <a:rPr lang="it-IT" sz="1000" b="1" dirty="0">
+                <a:solidFill>
+                  <a:schemeClr val="bg1"/>
+                </a:solidFill>
+              </a:rPr>
+              <a:t>5</a:t>
+            </a:r>
+          </a:p>
+        </p:txBody>
+      </p:sp>
       <p:pic>
         <p:nvPicPr>
           <p:cNvPr id="253" name="Graphic 252">
@@ -9048,13 +9531,13 @@
         <p:spPr>
           <a:xfrm>
             <a:off x="121360" y="5032149"/>
-            <a:ext cx="229660" cy="276999"/>
+            <a:ext cx="229660" cy="246221"/>
           </a:xfrm>
           <a:prstGeom prst="rect">
             <a:avLst/>
           </a:prstGeom>
           <a:noFill/>
-          <a:ln w="28575">
+          <a:ln w="9525">
             <a:solidFill>
               <a:schemeClr val="tx1"/>
             </a:solidFill>
@@ -9068,7 +9551,7 @@
           <a:p>
             <a:pPr algn="ctr"/>
             <a:r>
-              <a:rPr lang="en-GB" sz="1200" b="1" dirty="0"/>
+              <a:rPr lang="en-GB" sz="1000" dirty="0"/>
               <a:t>b</a:t>
             </a:r>
           </a:p>
@@ -10586,13 +11069,13 @@
         <p:spPr>
           <a:xfrm>
             <a:off x="5190690" y="108099"/>
-            <a:ext cx="229660" cy="276999"/>
+            <a:ext cx="229660" cy="246221"/>
           </a:xfrm>
           <a:prstGeom prst="rect">
             <a:avLst/>
           </a:prstGeom>
           <a:noFill/>
-          <a:ln w="28575">
+          <a:ln w="9525">
             <a:solidFill>
               <a:schemeClr val="tx1"/>
             </a:solidFill>
@@ -10606,10 +11089,10 @@
           <a:p>
             <a:pPr algn="ctr"/>
             <a:r>
-              <a:rPr lang="es-ES" sz="1200" b="1" dirty="0"/>
+              <a:rPr lang="es-ES" sz="1000" dirty="0"/>
               <a:t>d</a:t>
             </a:r>
-            <a:endParaRPr lang="en-GB" sz="1200" b="1" dirty="0"/>
+            <a:endParaRPr lang="en-GB" sz="1000" dirty="0"/>
           </a:p>
         </p:txBody>
       </p:sp>

</xml_diff>